<commit_message>
fim apresentacao da empresa
</commit_message>
<xml_diff>
--- a/plano-de-negocios-restaurante-tioto.pptx
+++ b/plano-de-negocios-restaurante-tioto.pptx
@@ -4128,7 +4128,7 @@
         <p:spPr>
           <a:xfrm>
             <a:off x="5441040" y="6062040"/>
-            <a:ext cx="1111320" cy="587880"/>
+            <a:ext cx="1110960" cy="587520"/>
           </a:xfrm>
           <a:prstGeom prst="rect">
             <a:avLst/>
@@ -4150,8 +4150,8 @@
         </p:nvSpPr>
         <p:spPr>
           <a:xfrm>
-            <a:off x="838080" y="365040"/>
-            <a:ext cx="10514880" cy="1324800"/>
+            <a:off x="609480" y="273600"/>
+            <a:ext cx="10972080" cy="1144440"/>
           </a:xfrm>
           <a:prstGeom prst="rect">
             <a:avLst/>
@@ -4188,7 +4188,7 @@
         <p:spPr>
           <a:xfrm>
             <a:off x="609480" y="1604520"/>
-            <a:ext cx="10972440" cy="3977280"/>
+            <a:ext cx="10972080" cy="3976920"/>
           </a:xfrm>
           <a:prstGeom prst="rect">
             <a:avLst/>
@@ -4199,7 +4199,7 @@
             <a:normAutofit/>
           </a:bodyPr>
           <a:p>
-            <a:pPr marL="432000" indent="-324000">
+            <a:pPr marL="432000" indent="-324000" algn="ctr">
               <a:spcBef>
                 <a:spcPts val="1417"/>
               </a:spcBef>
@@ -4211,17 +4211,17 @@
               <a:buChar char=""/>
             </a:pPr>
             <a:r>
-              <a:rPr b="0" lang="pt-BR" sz="3200" spc="-1" strike="noStrike">
+              <a:rPr b="0" lang="pt-BR" sz="1800" spc="-1" strike="noStrike">
                 <a:latin typeface="Arial"/>
               </a:rPr>
               <a:t>Clique para editar o formato do texto da estrutura de tópicos</a:t>
             </a:r>
-            <a:endParaRPr b="0" lang="pt-BR" sz="3200" spc="-1" strike="noStrike">
-              <a:latin typeface="Arial"/>
-            </a:endParaRPr>
-          </a:p>
-          <a:p>
-            <a:pPr lvl="1" marL="864000" indent="-324000">
+            <a:endParaRPr b="0" lang="pt-BR" sz="1800" spc="-1" strike="noStrike">
+              <a:latin typeface="Arial"/>
+            </a:endParaRPr>
+          </a:p>
+          <a:p>
+            <a:pPr lvl="1" marL="864000" indent="-324000" algn="ctr">
               <a:spcBef>
                 <a:spcPts val="1134"/>
               </a:spcBef>
@@ -4233,17 +4233,17 @@
               <a:buChar char=""/>
             </a:pPr>
             <a:r>
-              <a:rPr b="0" lang="pt-BR" sz="2800" spc="-1" strike="noStrike">
+              <a:rPr b="0" lang="pt-BR" sz="1800" spc="-1" strike="noStrike">
                 <a:latin typeface="Arial"/>
               </a:rPr>
               <a:t>2.º nível da estrutura de tópicos</a:t>
             </a:r>
-            <a:endParaRPr b="0" lang="pt-BR" sz="2800" spc="-1" strike="noStrike">
-              <a:latin typeface="Arial"/>
-            </a:endParaRPr>
-          </a:p>
-          <a:p>
-            <a:pPr lvl="2" marL="1296000" indent="-288000">
+            <a:endParaRPr b="0" lang="pt-BR" sz="1800" spc="-1" strike="noStrike">
+              <a:latin typeface="Arial"/>
+            </a:endParaRPr>
+          </a:p>
+          <a:p>
+            <a:pPr lvl="2" marL="1296000" indent="-288000" algn="ctr">
               <a:spcBef>
                 <a:spcPts val="850"/>
               </a:spcBef>
@@ -4255,17 +4255,17 @@
               <a:buChar char=""/>
             </a:pPr>
             <a:r>
-              <a:rPr b="0" lang="pt-BR" sz="2400" spc="-1" strike="noStrike">
+              <a:rPr b="0" lang="pt-BR" sz="1800" spc="-1" strike="noStrike">
                 <a:latin typeface="Arial"/>
               </a:rPr>
               <a:t>3.º nível da estrutura de tópicos</a:t>
             </a:r>
-            <a:endParaRPr b="0" lang="pt-BR" sz="2400" spc="-1" strike="noStrike">
-              <a:latin typeface="Arial"/>
-            </a:endParaRPr>
-          </a:p>
-          <a:p>
-            <a:pPr lvl="3" marL="1728000" indent="-216000">
+            <a:endParaRPr b="0" lang="pt-BR" sz="1800" spc="-1" strike="noStrike">
+              <a:latin typeface="Arial"/>
+            </a:endParaRPr>
+          </a:p>
+          <a:p>
+            <a:pPr lvl="3" marL="1728000" indent="-216000" algn="ctr">
               <a:spcBef>
                 <a:spcPts val="567"/>
               </a:spcBef>
@@ -4277,17 +4277,17 @@
               <a:buChar char=""/>
             </a:pPr>
             <a:r>
-              <a:rPr b="0" lang="pt-BR" sz="2000" spc="-1" strike="noStrike">
+              <a:rPr b="0" lang="pt-BR" sz="1800" spc="-1" strike="noStrike">
                 <a:latin typeface="Arial"/>
               </a:rPr>
               <a:t>4.º nível da estrutura de tópicos</a:t>
             </a:r>
-            <a:endParaRPr b="0" lang="pt-BR" sz="2000" spc="-1" strike="noStrike">
-              <a:latin typeface="Arial"/>
-            </a:endParaRPr>
-          </a:p>
-          <a:p>
-            <a:pPr lvl="4" marL="2160000" indent="-216000">
+            <a:endParaRPr b="0" lang="pt-BR" sz="1800" spc="-1" strike="noStrike">
+              <a:latin typeface="Arial"/>
+            </a:endParaRPr>
+          </a:p>
+          <a:p>
+            <a:pPr lvl="4" marL="2160000" indent="-216000" algn="ctr">
               <a:spcBef>
                 <a:spcPts val="283"/>
               </a:spcBef>
@@ -4299,17 +4299,17 @@
               <a:buChar char=""/>
             </a:pPr>
             <a:r>
-              <a:rPr b="0" lang="pt-BR" sz="2000" spc="-1" strike="noStrike">
+              <a:rPr b="0" lang="pt-BR" sz="1800" spc="-1" strike="noStrike">
                 <a:latin typeface="Arial"/>
               </a:rPr>
               <a:t>5.º nível da estrutura de tópicos</a:t>
             </a:r>
-            <a:endParaRPr b="0" lang="pt-BR" sz="2000" spc="-1" strike="noStrike">
-              <a:latin typeface="Arial"/>
-            </a:endParaRPr>
-          </a:p>
-          <a:p>
-            <a:pPr lvl="5" marL="2592000" indent="-216000">
+            <a:endParaRPr b="0" lang="pt-BR" sz="1800" spc="-1" strike="noStrike">
+              <a:latin typeface="Arial"/>
+            </a:endParaRPr>
+          </a:p>
+          <a:p>
+            <a:pPr lvl="5" marL="2592000" indent="-216000" algn="ctr">
               <a:spcBef>
                 <a:spcPts val="283"/>
               </a:spcBef>
@@ -4321,17 +4321,17 @@
               <a:buChar char=""/>
             </a:pPr>
             <a:r>
-              <a:rPr b="0" lang="pt-BR" sz="2000" spc="-1" strike="noStrike">
+              <a:rPr b="0" lang="pt-BR" sz="1800" spc="-1" strike="noStrike">
                 <a:latin typeface="Arial"/>
               </a:rPr>
               <a:t>6.º nível da estrutura de tópicos</a:t>
             </a:r>
-            <a:endParaRPr b="0" lang="pt-BR" sz="2000" spc="-1" strike="noStrike">
-              <a:latin typeface="Arial"/>
-            </a:endParaRPr>
-          </a:p>
-          <a:p>
-            <a:pPr lvl="6" marL="3024000" indent="-216000">
+            <a:endParaRPr b="0" lang="pt-BR" sz="1800" spc="-1" strike="noStrike">
+              <a:latin typeface="Arial"/>
+            </a:endParaRPr>
+          </a:p>
+          <a:p>
+            <a:pPr lvl="6" marL="3024000" indent="-216000" algn="ctr">
               <a:spcBef>
                 <a:spcPts val="283"/>
               </a:spcBef>
@@ -4343,12 +4343,12 @@
               <a:buChar char=""/>
             </a:pPr>
             <a:r>
-              <a:rPr b="0" lang="pt-BR" sz="2000" spc="-1" strike="noStrike">
+              <a:rPr b="0" lang="pt-BR" sz="1800" spc="-1" strike="noStrike">
                 <a:latin typeface="Arial"/>
               </a:rPr>
               <a:t>7.º nível da estrutura de tópicos</a:t>
             </a:r>
-            <a:endParaRPr b="0" lang="pt-BR" sz="2000" spc="-1" strike="noStrike">
+            <a:endParaRPr b="0" lang="pt-BR" sz="1800" spc="-1" strike="noStrike">
               <a:latin typeface="Arial"/>
             </a:endParaRPr>
           </a:p>
@@ -4411,7 +4411,7 @@
         <p:spPr>
           <a:xfrm>
             <a:off x="5540040" y="6176880"/>
-            <a:ext cx="1111320" cy="587880"/>
+            <a:ext cx="1110960" cy="587520"/>
           </a:xfrm>
           <a:prstGeom prst="rect">
             <a:avLst/>
@@ -4694,7 +4694,7 @@
         <p:spPr>
           <a:xfrm>
             <a:off x="5540040" y="6132960"/>
-            <a:ext cx="1111320" cy="587880"/>
+            <a:ext cx="1110960" cy="587520"/>
           </a:xfrm>
           <a:prstGeom prst="rect">
             <a:avLst/>
@@ -4716,8 +4716,8 @@
         </p:nvSpPr>
         <p:spPr>
           <a:xfrm>
-            <a:off x="838080" y="365040"/>
-            <a:ext cx="10514880" cy="1324800"/>
+            <a:off x="609480" y="273600"/>
+            <a:ext cx="10972080" cy="1144440"/>
           </a:xfrm>
           <a:prstGeom prst="rect">
             <a:avLst/>
@@ -4753,8 +4753,8 @@
         </p:nvSpPr>
         <p:spPr>
           <a:xfrm>
-            <a:off x="838080" y="1825560"/>
-            <a:ext cx="5130720" cy="4350600"/>
+            <a:off x="609480" y="1604520"/>
+            <a:ext cx="5353920" cy="3976920"/>
           </a:xfrm>
           <a:prstGeom prst="rect">
             <a:avLst/>
@@ -4932,8 +4932,8 @@
         </p:nvSpPr>
         <p:spPr>
           <a:xfrm>
-            <a:off x="6226200" y="1825560"/>
-            <a:ext cx="5130720" cy="4350600"/>
+            <a:off x="6231960" y="1604520"/>
+            <a:ext cx="5353920" cy="3976920"/>
           </a:xfrm>
           <a:prstGeom prst="rect">
             <a:avLst/>
@@ -5145,7 +5145,7 @@
         <p:spPr>
           <a:xfrm>
             <a:off x="1523880" y="523800"/>
-            <a:ext cx="9143280" cy="2386800"/>
+            <a:ext cx="9142920" cy="2386440"/>
           </a:xfrm>
           <a:prstGeom prst="rect">
             <a:avLst/>
@@ -5177,6 +5177,7 @@
                   <a:srgbClr val="808080"/>
                 </a:solidFill>
                 <a:latin typeface="Calibri Light"/>
+                <a:ea typeface="DejaVu Sans"/>
               </a:rPr>
               <a:t>Bar e Restaurante Tio Tó</a:t>
             </a:r>
@@ -5195,7 +5196,7 @@
         <p:spPr>
           <a:xfrm>
             <a:off x="1523880" y="3003480"/>
-            <a:ext cx="9143280" cy="2241000"/>
+            <a:ext cx="9142920" cy="2240640"/>
           </a:xfrm>
           <a:prstGeom prst="rect">
             <a:avLst/>
@@ -5230,6 +5231,7 @@
                   <a:srgbClr val="000000"/>
                 </a:solidFill>
                 <a:latin typeface="Times New Roman"/>
+                <a:ea typeface="DejaVu Sans"/>
               </a:rPr>
               <a:t>Trabalho de Conclusão do Curso de Pós Graduação em Gestão de Negócios em Alimentação – foco em resultados</a:t>
             </a:r>
@@ -5265,6 +5267,7 @@
                   <a:srgbClr val="000000"/>
                 </a:solidFill>
                 <a:latin typeface="Calibri"/>
+                <a:ea typeface="DejaVu Sans"/>
               </a:rPr>
               <a:t>TCC I</a:t>
             </a:r>
@@ -5287,6 +5290,7 @@
                   <a:srgbClr val="808080"/>
                 </a:solidFill>
                 <a:latin typeface="Calibri"/>
+                <a:ea typeface="DejaVu Sans"/>
               </a:rPr>
               <a:t>Renato márcio silva</a:t>
             </a:r>
@@ -5335,7 +5339,7 @@
         <p:spPr>
           <a:xfrm>
             <a:off x="838080" y="365040"/>
-            <a:ext cx="10514880" cy="1324800"/>
+            <a:ext cx="10514520" cy="1324440"/>
           </a:xfrm>
           <a:prstGeom prst="rect">
             <a:avLst/>
@@ -5367,6 +5371,7 @@
                   <a:srgbClr val="808080"/>
                 </a:solidFill>
                 <a:latin typeface="Calibri Light"/>
+                <a:ea typeface="DejaVu Sans"/>
               </a:rPr>
               <a:t>4. Considerações finais - TCC I</a:t>
             </a:r>
@@ -5385,7 +5390,7 @@
         <p:spPr>
           <a:xfrm>
             <a:off x="838080" y="1825560"/>
-            <a:ext cx="10514880" cy="4350600"/>
+            <a:ext cx="10514520" cy="4350240"/>
           </a:xfrm>
           <a:prstGeom prst="rect">
             <a:avLst/>
@@ -5441,7 +5446,7 @@
         <p:spPr>
           <a:xfrm>
             <a:off x="838080" y="365040"/>
-            <a:ext cx="10514880" cy="1324800"/>
+            <a:ext cx="10514520" cy="1324440"/>
           </a:xfrm>
           <a:prstGeom prst="rect">
             <a:avLst/>
@@ -5473,6 +5478,7 @@
                   <a:srgbClr val="808080"/>
                 </a:solidFill>
                 <a:latin typeface="Calibri Light"/>
+                <a:ea typeface="DejaVu Sans"/>
               </a:rPr>
               <a:t>1.Introdução ao tema e contextualização</a:t>
             </a:r>
@@ -5490,8 +5496,8 @@
         </p:nvSpPr>
         <p:spPr>
           <a:xfrm>
-            <a:off x="838080" y="1825560"/>
-            <a:ext cx="10514880" cy="4350600"/>
+            <a:off x="838080" y="1689480"/>
+            <a:ext cx="10514520" cy="4486320"/>
           </a:xfrm>
           <a:prstGeom prst="rect">
             <a:avLst/>
@@ -5526,8 +5532,19 @@
                   <a:srgbClr val="000000"/>
                 </a:solidFill>
                 <a:latin typeface="Times New Roman"/>
+                <a:ea typeface="DejaVu Sans"/>
               </a:rPr>
-              <a:t>O restaurante será aberto na cidade histórica de Diamantina – MG, onde existe um fluxo constante de turistas, mesmo na pandemia, este fluxo diminuiu mas não cessou por completo. O turismo é focado na arquitetura e importância histórica para o Brasil, reconhecida pela UNESCO como Patrimônio Cultural da Humanidade, Unesco 1999. Segundo a Secretaria de Estado de Turismo de Estado de Minas Gerais, a cidade é conhecida como um dos principais destinos da </a:t>
+              <a:t>O restaurante será aberto na cidade histórica de Diamantina – MG, onde antes da pandemia existia um fluxo constante de turistas, turismo com forte caráter cultural (</a:t>
+            </a:r>
+            <a:r>
+              <a:rPr b="0" lang="pt-BR" sz="2000" spc="-1" strike="noStrike">
+                <a:solidFill>
+                  <a:srgbClr val="000000"/>
+                </a:solidFill>
+                <a:latin typeface="Times New Roman"/>
+                <a:ea typeface="DejaVu Sans"/>
+              </a:rPr>
+              <a:t>UFVJM, p. 11 e p. 19, 2012). Outro fato de grande importância para cidade, foi que em 1999 ela foi reconhecida pela UNESCO como Patrimônio Cultural da Humanidade. De acordo com a Secretaria de Estado de Cultura e Turismo do Estado de Minas Gerais, Diamantina é conhecida como um dos principais destinos da </a:t>
             </a:r>
             <a:r>
               <a:rPr b="1" lang="pt-BR" sz="2000" spc="-1" strike="noStrike">
@@ -5535,6 +5552,7 @@
                   <a:srgbClr val="000000"/>
                 </a:solidFill>
                 <a:latin typeface="Times New Roman"/>
+                <a:ea typeface="DejaVu Sans"/>
               </a:rPr>
               <a:t>Estrada real</a:t>
             </a:r>
@@ -5544,30 +5562,29 @@
                   <a:srgbClr val="000000"/>
                 </a:solidFill>
                 <a:latin typeface="Times New Roman"/>
+                <a:ea typeface="DejaVu Sans"/>
               </a:rPr>
-              <a:t>, um dos roteiros culturais e turísticos mais ricos do Brasil. A riqueza cultura/arquitetônica já consolidada, Iphan, 1938, e a gastronômica que vem despontando para o restante do país, me chamou a atenção para abrir o empreendimento na cidade. Nossa proposta é servir pratos quentes, onde em sua composição, haverão produtos regionais e a predominância da carne de  porco, que é muito apreciada na culinária local. As linguiças artesanais serão o carro-chefe e serão produzidas pelo estabelecimento. Nosso público-alvo serão pessoas da faixa etária de 25 a 50 anos, turistas ou nativos predominantemente famílias e casais. </a:t>
+              <a:t>, um dos roteiros culturais e turísticos mais ricos do Brasil, também integrante do </a:t>
             </a:r>
-            <a:endParaRPr b="0" lang="pt-BR" sz="2000" spc="-1" strike="noStrike">
-              <a:latin typeface="Arial"/>
-            </a:endParaRPr>
-          </a:p>
-          <a:p>
-            <a:pPr algn="just">
-              <a:lnSpc>
-                <a:spcPct val="100000"/>
-              </a:lnSpc>
-              <a:spcBef>
-                <a:spcPts val="1417"/>
-              </a:spcBef>
-            </a:pPr>
+            <a:r>
+              <a:rPr b="1" lang="pt-BR" sz="2000" spc="-1" strike="noStrike">
+                <a:solidFill>
+                  <a:srgbClr val="000000"/>
+                </a:solidFill>
+                <a:latin typeface="Times New Roman"/>
+                <a:ea typeface="DejaVu Sans"/>
+              </a:rPr>
+              <a:t>Circuito dos Diamantes</a:t>
+            </a:r>
             <a:r>
               <a:rPr b="0" lang="pt-BR" sz="2000" spc="-1" strike="noStrike">
                 <a:solidFill>
                   <a:srgbClr val="000000"/>
                 </a:solidFill>
                 <a:latin typeface="Times New Roman"/>
+                <a:ea typeface="DejaVu Sans"/>
               </a:rPr>
-              <a:t>Os produtores locais e agricultura familiar, serão nossos principais parceiros para a aquisição de produtos regionais.</a:t>
+              <a:t>. Com grande riqueza cultural e arquitetônica, (Iphan, 2008), Diamantina também tem grande riqueza gastronômica. Esta riqueza me chamou a atenção para abrir o empreendimento na cidade. </a:t>
             </a:r>
             <a:endParaRPr b="0" lang="pt-BR" sz="2000" spc="-1" strike="noStrike">
               <a:latin typeface="Arial"/>
@@ -5614,7 +5631,7 @@
         <p:spPr>
           <a:xfrm>
             <a:off x="838080" y="365040"/>
-            <a:ext cx="10514880" cy="1324800"/>
+            <a:ext cx="10514520" cy="1324440"/>
           </a:xfrm>
           <a:prstGeom prst="rect">
             <a:avLst/>
@@ -5646,6 +5663,7 @@
                   <a:srgbClr val="808080"/>
                 </a:solidFill>
                 <a:latin typeface="Calibri Light"/>
+                <a:ea typeface="DejaVu Sans"/>
               </a:rPr>
               <a:t>1.1. Apresentação da empresa</a:t>
             </a:r>
@@ -5657,14 +5675,14 @@
       </p:sp>
       <p:sp>
         <p:nvSpPr>
-          <p:cNvPr id="123" name="CustomShape 2"/>
-          <p:cNvSpPr/>
+          <p:cNvPr id="123" name="TextShape 2"/>
+          <p:cNvSpPr txBox="1"/>
           <p:nvPr/>
         </p:nvSpPr>
         <p:spPr>
           <a:xfrm>
-            <a:off x="838080" y="1825560"/>
-            <a:ext cx="10514880" cy="4350600"/>
+            <a:off x="360000" y="1689480"/>
+            <a:ext cx="11520000" cy="2414520"/>
           </a:xfrm>
           <a:prstGeom prst="rect">
             <a:avLst/>
@@ -5674,12 +5692,59 @@
             <a:noFill/>
           </a:ln>
         </p:spPr>
-        <p:style>
-          <a:lnRef idx="0"/>
-          <a:fillRef idx="0"/>
-          <a:effectRef idx="0"/>
-          <a:fontRef idx="minor"/>
-        </p:style>
+        <p:txBody>
+          <a:bodyPr lIns="90000" rIns="90000" tIns="45000" bIns="45000">
+            <a:noAutofit/>
+          </a:bodyPr>
+          <a:p>
+            <a:pPr algn="just"/>
+            <a:r>
+              <a:rPr b="0" lang="pt-BR" sz="2000" spc="-1" strike="noStrike">
+                <a:solidFill>
+                  <a:srgbClr val="000000"/>
+                </a:solidFill>
+                <a:latin typeface="Times New Roman"/>
+                <a:ea typeface="DejaVu Sans"/>
+              </a:rPr>
+              <a:t>A proposta do bar e restaurante é servir tira-gosto e  pratos quentes, onde em sua composição, haverão produtos regionais e a predominância da carne de  porco, que é muito apreciada e utilizada na culinária local. O diferencial gastronômico, serão os embutidos artesanais (linguiças, salames e salsichas) que serão produzidas pelo próprio estabelecimento. </a:t>
+            </a:r>
+            <a:endParaRPr b="0" lang="pt-BR" sz="2000" spc="-1" strike="noStrike">
+              <a:latin typeface="Arial"/>
+            </a:endParaRPr>
+          </a:p>
+          <a:p>
+            <a:pPr algn="just"/>
+            <a:r>
+              <a:rPr b="0" lang="pt-BR" sz="2000" spc="-1" strike="noStrike">
+                <a:solidFill>
+                  <a:srgbClr val="000000"/>
+                </a:solidFill>
+                <a:latin typeface="Times New Roman"/>
+                <a:ea typeface="DejaVu Sans"/>
+              </a:rPr>
+              <a:t>Nosso público-alvo serão pessoas da faixa etária de 25 a 50 anos, turistas ou nativos predominantemente famílias e ou casais. </a:t>
+            </a:r>
+            <a:endParaRPr b="0" lang="pt-BR" sz="2000" spc="-1" strike="noStrike">
+              <a:latin typeface="Arial"/>
+            </a:endParaRPr>
+          </a:p>
+          <a:p>
+            <a:pPr algn="just"/>
+            <a:r>
+              <a:rPr b="0" lang="pt-BR" sz="2000" spc="-1" strike="noStrike">
+                <a:solidFill>
+                  <a:srgbClr val="000000"/>
+                </a:solidFill>
+                <a:latin typeface="Times New Roman"/>
+                <a:ea typeface="DejaVu Sans"/>
+              </a:rPr>
+              <a:t>Os produtores locais e agricultura familiar, serão nossos principais parceiros para a aquisição de produtos utilizados na confecção dos pratos.</a:t>
+            </a:r>
+            <a:endParaRPr b="0" lang="pt-BR" sz="2000" spc="-1" strike="noStrike">
+              <a:latin typeface="Arial"/>
+            </a:endParaRPr>
+          </a:p>
+        </p:txBody>
       </p:sp>
     </p:spTree>
   </p:cSld>
@@ -5720,7 +5785,7 @@
         <p:spPr>
           <a:xfrm>
             <a:off x="838080" y="365040"/>
-            <a:ext cx="10514880" cy="606600"/>
+            <a:ext cx="10514520" cy="606240"/>
           </a:xfrm>
           <a:prstGeom prst="rect">
             <a:avLst/>
@@ -5752,6 +5817,7 @@
                   <a:srgbClr val="808080"/>
                 </a:solidFill>
                 <a:latin typeface="Calibri Light"/>
+                <a:ea typeface="DejaVu Sans"/>
               </a:rPr>
               <a:t>1.2. Canvas</a:t>
             </a:r>
@@ -5770,7 +5836,7 @@
         <p:spPr>
           <a:xfrm>
             <a:off x="9156600" y="1102680"/>
-            <a:ext cx="2196360" cy="3555000"/>
+            <a:ext cx="2196000" cy="3554640"/>
           </a:xfrm>
           <a:prstGeom prst="rect">
             <a:avLst/>
@@ -5971,7 +6037,7 @@
         <p:spPr>
           <a:xfrm>
             <a:off x="2764440" y="2878200"/>
-            <a:ext cx="2090880" cy="1779480"/>
+            <a:ext cx="2090520" cy="1779120"/>
           </a:xfrm>
           <a:prstGeom prst="rect">
             <a:avLst/>
@@ -6074,7 +6140,7 @@
         <p:spPr>
           <a:xfrm>
             <a:off x="4929120" y="1102680"/>
-            <a:ext cx="2003040" cy="4973400"/>
+            <a:ext cx="2002680" cy="4973040"/>
           </a:xfrm>
           <a:prstGeom prst="rect">
             <a:avLst/>
@@ -6248,7 +6314,7 @@
         <p:spPr>
           <a:xfrm>
             <a:off x="7007040" y="1102680"/>
-            <a:ext cx="2076120" cy="1735560"/>
+            <a:ext cx="2075760" cy="1735200"/>
           </a:xfrm>
           <a:prstGeom prst="rect">
             <a:avLst/>
@@ -6346,7 +6412,7 @@
         <p:spPr>
           <a:xfrm>
             <a:off x="766800" y="1103400"/>
-            <a:ext cx="1937880" cy="3554280"/>
+            <a:ext cx="1937520" cy="3553920"/>
           </a:xfrm>
           <a:prstGeom prst="rect">
             <a:avLst/>
@@ -6422,6 +6488,26 @@
                 <a:spcPct val="100000"/>
               </a:lnSpc>
             </a:pPr>
+            <a:r>
+              <a:rPr b="0" lang="pt-BR" sz="1400" spc="-1" strike="noStrike">
+                <a:solidFill>
+                  <a:srgbClr val="000000"/>
+                </a:solidFill>
+                <a:latin typeface="Arial"/>
+                <a:ea typeface="DejaVu Sans"/>
+              </a:rPr>
+              <a:t>Produtores rurais locais</a:t>
+            </a:r>
+            <a:endParaRPr b="0" lang="pt-BR" sz="1400" spc="-1" strike="noStrike">
+              <a:latin typeface="Arial"/>
+            </a:endParaRPr>
+          </a:p>
+          <a:p>
+            <a:pPr algn="ctr">
+              <a:lnSpc>
+                <a:spcPct val="100000"/>
+              </a:lnSpc>
+            </a:pPr>
             <a:endParaRPr b="0" lang="pt-BR" sz="1400" spc="-1" strike="noStrike">
               <a:latin typeface="Arial"/>
             </a:endParaRPr>
@@ -6527,7 +6613,7 @@
         <p:spPr>
           <a:xfrm>
             <a:off x="766800" y="4708440"/>
-            <a:ext cx="4088880" cy="1367280"/>
+            <a:ext cx="4088520" cy="1366920"/>
           </a:xfrm>
           <a:prstGeom prst="rect">
             <a:avLst/>
@@ -6615,7 +6701,7 @@
         <p:spPr>
           <a:xfrm>
             <a:off x="7007040" y="2889000"/>
-            <a:ext cx="2080080" cy="1768680"/>
+            <a:ext cx="2079720" cy="1768320"/>
           </a:xfrm>
           <a:prstGeom prst="rect">
             <a:avLst/>
@@ -6729,7 +6815,7 @@
         <p:spPr>
           <a:xfrm>
             <a:off x="7007040" y="4708440"/>
-            <a:ext cx="4345920" cy="1352520"/>
+            <a:ext cx="4345560" cy="1352160"/>
           </a:xfrm>
           <a:prstGeom prst="rect">
             <a:avLst/>
@@ -6822,7 +6908,7 @@
         <p:spPr>
           <a:xfrm>
             <a:off x="2764440" y="1102680"/>
-            <a:ext cx="2094120" cy="1735560"/>
+            <a:ext cx="2093760" cy="1735200"/>
           </a:xfrm>
           <a:prstGeom prst="rect">
             <a:avLst/>
@@ -6973,7 +7059,7 @@
         <p:spPr>
           <a:xfrm>
             <a:off x="838080" y="365040"/>
-            <a:ext cx="10514880" cy="1324800"/>
+            <a:ext cx="10514520" cy="1324440"/>
           </a:xfrm>
           <a:prstGeom prst="rect">
             <a:avLst/>
@@ -7005,6 +7091,7 @@
                   <a:srgbClr val="808080"/>
                 </a:solidFill>
                 <a:latin typeface="Calibri Light"/>
+                <a:ea typeface="DejaVu Sans"/>
               </a:rPr>
               <a:t>2. Produtos e Serviços</a:t>
             </a:r>
@@ -7023,7 +7110,7 @@
         <p:spPr>
           <a:xfrm>
             <a:off x="838080" y="1825560"/>
-            <a:ext cx="10514880" cy="4350600"/>
+            <a:ext cx="10514520" cy="4350240"/>
           </a:xfrm>
           <a:prstGeom prst="rect">
             <a:avLst/>
@@ -7079,7 +7166,7 @@
         <p:spPr>
           <a:xfrm>
             <a:off x="838080" y="365040"/>
-            <a:ext cx="10514880" cy="1324800"/>
+            <a:ext cx="10514520" cy="1324440"/>
           </a:xfrm>
           <a:prstGeom prst="rect">
             <a:avLst/>
@@ -7111,6 +7198,7 @@
                   <a:srgbClr val="808080"/>
                 </a:solidFill>
                 <a:latin typeface="Calibri Light"/>
+                <a:ea typeface="DejaVu Sans"/>
               </a:rPr>
               <a:t>2.1.Produtos e Serviços</a:t>
             </a:r>
@@ -7129,7 +7217,7 @@
         <p:spPr>
           <a:xfrm>
             <a:off x="838080" y="1825560"/>
-            <a:ext cx="5180760" cy="4350600"/>
+            <a:ext cx="5180400" cy="4350240"/>
           </a:xfrm>
           <a:prstGeom prst="rect">
             <a:avLst/>
@@ -7155,7 +7243,7 @@
         <p:spPr>
           <a:xfrm>
             <a:off x="6172200" y="1825560"/>
-            <a:ext cx="5180760" cy="4350600"/>
+            <a:ext cx="5180400" cy="4350240"/>
           </a:xfrm>
           <a:prstGeom prst="rect">
             <a:avLst/>
@@ -7211,7 +7299,7 @@
         <p:spPr>
           <a:xfrm>
             <a:off x="838080" y="365040"/>
-            <a:ext cx="10514880" cy="1324800"/>
+            <a:ext cx="10514520" cy="1324440"/>
           </a:xfrm>
           <a:prstGeom prst="rect">
             <a:avLst/>
@@ -7243,6 +7331,7 @@
                   <a:srgbClr val="808080"/>
                 </a:solidFill>
                 <a:latin typeface="Calibri Light"/>
+                <a:ea typeface="DejaVu Sans"/>
               </a:rPr>
               <a:t>3. Análise Estratégica</a:t>
             </a:r>
@@ -7261,7 +7350,7 @@
         <p:spPr>
           <a:xfrm>
             <a:off x="838080" y="1825560"/>
-            <a:ext cx="10514880" cy="4350600"/>
+            <a:ext cx="10514520" cy="4350240"/>
           </a:xfrm>
           <a:prstGeom prst="rect">
             <a:avLst/>
@@ -7317,7 +7406,7 @@
         <p:spPr>
           <a:xfrm>
             <a:off x="838080" y="365040"/>
-            <a:ext cx="10514880" cy="1324800"/>
+            <a:ext cx="10514520" cy="1324440"/>
           </a:xfrm>
           <a:prstGeom prst="rect">
             <a:avLst/>
@@ -7349,6 +7438,7 @@
                   <a:srgbClr val="808080"/>
                 </a:solidFill>
                 <a:latin typeface="Calibri Light"/>
+                <a:ea typeface="DejaVu Sans"/>
               </a:rPr>
               <a:t>3.2. Análise do mercado consumidor</a:t>
             </a:r>
@@ -7367,7 +7457,7 @@
         <p:spPr>
           <a:xfrm>
             <a:off x="838080" y="1825560"/>
-            <a:ext cx="10514880" cy="4350600"/>
+            <a:ext cx="10514520" cy="4350240"/>
           </a:xfrm>
           <a:prstGeom prst="rect">
             <a:avLst/>
@@ -7423,7 +7513,7 @@
         <p:spPr>
           <a:xfrm>
             <a:off x="838080" y="365040"/>
-            <a:ext cx="10514880" cy="1324800"/>
+            <a:ext cx="10514520" cy="1324440"/>
           </a:xfrm>
           <a:prstGeom prst="rect">
             <a:avLst/>
@@ -7455,6 +7545,7 @@
                   <a:srgbClr val="808080"/>
                 </a:solidFill>
                 <a:latin typeface="Calibri Light"/>
+                <a:ea typeface="DejaVu Sans"/>
               </a:rPr>
               <a:t>3.2. Análise de concorrência</a:t>
             </a:r>
@@ -7473,7 +7564,7 @@
         <p:spPr>
           <a:xfrm>
             <a:off x="838080" y="1825560"/>
-            <a:ext cx="10514880" cy="4350600"/>
+            <a:ext cx="10514520" cy="4350240"/>
           </a:xfrm>
           <a:prstGeom prst="rect">
             <a:avLst/>

</xml_diff>

<commit_message>
finalizado apresentacao da empresa
</commit_message>
<xml_diff>
--- a/plano-de-negocios-restaurante-tioto.pptx
+++ b/plano-de-negocios-restaurante-tioto.pptx
@@ -4128,7 +4128,7 @@
         <p:spPr>
           <a:xfrm>
             <a:off x="5441040" y="6062040"/>
-            <a:ext cx="1110960" cy="587520"/>
+            <a:ext cx="1110600" cy="587160"/>
           </a:xfrm>
           <a:prstGeom prst="rect">
             <a:avLst/>
@@ -4151,7 +4151,7 @@
         <p:spPr>
           <a:xfrm>
             <a:off x="609480" y="273600"/>
-            <a:ext cx="10972080" cy="1144440"/>
+            <a:ext cx="10972440" cy="1144800"/>
           </a:xfrm>
           <a:prstGeom prst="rect">
             <a:avLst/>
@@ -4164,12 +4164,12 @@
           <a:p>
             <a:pPr algn="ctr"/>
             <a:r>
-              <a:rPr b="0" lang="pt-BR" sz="1800" spc="-1" strike="noStrike">
+              <a:rPr b="0" lang="pt-BR" sz="4400" spc="-1" strike="noStrike">
                 <a:latin typeface="Arial"/>
               </a:rPr>
               <a:t>Clique para editar o formato do texto do título</a:t>
             </a:r>
-            <a:endParaRPr b="0" lang="pt-BR" sz="1800" spc="-1" strike="noStrike">
+            <a:endParaRPr b="0" lang="pt-BR" sz="4400" spc="-1" strike="noStrike">
               <a:latin typeface="Arial"/>
             </a:endParaRPr>
           </a:p>
@@ -4188,7 +4188,7 @@
         <p:spPr>
           <a:xfrm>
             <a:off x="609480" y="1604520"/>
-            <a:ext cx="10972080" cy="3976920"/>
+            <a:ext cx="10972440" cy="3977280"/>
           </a:xfrm>
           <a:prstGeom prst="rect">
             <a:avLst/>
@@ -4199,7 +4199,7 @@
             <a:normAutofit/>
           </a:bodyPr>
           <a:p>
-            <a:pPr marL="432000" indent="-324000" algn="ctr">
+            <a:pPr marL="432000" indent="-324000">
               <a:spcBef>
                 <a:spcPts val="1417"/>
               </a:spcBef>
@@ -4211,17 +4211,17 @@
               <a:buChar char=""/>
             </a:pPr>
             <a:r>
-              <a:rPr b="0" lang="pt-BR" sz="1800" spc="-1" strike="noStrike">
+              <a:rPr b="0" lang="pt-BR" sz="3200" spc="-1" strike="noStrike">
                 <a:latin typeface="Arial"/>
               </a:rPr>
               <a:t>Clique para editar o formato do texto da estrutura de tópicos</a:t>
             </a:r>
-            <a:endParaRPr b="0" lang="pt-BR" sz="1800" spc="-1" strike="noStrike">
-              <a:latin typeface="Arial"/>
-            </a:endParaRPr>
-          </a:p>
-          <a:p>
-            <a:pPr lvl="1" marL="864000" indent="-324000" algn="ctr">
+            <a:endParaRPr b="0" lang="pt-BR" sz="3200" spc="-1" strike="noStrike">
+              <a:latin typeface="Arial"/>
+            </a:endParaRPr>
+          </a:p>
+          <a:p>
+            <a:pPr lvl="1" marL="864000" indent="-324000">
               <a:spcBef>
                 <a:spcPts val="1134"/>
               </a:spcBef>
@@ -4233,17 +4233,17 @@
               <a:buChar char=""/>
             </a:pPr>
             <a:r>
-              <a:rPr b="0" lang="pt-BR" sz="1800" spc="-1" strike="noStrike">
+              <a:rPr b="0" lang="pt-BR" sz="2800" spc="-1" strike="noStrike">
                 <a:latin typeface="Arial"/>
               </a:rPr>
               <a:t>2.º nível da estrutura de tópicos</a:t>
             </a:r>
-            <a:endParaRPr b="0" lang="pt-BR" sz="1800" spc="-1" strike="noStrike">
-              <a:latin typeface="Arial"/>
-            </a:endParaRPr>
-          </a:p>
-          <a:p>
-            <a:pPr lvl="2" marL="1296000" indent="-288000" algn="ctr">
+            <a:endParaRPr b="0" lang="pt-BR" sz="2800" spc="-1" strike="noStrike">
+              <a:latin typeface="Arial"/>
+            </a:endParaRPr>
+          </a:p>
+          <a:p>
+            <a:pPr lvl="2" marL="1296000" indent="-288000">
               <a:spcBef>
                 <a:spcPts val="850"/>
               </a:spcBef>
@@ -4255,17 +4255,17 @@
               <a:buChar char=""/>
             </a:pPr>
             <a:r>
-              <a:rPr b="0" lang="pt-BR" sz="1800" spc="-1" strike="noStrike">
+              <a:rPr b="0" lang="pt-BR" sz="2400" spc="-1" strike="noStrike">
                 <a:latin typeface="Arial"/>
               </a:rPr>
               <a:t>3.º nível da estrutura de tópicos</a:t>
             </a:r>
-            <a:endParaRPr b="0" lang="pt-BR" sz="1800" spc="-1" strike="noStrike">
-              <a:latin typeface="Arial"/>
-            </a:endParaRPr>
-          </a:p>
-          <a:p>
-            <a:pPr lvl="3" marL="1728000" indent="-216000" algn="ctr">
+            <a:endParaRPr b="0" lang="pt-BR" sz="2400" spc="-1" strike="noStrike">
+              <a:latin typeface="Arial"/>
+            </a:endParaRPr>
+          </a:p>
+          <a:p>
+            <a:pPr lvl="3" marL="1728000" indent="-216000">
               <a:spcBef>
                 <a:spcPts val="567"/>
               </a:spcBef>
@@ -4277,17 +4277,17 @@
               <a:buChar char=""/>
             </a:pPr>
             <a:r>
-              <a:rPr b="0" lang="pt-BR" sz="1800" spc="-1" strike="noStrike">
+              <a:rPr b="0" lang="pt-BR" sz="2000" spc="-1" strike="noStrike">
                 <a:latin typeface="Arial"/>
               </a:rPr>
               <a:t>4.º nível da estrutura de tópicos</a:t>
             </a:r>
-            <a:endParaRPr b="0" lang="pt-BR" sz="1800" spc="-1" strike="noStrike">
-              <a:latin typeface="Arial"/>
-            </a:endParaRPr>
-          </a:p>
-          <a:p>
-            <a:pPr lvl="4" marL="2160000" indent="-216000" algn="ctr">
+            <a:endParaRPr b="0" lang="pt-BR" sz="2000" spc="-1" strike="noStrike">
+              <a:latin typeface="Arial"/>
+            </a:endParaRPr>
+          </a:p>
+          <a:p>
+            <a:pPr lvl="4" marL="2160000" indent="-216000">
               <a:spcBef>
                 <a:spcPts val="283"/>
               </a:spcBef>
@@ -4299,17 +4299,17 @@
               <a:buChar char=""/>
             </a:pPr>
             <a:r>
-              <a:rPr b="0" lang="pt-BR" sz="1800" spc="-1" strike="noStrike">
+              <a:rPr b="0" lang="pt-BR" sz="2000" spc="-1" strike="noStrike">
                 <a:latin typeface="Arial"/>
               </a:rPr>
               <a:t>5.º nível da estrutura de tópicos</a:t>
             </a:r>
-            <a:endParaRPr b="0" lang="pt-BR" sz="1800" spc="-1" strike="noStrike">
-              <a:latin typeface="Arial"/>
-            </a:endParaRPr>
-          </a:p>
-          <a:p>
-            <a:pPr lvl="5" marL="2592000" indent="-216000" algn="ctr">
+            <a:endParaRPr b="0" lang="pt-BR" sz="2000" spc="-1" strike="noStrike">
+              <a:latin typeface="Arial"/>
+            </a:endParaRPr>
+          </a:p>
+          <a:p>
+            <a:pPr lvl="5" marL="2592000" indent="-216000">
               <a:spcBef>
                 <a:spcPts val="283"/>
               </a:spcBef>
@@ -4321,17 +4321,17 @@
               <a:buChar char=""/>
             </a:pPr>
             <a:r>
-              <a:rPr b="0" lang="pt-BR" sz="1800" spc="-1" strike="noStrike">
+              <a:rPr b="0" lang="pt-BR" sz="2000" spc="-1" strike="noStrike">
                 <a:latin typeface="Arial"/>
               </a:rPr>
               <a:t>6.º nível da estrutura de tópicos</a:t>
             </a:r>
-            <a:endParaRPr b="0" lang="pt-BR" sz="1800" spc="-1" strike="noStrike">
-              <a:latin typeface="Arial"/>
-            </a:endParaRPr>
-          </a:p>
-          <a:p>
-            <a:pPr lvl="6" marL="3024000" indent="-216000" algn="ctr">
+            <a:endParaRPr b="0" lang="pt-BR" sz="2000" spc="-1" strike="noStrike">
+              <a:latin typeface="Arial"/>
+            </a:endParaRPr>
+          </a:p>
+          <a:p>
+            <a:pPr lvl="6" marL="3024000" indent="-216000">
               <a:spcBef>
                 <a:spcPts val="283"/>
               </a:spcBef>
@@ -4343,12 +4343,12 @@
               <a:buChar char=""/>
             </a:pPr>
             <a:r>
-              <a:rPr b="0" lang="pt-BR" sz="1800" spc="-1" strike="noStrike">
+              <a:rPr b="0" lang="pt-BR" sz="2000" spc="-1" strike="noStrike">
                 <a:latin typeface="Arial"/>
               </a:rPr>
               <a:t>7.º nível da estrutura de tópicos</a:t>
             </a:r>
-            <a:endParaRPr b="0" lang="pt-BR" sz="1800" spc="-1" strike="noStrike">
+            <a:endParaRPr b="0" lang="pt-BR" sz="2000" spc="-1" strike="noStrike">
               <a:latin typeface="Arial"/>
             </a:endParaRPr>
           </a:p>
@@ -4411,7 +4411,7 @@
         <p:spPr>
           <a:xfrm>
             <a:off x="5540040" y="6176880"/>
-            <a:ext cx="1110960" cy="587520"/>
+            <a:ext cx="1110600" cy="587160"/>
           </a:xfrm>
           <a:prstGeom prst="rect">
             <a:avLst/>
@@ -4694,7 +4694,7 @@
         <p:spPr>
           <a:xfrm>
             <a:off x="5540040" y="6132960"/>
-            <a:ext cx="1110960" cy="587520"/>
+            <a:ext cx="1110600" cy="587160"/>
           </a:xfrm>
           <a:prstGeom prst="rect">
             <a:avLst/>
@@ -5145,7 +5145,7 @@
         <p:spPr>
           <a:xfrm>
             <a:off x="1523880" y="523800"/>
-            <a:ext cx="9142920" cy="2386440"/>
+            <a:ext cx="9142560" cy="2386080"/>
           </a:xfrm>
           <a:prstGeom prst="rect">
             <a:avLst/>
@@ -5196,7 +5196,7 @@
         <p:spPr>
           <a:xfrm>
             <a:off x="1523880" y="3003480"/>
-            <a:ext cx="9142920" cy="2240640"/>
+            <a:ext cx="9142560" cy="2240280"/>
           </a:xfrm>
           <a:prstGeom prst="rect">
             <a:avLst/>
@@ -5339,7 +5339,7 @@
         <p:spPr>
           <a:xfrm>
             <a:off x="838080" y="365040"/>
-            <a:ext cx="10514520" cy="1324440"/>
+            <a:ext cx="10514160" cy="1324080"/>
           </a:xfrm>
           <a:prstGeom prst="rect">
             <a:avLst/>
@@ -5390,7 +5390,7 @@
         <p:spPr>
           <a:xfrm>
             <a:off x="838080" y="1825560"/>
-            <a:ext cx="10514520" cy="4350240"/>
+            <a:ext cx="10514160" cy="4349880"/>
           </a:xfrm>
           <a:prstGeom prst="rect">
             <a:avLst/>
@@ -5446,7 +5446,7 @@
         <p:spPr>
           <a:xfrm>
             <a:off x="838080" y="365040"/>
-            <a:ext cx="10514520" cy="1324440"/>
+            <a:ext cx="10514160" cy="1324080"/>
           </a:xfrm>
           <a:prstGeom prst="rect">
             <a:avLst/>
@@ -5497,7 +5497,7 @@
         <p:spPr>
           <a:xfrm>
             <a:off x="838080" y="1689480"/>
-            <a:ext cx="10514520" cy="4486320"/>
+            <a:ext cx="10514160" cy="4485960"/>
           </a:xfrm>
           <a:prstGeom prst="rect">
             <a:avLst/>
@@ -5534,17 +5534,7 @@
                 <a:latin typeface="Times New Roman"/>
                 <a:ea typeface="DejaVu Sans"/>
               </a:rPr>
-              <a:t>O restaurante será aberto na cidade histórica de Diamantina – MG, onde antes da pandemia existia um fluxo constante de turistas, turismo com forte caráter cultural (</a:t>
-            </a:r>
-            <a:r>
-              <a:rPr b="0" lang="pt-BR" sz="2000" spc="-1" strike="noStrike">
-                <a:solidFill>
-                  <a:srgbClr val="000000"/>
-                </a:solidFill>
-                <a:latin typeface="Times New Roman"/>
-                <a:ea typeface="DejaVu Sans"/>
-              </a:rPr>
-              <a:t>UFVJM, p. 11 e p. 19, 2012). Outro fato de grande importância para cidade, foi que em 1999 ela foi reconhecida pela UNESCO como Patrimônio Cultural da Humanidade. De acordo com a Secretaria de Estado de Cultura e Turismo do Estado de Minas Gerais, Diamantina é conhecida como um dos principais destinos da </a:t>
+              <a:t>O restaurante será aberto na cidade histórica de Diamantina – MG, onde antes da pandemia existia um fluxo constante de turistas, turismo com forte caráter cultural (UFVJM, p. 11 e p. 19, 2012). Outro fato de grande importância para cidade e para o turismo, foi que em 1999 a cidade foi reconhecida pela UNESCO como Patrimônio Cultural da Humanidade. De acordo com a Secretaria de Estado de Cultura e Turismo do Estado de Minas Gerais, Diamantina é conhecida como um dos principais destinos da </a:t>
             </a:r>
             <a:r>
               <a:rPr b="1" lang="pt-BR" sz="2000" spc="-1" strike="noStrike">
@@ -5631,7 +5621,7 @@
         <p:spPr>
           <a:xfrm>
             <a:off x="838080" y="365040"/>
-            <a:ext cx="10514520" cy="1324440"/>
+            <a:ext cx="10514160" cy="1324080"/>
           </a:xfrm>
           <a:prstGeom prst="rect">
             <a:avLst/>
@@ -5675,14 +5665,14 @@
       </p:sp>
       <p:sp>
         <p:nvSpPr>
-          <p:cNvPr id="123" name="TextShape 2"/>
-          <p:cNvSpPr txBox="1"/>
+          <p:cNvPr id="123" name="CustomShape 2"/>
+          <p:cNvSpPr/>
           <p:nvPr/>
         </p:nvSpPr>
         <p:spPr>
           <a:xfrm>
             <a:off x="360000" y="1689480"/>
-            <a:ext cx="11520000" cy="2414520"/>
+            <a:ext cx="11519640" cy="2414160"/>
           </a:xfrm>
           <a:prstGeom prst="rect">
             <a:avLst/>
@@ -5692,12 +5682,22 @@
             <a:noFill/>
           </a:ln>
         </p:spPr>
+        <p:style>
+          <a:lnRef idx="0"/>
+          <a:fillRef idx="0"/>
+          <a:effectRef idx="0"/>
+          <a:fontRef idx="minor"/>
+        </p:style>
         <p:txBody>
           <a:bodyPr lIns="90000" rIns="90000" tIns="45000" bIns="45000">
             <a:noAutofit/>
           </a:bodyPr>
           <a:p>
-            <a:pPr algn="just"/>
+            <a:pPr algn="just">
+              <a:lnSpc>
+                <a:spcPct val="100000"/>
+              </a:lnSpc>
+            </a:pPr>
             <a:r>
               <a:rPr b="0" lang="pt-BR" sz="2000" spc="-1" strike="noStrike">
                 <a:solidFill>
@@ -5706,14 +5706,18 @@
                 <a:latin typeface="Times New Roman"/>
                 <a:ea typeface="DejaVu Sans"/>
               </a:rPr>
-              <a:t>A proposta do bar e restaurante é servir tira-gosto e  pratos quentes, onde em sua composição, haverão produtos regionais e a predominância da carne de  porco, que é muito apreciada e utilizada na culinária local. O diferencial gastronômico, serão os embutidos artesanais (linguiças, salames e salsichas) que serão produzidas pelo próprio estabelecimento. </a:t>
+              <a:t>A proposta do bar e restaurante é servir tira-gosto e  pratos quentes, onde em sua composição, haverão produtos regionais e as carnes mais utilizadas serão o porco e o frango, visto que estas são as mais utilizadas na região, e muito apreciada na culinária local. O diferencial gastronômico, serão os embutidos artesanais (linguiças, salames e salsichas) que serão produzidas pelo próprio estabelecimento. </a:t>
             </a:r>
             <a:endParaRPr b="0" lang="pt-BR" sz="2000" spc="-1" strike="noStrike">
               <a:latin typeface="Arial"/>
             </a:endParaRPr>
           </a:p>
           <a:p>
-            <a:pPr algn="just"/>
+            <a:pPr algn="just">
+              <a:lnSpc>
+                <a:spcPct val="100000"/>
+              </a:lnSpc>
+            </a:pPr>
             <a:r>
               <a:rPr b="0" lang="pt-BR" sz="2000" spc="-1" strike="noStrike">
                 <a:solidFill>
@@ -5722,14 +5726,18 @@
                 <a:latin typeface="Times New Roman"/>
                 <a:ea typeface="DejaVu Sans"/>
               </a:rPr>
-              <a:t>Nosso público-alvo serão pessoas da faixa etária de 25 a 50 anos, turistas ou nativos predominantemente famílias e ou casais. </a:t>
+              <a:t>As bebidas servidas serão sucos com frutas regionais, cachaças de produtores locais e cervejas artesanais de produtores locais e das principais marcas mineiras.</a:t>
             </a:r>
             <a:endParaRPr b="0" lang="pt-BR" sz="2000" spc="-1" strike="noStrike">
               <a:latin typeface="Arial"/>
             </a:endParaRPr>
           </a:p>
           <a:p>
-            <a:pPr algn="just"/>
+            <a:pPr algn="just">
+              <a:lnSpc>
+                <a:spcPct val="100000"/>
+              </a:lnSpc>
+            </a:pPr>
             <a:r>
               <a:rPr b="0" lang="pt-BR" sz="2000" spc="-1" strike="noStrike">
                 <a:solidFill>
@@ -5738,8 +5746,168 @@
                 <a:latin typeface="Times New Roman"/>
                 <a:ea typeface="DejaVu Sans"/>
               </a:rPr>
-              <a:t>Os produtores locais e agricultura familiar, serão nossos principais parceiros para a aquisição de produtos utilizados na confecção dos pratos.</a:t>
-            </a:r>
+              <a:t>Nosso público-alvo serão pessoas da faixa etária de 25 a 50 anos, turistas ou nativos predominantemente famílias e ou casais. </a:t>
+            </a:r>
+            <a:endParaRPr b="0" lang="pt-BR" sz="2000" spc="-1" strike="noStrike">
+              <a:latin typeface="Arial"/>
+            </a:endParaRPr>
+          </a:p>
+          <a:p>
+            <a:pPr algn="just">
+              <a:lnSpc>
+                <a:spcPct val="100000"/>
+              </a:lnSpc>
+            </a:pPr>
+            <a:r>
+              <a:rPr b="0" lang="pt-BR" sz="2000" spc="-1" strike="noStrike">
+                <a:solidFill>
+                  <a:srgbClr val="000000"/>
+                </a:solidFill>
+                <a:latin typeface="Times New Roman"/>
+                <a:ea typeface="DejaVu Sans"/>
+              </a:rPr>
+              <a:t>Os produtores locais e da agricultura familiar, serão nossos principais parceiros para a aquisição de produtos utilizados na confecção dos pratos.</a:t>
+            </a:r>
+            <a:endParaRPr b="0" lang="pt-BR" sz="2000" spc="-1" strike="noStrike">
+              <a:latin typeface="Arial"/>
+            </a:endParaRPr>
+          </a:p>
+          <a:p>
+            <a:pPr algn="just">
+              <a:lnSpc>
+                <a:spcPct val="100000"/>
+              </a:lnSpc>
+            </a:pPr>
+            <a:r>
+              <a:rPr b="0" lang="pt-BR" sz="2000" spc="-1" strike="noStrike">
+                <a:solidFill>
+                  <a:srgbClr val="000000"/>
+                </a:solidFill>
+                <a:latin typeface="Times New Roman"/>
+                <a:ea typeface="DejaVu Sans"/>
+              </a:rPr>
+              <a:t>Todas as sobras, restos e lixo do restaurante serão separados para que possa haver seu aproveitamento e destino sustentável.</a:t>
+            </a:r>
+            <a:endParaRPr b="0" lang="pt-BR" sz="2000" spc="-1" strike="noStrike">
+              <a:latin typeface="Arial"/>
+            </a:endParaRPr>
+          </a:p>
+          <a:p>
+            <a:pPr marL="216000" indent="-216000" algn="just">
+              <a:lnSpc>
+                <a:spcPct val="100000"/>
+              </a:lnSpc>
+              <a:buClr>
+                <a:srgbClr val="000000"/>
+              </a:buClr>
+              <a:buFont typeface="Symbol" charset="2"/>
+              <a:buChar char=""/>
+            </a:pPr>
+            <a:r>
+              <a:rPr b="0" lang="pt-BR" sz="2000" spc="-1" strike="noStrike">
+                <a:solidFill>
+                  <a:srgbClr val="000000"/>
+                </a:solidFill>
+                <a:latin typeface="Times New Roman"/>
+                <a:ea typeface="DejaVu Sans"/>
+              </a:rPr>
+              <a:t>consumo humano, serão enviadas a asilos da cidade</a:t>
+            </a:r>
+            <a:endParaRPr b="0" lang="pt-BR" sz="2000" spc="-1" strike="noStrike">
+              <a:latin typeface="Arial"/>
+            </a:endParaRPr>
+          </a:p>
+          <a:p>
+            <a:pPr marL="216000" indent="-216000" algn="just">
+              <a:lnSpc>
+                <a:spcPct val="100000"/>
+              </a:lnSpc>
+              <a:buClr>
+                <a:srgbClr val="000000"/>
+              </a:buClr>
+              <a:buFont typeface="Symbol" charset="2"/>
+              <a:buChar char=""/>
+            </a:pPr>
+            <a:r>
+              <a:rPr b="0" lang="pt-BR" sz="2000" spc="-1" strike="noStrike">
+                <a:solidFill>
+                  <a:srgbClr val="000000"/>
+                </a:solidFill>
+                <a:latin typeface="Times New Roman"/>
+                <a:ea typeface="DejaVu Sans"/>
+              </a:rPr>
+              <a:t>consumo animal, serão enviadas a produtores rurais parceiros para a engorda de porcos. </a:t>
+            </a:r>
+            <a:endParaRPr b="0" lang="pt-BR" sz="2000" spc="-1" strike="noStrike">
+              <a:latin typeface="Arial"/>
+            </a:endParaRPr>
+          </a:p>
+          <a:p>
+            <a:pPr marL="216000" indent="-216000" algn="just">
+              <a:lnSpc>
+                <a:spcPct val="100000"/>
+              </a:lnSpc>
+              <a:buClr>
+                <a:srgbClr val="000000"/>
+              </a:buClr>
+              <a:buFont typeface="Symbol" charset="2"/>
+              <a:buChar char=""/>
+            </a:pPr>
+            <a:r>
+              <a:rPr b="0" lang="pt-BR" sz="2000" spc="-1" strike="noStrike">
+                <a:solidFill>
+                  <a:srgbClr val="000000"/>
+                </a:solidFill>
+                <a:latin typeface="Times New Roman"/>
+                <a:ea typeface="DejaVu Sans"/>
+              </a:rPr>
+              <a:t>separação de plásticos, latas e utensílios descartados </a:t>
+            </a:r>
+            <a:endParaRPr b="0" lang="pt-BR" sz="2000" spc="-1" strike="noStrike">
+              <a:latin typeface="Arial"/>
+            </a:endParaRPr>
+          </a:p>
+          <a:p>
+            <a:pPr marL="216000" indent="-216000" algn="just">
+              <a:lnSpc>
+                <a:spcPct val="100000"/>
+              </a:lnSpc>
+              <a:buClr>
+                <a:srgbClr val="000000"/>
+              </a:buClr>
+              <a:buFont typeface="Symbol" charset="2"/>
+              <a:buChar char=""/>
+            </a:pPr>
+            <a:r>
+              <a:rPr b="0" lang="pt-BR" sz="2000" spc="-1" strike="noStrike">
+                <a:solidFill>
+                  <a:srgbClr val="000000"/>
+                </a:solidFill>
+                <a:latin typeface="Times New Roman"/>
+                <a:ea typeface="DejaVu Sans"/>
+              </a:rPr>
+              <a:t>compostagem para geração de adubo orgânico</a:t>
+            </a:r>
+            <a:endParaRPr b="0" lang="pt-BR" sz="2000" spc="-1" strike="noStrike">
+              <a:latin typeface="Arial"/>
+            </a:endParaRPr>
+          </a:p>
+          <a:p>
+            <a:pPr algn="just">
+              <a:lnSpc>
+                <a:spcPct val="100000"/>
+              </a:lnSpc>
+            </a:pPr>
+            <a:endParaRPr b="0" lang="pt-BR" sz="2000" spc="-1" strike="noStrike">
+              <a:latin typeface="Arial"/>
+            </a:endParaRPr>
+          </a:p>
+          <a:p>
+            <a:pPr algn="just">
+              <a:lnSpc>
+                <a:spcPct val="100000"/>
+              </a:lnSpc>
+            </a:pPr>
             <a:endParaRPr b="0" lang="pt-BR" sz="2000" spc="-1" strike="noStrike">
               <a:latin typeface="Arial"/>
             </a:endParaRPr>
@@ -5785,7 +5953,7 @@
         <p:spPr>
           <a:xfrm>
             <a:off x="838080" y="365040"/>
-            <a:ext cx="10514520" cy="606240"/>
+            <a:ext cx="10514160" cy="605880"/>
           </a:xfrm>
           <a:prstGeom prst="rect">
             <a:avLst/>
@@ -5836,7 +6004,7 @@
         <p:spPr>
           <a:xfrm>
             <a:off x="9156600" y="1102680"/>
-            <a:ext cx="2196000" cy="3554640"/>
+            <a:ext cx="2195640" cy="3554280"/>
           </a:xfrm>
           <a:prstGeom prst="rect">
             <a:avLst/>
@@ -6077,7 +6245,7 @@
         <p:spPr>
           <a:xfrm>
             <a:off x="2764440" y="2878200"/>
-            <a:ext cx="2090520" cy="1779120"/>
+            <a:ext cx="2090160" cy="1778760"/>
           </a:xfrm>
           <a:prstGeom prst="rect">
             <a:avLst/>
@@ -6230,7 +6398,7 @@
         <p:spPr>
           <a:xfrm>
             <a:off x="4929120" y="1102680"/>
-            <a:ext cx="2002680" cy="4973040"/>
+            <a:ext cx="2002320" cy="4972680"/>
           </a:xfrm>
           <a:prstGeom prst="rect">
             <a:avLst/>
@@ -6474,7 +6642,7 @@
         <p:spPr>
           <a:xfrm>
             <a:off x="7007040" y="1102680"/>
-            <a:ext cx="2075760" cy="1735200"/>
+            <a:ext cx="2075400" cy="1734840"/>
           </a:xfrm>
           <a:prstGeom prst="rect">
             <a:avLst/>
@@ -6622,7 +6790,7 @@
         <p:spPr>
           <a:xfrm>
             <a:off x="766800" y="1103400"/>
-            <a:ext cx="1937520" cy="3553920"/>
+            <a:ext cx="1937160" cy="3553560"/>
           </a:xfrm>
           <a:prstGeom prst="rect">
             <a:avLst/>
@@ -6843,7 +7011,7 @@
         <p:spPr>
           <a:xfrm>
             <a:off x="766800" y="4708440"/>
-            <a:ext cx="4088520" cy="1366920"/>
+            <a:ext cx="4088160" cy="1366560"/>
           </a:xfrm>
           <a:prstGeom prst="rect">
             <a:avLst/>
@@ -6991,7 +7159,7 @@
         <p:spPr>
           <a:xfrm>
             <a:off x="7007040" y="2889000"/>
-            <a:ext cx="2079720" cy="1768320"/>
+            <a:ext cx="2079360" cy="1767960"/>
           </a:xfrm>
           <a:prstGeom prst="rect">
             <a:avLst/>
@@ -7145,7 +7313,7 @@
         <p:spPr>
           <a:xfrm>
             <a:off x="7007040" y="4708440"/>
-            <a:ext cx="4345560" cy="1352160"/>
+            <a:ext cx="4345200" cy="1351800"/>
           </a:xfrm>
           <a:prstGeom prst="rect">
             <a:avLst/>
@@ -7258,7 +7426,7 @@
         <p:spPr>
           <a:xfrm>
             <a:off x="2764440" y="1102680"/>
-            <a:ext cx="2093760" cy="1735200"/>
+            <a:ext cx="2093400" cy="1734840"/>
           </a:xfrm>
           <a:prstGeom prst="rect">
             <a:avLst/>
@@ -7439,7 +7607,7 @@
         <p:spPr>
           <a:xfrm>
             <a:off x="838080" y="365040"/>
-            <a:ext cx="10514520" cy="1324440"/>
+            <a:ext cx="10514160" cy="1324080"/>
           </a:xfrm>
           <a:prstGeom prst="rect">
             <a:avLst/>
@@ -7490,7 +7658,7 @@
         <p:spPr>
           <a:xfrm>
             <a:off x="838080" y="1825560"/>
-            <a:ext cx="10514520" cy="4350240"/>
+            <a:ext cx="10514160" cy="4349880"/>
           </a:xfrm>
           <a:prstGeom prst="rect">
             <a:avLst/>
@@ -7511,10 +7679,14 @@
   </p:cSld>
   <mc:AlternateContent>
     <mc:Choice Requires="p14">
-      <p:transition spd="slow" p14:dur="2000"/>
+      <p:transition spd="slow" p14:dur="2000">
+        <p:wheel spokes="1"/>
+      </p:transition>
     </mc:Choice>
     <mc:Fallback>
-      <p:transition spd="slow"/>
+      <p:transition spd="slow">
+        <p:wheel spokes="1"/>
+      </p:transition>
     </mc:Fallback>
   </mc:AlternateContent>
 </p:sld>
@@ -7546,7 +7718,7 @@
         <p:spPr>
           <a:xfrm>
             <a:off x="838080" y="365040"/>
-            <a:ext cx="10514520" cy="1324440"/>
+            <a:ext cx="10514160" cy="1324080"/>
           </a:xfrm>
           <a:prstGeom prst="rect">
             <a:avLst/>
@@ -7597,7 +7769,7 @@
         <p:spPr>
           <a:xfrm>
             <a:off x="838080" y="1825560"/>
-            <a:ext cx="5180400" cy="4350240"/>
+            <a:ext cx="5180040" cy="4349880"/>
           </a:xfrm>
           <a:prstGeom prst="rect">
             <a:avLst/>
@@ -7623,7 +7795,7 @@
         <p:spPr>
           <a:xfrm>
             <a:off x="6172200" y="1825560"/>
-            <a:ext cx="5180400" cy="4350240"/>
+            <a:ext cx="5180040" cy="4349880"/>
           </a:xfrm>
           <a:prstGeom prst="rect">
             <a:avLst/>
@@ -7679,7 +7851,7 @@
         <p:spPr>
           <a:xfrm>
             <a:off x="838080" y="365040"/>
-            <a:ext cx="10514520" cy="1324440"/>
+            <a:ext cx="10514160" cy="1324080"/>
           </a:xfrm>
           <a:prstGeom prst="rect">
             <a:avLst/>
@@ -7730,7 +7902,7 @@
         <p:spPr>
           <a:xfrm>
             <a:off x="838080" y="1825560"/>
-            <a:ext cx="10514520" cy="4350240"/>
+            <a:ext cx="10514160" cy="4349880"/>
           </a:xfrm>
           <a:prstGeom prst="rect">
             <a:avLst/>
@@ -7786,7 +7958,7 @@
         <p:spPr>
           <a:xfrm>
             <a:off x="838080" y="365040"/>
-            <a:ext cx="10514520" cy="1324440"/>
+            <a:ext cx="10514160" cy="1324080"/>
           </a:xfrm>
           <a:prstGeom prst="rect">
             <a:avLst/>
@@ -7837,7 +8009,7 @@
         <p:spPr>
           <a:xfrm>
             <a:off x="838080" y="1825560"/>
-            <a:ext cx="10514520" cy="4350240"/>
+            <a:ext cx="10514160" cy="4349880"/>
           </a:xfrm>
           <a:prstGeom prst="rect">
             <a:avLst/>
@@ -7893,7 +8065,7 @@
         <p:spPr>
           <a:xfrm>
             <a:off x="838080" y="365040"/>
-            <a:ext cx="10514520" cy="1324440"/>
+            <a:ext cx="10514160" cy="1324080"/>
           </a:xfrm>
           <a:prstGeom prst="rect">
             <a:avLst/>
@@ -7944,7 +8116,7 @@
         <p:spPr>
           <a:xfrm>
             <a:off x="838080" y="1825560"/>
-            <a:ext cx="10514520" cy="4350240"/>
+            <a:ext cx="10514160" cy="4349880"/>
           </a:xfrm>
           <a:prstGeom prst="rect">
             <a:avLst/>

</xml_diff>

<commit_message>
finalizado produtos e servicos
</commit_message>
<xml_diff>
--- a/plano-de-negocios-restaurante-tioto.pptx
+++ b/plano-de-negocios-restaurante-tioto.pptx
@@ -4128,7 +4128,7 @@
         <p:spPr>
           <a:xfrm>
             <a:off x="5441040" y="6062040"/>
-            <a:ext cx="1110600" cy="587160"/>
+            <a:ext cx="1110240" cy="586800"/>
           </a:xfrm>
           <a:prstGeom prst="rect">
             <a:avLst/>
@@ -4411,7 +4411,7 @@
         <p:spPr>
           <a:xfrm>
             <a:off x="5540040" y="6176880"/>
-            <a:ext cx="1110600" cy="587160"/>
+            <a:ext cx="1110240" cy="586800"/>
           </a:xfrm>
           <a:prstGeom prst="rect">
             <a:avLst/>
@@ -4694,7 +4694,7 @@
         <p:spPr>
           <a:xfrm>
             <a:off x="5540040" y="6132960"/>
-            <a:ext cx="1110600" cy="587160"/>
+            <a:ext cx="1110240" cy="586800"/>
           </a:xfrm>
           <a:prstGeom prst="rect">
             <a:avLst/>
@@ -5145,7 +5145,7 @@
         <p:spPr>
           <a:xfrm>
             <a:off x="1523880" y="523800"/>
-            <a:ext cx="9142560" cy="2386080"/>
+            <a:ext cx="9142200" cy="2385720"/>
           </a:xfrm>
           <a:prstGeom prst="rect">
             <a:avLst/>
@@ -5196,7 +5196,7 @@
         <p:spPr>
           <a:xfrm>
             <a:off x="1523880" y="3003480"/>
-            <a:ext cx="9142560" cy="2240280"/>
+            <a:ext cx="9142200" cy="2239920"/>
           </a:xfrm>
           <a:prstGeom prst="rect">
             <a:avLst/>
@@ -5339,7 +5339,7 @@
         <p:spPr>
           <a:xfrm>
             <a:off x="838080" y="365040"/>
-            <a:ext cx="10514160" cy="1324080"/>
+            <a:ext cx="10513800" cy="1323720"/>
           </a:xfrm>
           <a:prstGeom prst="rect">
             <a:avLst/>
@@ -5390,7 +5390,7 @@
         <p:spPr>
           <a:xfrm>
             <a:off x="838080" y="1825560"/>
-            <a:ext cx="10514160" cy="4349880"/>
+            <a:ext cx="10513800" cy="4349520"/>
           </a:xfrm>
           <a:prstGeom prst="rect">
             <a:avLst/>
@@ -5446,7 +5446,7 @@
         <p:spPr>
           <a:xfrm>
             <a:off x="838080" y="365040"/>
-            <a:ext cx="10514160" cy="1324080"/>
+            <a:ext cx="10513800" cy="1323720"/>
           </a:xfrm>
           <a:prstGeom prst="rect">
             <a:avLst/>
@@ -5497,7 +5497,7 @@
         <p:spPr>
           <a:xfrm>
             <a:off x="838080" y="1689480"/>
-            <a:ext cx="10514160" cy="4485960"/>
+            <a:ext cx="10513800" cy="4485600"/>
           </a:xfrm>
           <a:prstGeom prst="rect">
             <a:avLst/>
@@ -5621,7 +5621,7 @@
         <p:spPr>
           <a:xfrm>
             <a:off x="838080" y="365040"/>
-            <a:ext cx="10514160" cy="1324080"/>
+            <a:ext cx="10513800" cy="1323720"/>
           </a:xfrm>
           <a:prstGeom prst="rect">
             <a:avLst/>
@@ -5671,8 +5671,8 @@
         </p:nvSpPr>
         <p:spPr>
           <a:xfrm>
-            <a:off x="360000" y="1689480"/>
-            <a:ext cx="11519640" cy="2414160"/>
+            <a:off x="360000" y="1499040"/>
+            <a:ext cx="11519280" cy="2413800"/>
           </a:xfrm>
           <a:prstGeom prst="rect">
             <a:avLst/>
@@ -5706,7 +5706,7 @@
                 <a:latin typeface="Times New Roman"/>
                 <a:ea typeface="DejaVu Sans"/>
               </a:rPr>
-              <a:t>A proposta do bar e restaurante é servir tira-gosto e  pratos quentes, onde em sua composição, haverão produtos regionais e as carnes mais utilizadas serão o porco e o frango, visto que estas são as mais utilizadas na região, e muito apreciada na culinária local. O diferencial gastronômico, serão os embutidos artesanais (linguiças, salames e salsichas) que serão produzidas pelo próprio estabelecimento. </a:t>
+              <a:t>A proposta do bar e restaurante é servir tira-gosto e  pratos quentes, onde em sua composição, haverão produtos regionais e as carnes mais utilizadas serão o porco e o frango caipira, pois estas são as carnes mais utilizadas e muito apreciada na culinária local. O diferencial gastronômico, serão os embutidos artesanais (linguiças, salames e salsichas) que serão produzidas pelo próprio estabelecimento. </a:t>
             </a:r>
             <a:endParaRPr b="0" lang="pt-BR" sz="2000" spc="-1" strike="noStrike">
               <a:latin typeface="Arial"/>
@@ -5793,14 +5793,14 @@
             </a:endParaRPr>
           </a:p>
           <a:p>
-            <a:pPr marL="216000" indent="-216000" algn="just">
+            <a:pPr marL="216000" indent="-215640" algn="just">
               <a:lnSpc>
                 <a:spcPct val="100000"/>
               </a:lnSpc>
               <a:buClr>
                 <a:srgbClr val="000000"/>
               </a:buClr>
-              <a:buFont typeface="Symbol" charset="2"/>
+              <a:buFont typeface="Symbol"/>
               <a:buChar char=""/>
             </a:pPr>
             <a:r>
@@ -5818,14 +5818,14 @@
             </a:endParaRPr>
           </a:p>
           <a:p>
-            <a:pPr marL="216000" indent="-216000" algn="just">
+            <a:pPr marL="216000" indent="-215640" algn="just">
               <a:lnSpc>
                 <a:spcPct val="100000"/>
               </a:lnSpc>
               <a:buClr>
                 <a:srgbClr val="000000"/>
               </a:buClr>
-              <a:buFont typeface="Symbol" charset="2"/>
+              <a:buFont typeface="Symbol"/>
               <a:buChar char=""/>
             </a:pPr>
             <a:r>
@@ -5843,14 +5843,14 @@
             </a:endParaRPr>
           </a:p>
           <a:p>
-            <a:pPr marL="216000" indent="-216000" algn="just">
+            <a:pPr marL="216000" indent="-215640" algn="just">
               <a:lnSpc>
                 <a:spcPct val="100000"/>
               </a:lnSpc>
               <a:buClr>
                 <a:srgbClr val="000000"/>
               </a:buClr>
-              <a:buFont typeface="Symbol" charset="2"/>
+              <a:buFont typeface="Symbol"/>
               <a:buChar char=""/>
             </a:pPr>
             <a:r>
@@ -5861,21 +5861,21 @@
                 <a:latin typeface="Times New Roman"/>
                 <a:ea typeface="DejaVu Sans"/>
               </a:rPr>
-              <a:t>separação de plásticos, latas e utensílios descartados </a:t>
+              <a:t>separação de plásticos, latas e utensílios descartados para reciclagem.</a:t>
             </a:r>
             <a:endParaRPr b="0" lang="pt-BR" sz="2000" spc="-1" strike="noStrike">
               <a:latin typeface="Arial"/>
             </a:endParaRPr>
           </a:p>
           <a:p>
-            <a:pPr marL="216000" indent="-216000" algn="just">
+            <a:pPr marL="216000" indent="-215640" algn="just">
               <a:lnSpc>
                 <a:spcPct val="100000"/>
               </a:lnSpc>
               <a:buClr>
                 <a:srgbClr val="000000"/>
               </a:buClr>
-              <a:buFont typeface="Symbol" charset="2"/>
+              <a:buFont typeface="Symbol"/>
               <a:buChar char=""/>
             </a:pPr>
             <a:r>
@@ -5953,7 +5953,7 @@
         <p:spPr>
           <a:xfrm>
             <a:off x="838080" y="365040"/>
-            <a:ext cx="10514160" cy="605880"/>
+            <a:ext cx="10513800" cy="605520"/>
           </a:xfrm>
           <a:prstGeom prst="rect">
             <a:avLst/>
@@ -6004,7 +6004,7 @@
         <p:spPr>
           <a:xfrm>
             <a:off x="9156600" y="1102680"/>
-            <a:ext cx="2195640" cy="3554280"/>
+            <a:ext cx="2195280" cy="3553920"/>
           </a:xfrm>
           <a:prstGeom prst="rect">
             <a:avLst/>
@@ -6245,7 +6245,7 @@
         <p:spPr>
           <a:xfrm>
             <a:off x="2764440" y="2878200"/>
-            <a:ext cx="2090160" cy="1778760"/>
+            <a:ext cx="2089800" cy="1778400"/>
           </a:xfrm>
           <a:prstGeom prst="rect">
             <a:avLst/>
@@ -6398,7 +6398,7 @@
         <p:spPr>
           <a:xfrm>
             <a:off x="4929120" y="1102680"/>
-            <a:ext cx="2002320" cy="4972680"/>
+            <a:ext cx="2001960" cy="4972320"/>
           </a:xfrm>
           <a:prstGeom prst="rect">
             <a:avLst/>
@@ -6642,7 +6642,7 @@
         <p:spPr>
           <a:xfrm>
             <a:off x="7007040" y="1102680"/>
-            <a:ext cx="2075400" cy="1734840"/>
+            <a:ext cx="2075040" cy="1734480"/>
           </a:xfrm>
           <a:prstGeom prst="rect">
             <a:avLst/>
@@ -6790,7 +6790,7 @@
         <p:spPr>
           <a:xfrm>
             <a:off x="766800" y="1103400"/>
-            <a:ext cx="1937160" cy="3553560"/>
+            <a:ext cx="1936800" cy="3553200"/>
           </a:xfrm>
           <a:prstGeom prst="rect">
             <a:avLst/>
@@ -7011,7 +7011,7 @@
         <p:spPr>
           <a:xfrm>
             <a:off x="766800" y="4708440"/>
-            <a:ext cx="4088160" cy="1366560"/>
+            <a:ext cx="4087800" cy="1366200"/>
           </a:xfrm>
           <a:prstGeom prst="rect">
             <a:avLst/>
@@ -7159,7 +7159,7 @@
         <p:spPr>
           <a:xfrm>
             <a:off x="7007040" y="2889000"/>
-            <a:ext cx="2079360" cy="1767960"/>
+            <a:ext cx="2079000" cy="1767600"/>
           </a:xfrm>
           <a:prstGeom prst="rect">
             <a:avLst/>
@@ -7313,7 +7313,7 @@
         <p:spPr>
           <a:xfrm>
             <a:off x="7007040" y="4708440"/>
-            <a:ext cx="4345200" cy="1351800"/>
+            <a:ext cx="4344840" cy="1351440"/>
           </a:xfrm>
           <a:prstGeom prst="rect">
             <a:avLst/>
@@ -7426,7 +7426,7 @@
         <p:spPr>
           <a:xfrm>
             <a:off x="2764440" y="1102680"/>
-            <a:ext cx="2093400" cy="1734840"/>
+            <a:ext cx="2093040" cy="1734480"/>
           </a:xfrm>
           <a:prstGeom prst="rect">
             <a:avLst/>
@@ -7607,7 +7607,7 @@
         <p:spPr>
           <a:xfrm>
             <a:off x="838080" y="365040"/>
-            <a:ext cx="10514160" cy="1324080"/>
+            <a:ext cx="10513800" cy="1323720"/>
           </a:xfrm>
           <a:prstGeom prst="rect">
             <a:avLst/>
@@ -7658,7 +7658,7 @@
         <p:spPr>
           <a:xfrm>
             <a:off x="838080" y="1825560"/>
-            <a:ext cx="10514160" cy="4349880"/>
+            <a:ext cx="10513800" cy="4349520"/>
           </a:xfrm>
           <a:prstGeom prst="rect">
             <a:avLst/>
@@ -7674,6 +7674,121 @@
           <a:effectRef idx="0"/>
           <a:fontRef idx="minor"/>
         </p:style>
+        <p:txBody>
+          <a:bodyPr lIns="90000" rIns="90000" tIns="45000" bIns="45000">
+            <a:noAutofit/>
+          </a:bodyPr>
+          <a:p>
+            <a:pPr algn="just">
+              <a:lnSpc>
+                <a:spcPct val="100000"/>
+              </a:lnSpc>
+            </a:pPr>
+            <a:r>
+              <a:rPr b="0" lang="pt-BR" sz="2000" spc="-1" strike="noStrike">
+                <a:solidFill>
+                  <a:srgbClr val="000000"/>
+                </a:solidFill>
+                <a:latin typeface="Times New Roman"/>
+                <a:ea typeface="DejaVu Sans"/>
+              </a:rPr>
+              <a:t>A ideia do estabelecimento é servir a tradicional comida mineira, mesclada com a culinária do vale do Jequitinhonha, valorizando a história e os produtos regionais.</a:t>
+            </a:r>
+            <a:endParaRPr b="0" lang="pt-BR" sz="2000" spc="-1" strike="noStrike">
+              <a:latin typeface="Arial"/>
+            </a:endParaRPr>
+          </a:p>
+          <a:p>
+            <a:pPr algn="just">
+              <a:lnSpc>
+                <a:spcPct val="100000"/>
+              </a:lnSpc>
+            </a:pPr>
+            <a:r>
+              <a:rPr b="0" lang="pt-BR" sz="2000" spc="-1" strike="noStrike">
+                <a:solidFill>
+                  <a:srgbClr val="000000"/>
+                </a:solidFill>
+                <a:latin typeface="Times New Roman"/>
+                <a:ea typeface="DejaVu Sans"/>
+              </a:rPr>
+              <a:t>Queremos que o turista, tenha a experiência da explosão de sabores da culinária mineira e principalmente da culinária regional. Já para o cliente nativo que este, saboreei a conhecida e apreciada culinária local, com produtos frescos e de ótima qualidade.</a:t>
+            </a:r>
+            <a:endParaRPr b="0" lang="pt-BR" sz="2000" spc="-1" strike="noStrike">
+              <a:latin typeface="Arial"/>
+            </a:endParaRPr>
+          </a:p>
+          <a:p>
+            <a:pPr algn="just">
+              <a:lnSpc>
+                <a:spcPct val="100000"/>
+              </a:lnSpc>
+            </a:pPr>
+            <a:r>
+              <a:rPr b="0" lang="pt-BR" sz="2000" spc="-1" strike="noStrike">
+                <a:solidFill>
+                  <a:srgbClr val="000000"/>
+                </a:solidFill>
+                <a:latin typeface="Times New Roman"/>
+                <a:ea typeface="DejaVu Sans"/>
+              </a:rPr>
+              <a:t>Caso o cliente queira, poderá comprar os embutidos in natura, produzidos no estabelecimento. </a:t>
+            </a:r>
+            <a:endParaRPr b="0" lang="pt-BR" sz="2000" spc="-1" strike="noStrike">
+              <a:latin typeface="Arial"/>
+            </a:endParaRPr>
+          </a:p>
+          <a:p>
+            <a:pPr algn="just">
+              <a:lnSpc>
+                <a:spcPct val="100000"/>
+              </a:lnSpc>
+            </a:pPr>
+            <a:r>
+              <a:rPr b="0" lang="pt-BR" sz="2000" spc="-1" strike="noStrike">
+                <a:solidFill>
+                  <a:srgbClr val="000000"/>
+                </a:solidFill>
+                <a:latin typeface="Times New Roman"/>
+                <a:ea typeface="DejaVu Sans"/>
+              </a:rPr>
+              <a:t>A comercialização será realizada no fundo da loja, onde haverá um responsável pela apresentação e venda. </a:t>
+            </a:r>
+            <a:endParaRPr b="0" lang="pt-BR" sz="2000" spc="-1" strike="noStrike">
+              <a:latin typeface="Arial"/>
+            </a:endParaRPr>
+          </a:p>
+          <a:p>
+            <a:pPr algn="just">
+              <a:lnSpc>
+                <a:spcPct val="100000"/>
+              </a:lnSpc>
+            </a:pPr>
+            <a:endParaRPr b="0" lang="pt-BR" sz="2000" spc="-1" strike="noStrike">
+              <a:latin typeface="Arial"/>
+            </a:endParaRPr>
+          </a:p>
+          <a:p>
+            <a:pPr algn="just">
+              <a:lnSpc>
+                <a:spcPct val="100000"/>
+              </a:lnSpc>
+            </a:pPr>
+            <a:r>
+              <a:rPr b="0" lang="pt-BR" sz="2000" spc="-1" strike="noStrike">
+                <a:solidFill>
+                  <a:srgbClr val="000000"/>
+                </a:solidFill>
+                <a:latin typeface="Times New Roman"/>
+                <a:ea typeface="DejaVu Sans"/>
+              </a:rPr>
+              <a:t> </a:t>
+            </a:r>
+            <a:endParaRPr b="0" lang="pt-BR" sz="2000" spc="-1" strike="noStrike">
+              <a:latin typeface="Arial"/>
+            </a:endParaRPr>
+          </a:p>
+        </p:txBody>
       </p:sp>
     </p:spTree>
   </p:cSld>
@@ -7718,7 +7833,7 @@
         <p:spPr>
           <a:xfrm>
             <a:off x="838080" y="365040"/>
-            <a:ext cx="10514160" cy="1324080"/>
+            <a:ext cx="10513800" cy="1323720"/>
           </a:xfrm>
           <a:prstGeom prst="rect">
             <a:avLst/>
@@ -7769,7 +7884,7 @@
         <p:spPr>
           <a:xfrm>
             <a:off x="838080" y="1825560"/>
-            <a:ext cx="5180040" cy="4349880"/>
+            <a:ext cx="5179680" cy="4349520"/>
           </a:xfrm>
           <a:prstGeom prst="rect">
             <a:avLst/>
@@ -7794,8 +7909,8 @@
         </p:nvSpPr>
         <p:spPr>
           <a:xfrm>
-            <a:off x="6172200" y="1825560"/>
-            <a:ext cx="5180040" cy="4349880"/>
+            <a:off x="720000" y="1512000"/>
+            <a:ext cx="10631880" cy="4349520"/>
           </a:xfrm>
           <a:prstGeom prst="rect">
             <a:avLst/>
@@ -7811,6 +7926,288 @@
           <a:effectRef idx="0"/>
           <a:fontRef idx="minor"/>
         </p:style>
+        <p:txBody>
+          <a:bodyPr lIns="90000" rIns="90000" tIns="45000" bIns="45000">
+            <a:noAutofit/>
+          </a:bodyPr>
+          <a:p>
+            <a:pPr algn="just"/>
+            <a:r>
+              <a:rPr b="0" lang="pt-BR" sz="2000" spc="-1" strike="noStrike">
+                <a:latin typeface="Times New Roman"/>
+              </a:rPr>
+              <a:t>Pratos servidos:</a:t>
+            </a:r>
+            <a:endParaRPr b="0" lang="pt-BR" sz="2000" spc="-1" strike="noStrike">
+              <a:latin typeface="Arial"/>
+            </a:endParaRPr>
+          </a:p>
+          <a:p>
+            <a:pPr algn="just"/>
+            <a:endParaRPr b="0" lang="pt-BR" sz="2000" spc="-1" strike="noStrike">
+              <a:latin typeface="Arial"/>
+            </a:endParaRPr>
+          </a:p>
+          <a:p>
+            <a:pPr marL="216000" indent="-216000" algn="just">
+              <a:lnSpc>
+                <a:spcPct val="100000"/>
+              </a:lnSpc>
+              <a:buClr>
+                <a:srgbClr val="000000"/>
+              </a:buClr>
+              <a:buSzPct val="45000"/>
+              <a:buFont typeface="Symbol" charset="2"/>
+              <a:buChar char=""/>
+            </a:pPr>
+            <a:r>
+              <a:rPr b="0" lang="pt-BR" sz="2000" spc="-1" strike="noStrike">
+                <a:latin typeface="Times New Roman"/>
+              </a:rPr>
+              <a:t>Pão de queijo com linguiça artesanal</a:t>
+            </a:r>
+            <a:endParaRPr b="0" lang="pt-BR" sz="2000" spc="-1" strike="noStrike">
+              <a:latin typeface="Arial"/>
+            </a:endParaRPr>
+          </a:p>
+          <a:p>
+            <a:pPr marL="216000" indent="-216000" algn="just">
+              <a:lnSpc>
+                <a:spcPct val="100000"/>
+              </a:lnSpc>
+              <a:buClr>
+                <a:srgbClr val="000000"/>
+              </a:buClr>
+              <a:buSzPct val="45000"/>
+              <a:buFont typeface="Symbol" charset="2"/>
+              <a:buChar char=""/>
+            </a:pPr>
+            <a:endParaRPr b="0" lang="pt-BR" sz="2000" spc="-1" strike="noStrike">
+              <a:latin typeface="Arial"/>
+            </a:endParaRPr>
+          </a:p>
+          <a:p>
+            <a:pPr marL="216000" indent="-216000" algn="just">
+              <a:lnSpc>
+                <a:spcPct val="100000"/>
+              </a:lnSpc>
+              <a:buClr>
+                <a:srgbClr val="000000"/>
+              </a:buClr>
+              <a:buSzPct val="45000"/>
+              <a:buFont typeface="Symbol" charset="2"/>
+              <a:buChar char=""/>
+            </a:pPr>
+            <a:r>
+              <a:rPr b="0" lang="pt-BR" sz="2000" spc="-1" strike="noStrike">
+                <a:latin typeface="Times New Roman"/>
+              </a:rPr>
+              <a:t>Kaol (Couve, Arroz, Ovo frito e linguiça artesanal, cebola e alho)</a:t>
+            </a:r>
+            <a:endParaRPr b="0" lang="pt-BR" sz="2000" spc="-1" strike="noStrike">
+              <a:latin typeface="Arial"/>
+            </a:endParaRPr>
+          </a:p>
+          <a:p>
+            <a:pPr marL="216000" indent="-216000" algn="just">
+              <a:lnSpc>
+                <a:spcPct val="100000"/>
+              </a:lnSpc>
+              <a:buClr>
+                <a:srgbClr val="000000"/>
+              </a:buClr>
+              <a:buSzPct val="45000"/>
+              <a:buFont typeface="Symbol" charset="2"/>
+              <a:buChar char=""/>
+            </a:pPr>
+            <a:endParaRPr b="0" lang="pt-BR" sz="2000" spc="-1" strike="noStrike">
+              <a:latin typeface="Arial"/>
+            </a:endParaRPr>
+          </a:p>
+          <a:p>
+            <a:pPr marL="216000" indent="-216000" algn="just">
+              <a:lnSpc>
+                <a:spcPct val="100000"/>
+              </a:lnSpc>
+              <a:buClr>
+                <a:srgbClr val="000000"/>
+              </a:buClr>
+              <a:buSzPct val="45000"/>
+              <a:buFont typeface="Symbol" charset="2"/>
+              <a:buChar char=""/>
+            </a:pPr>
+            <a:r>
+              <a:rPr b="0" lang="pt-BR" sz="2000" spc="-1" strike="noStrike">
+                <a:latin typeface="Times New Roman"/>
+              </a:rPr>
+              <a:t>Péla égua (Canjiquinha com suã de porco, linguiça artesanal e bacon, cebola e alho)</a:t>
+            </a:r>
+            <a:endParaRPr b="0" lang="pt-BR" sz="2000" spc="-1" strike="noStrike">
+              <a:latin typeface="Arial"/>
+            </a:endParaRPr>
+          </a:p>
+          <a:p>
+            <a:pPr marL="216000" indent="-216000" algn="just">
+              <a:lnSpc>
+                <a:spcPct val="100000"/>
+              </a:lnSpc>
+              <a:buClr>
+                <a:srgbClr val="000000"/>
+              </a:buClr>
+              <a:buSzPct val="45000"/>
+              <a:buFont typeface="Symbol" charset="2"/>
+              <a:buChar char=""/>
+            </a:pPr>
+            <a:endParaRPr b="0" lang="pt-BR" sz="2000" spc="-1" strike="noStrike">
+              <a:latin typeface="Arial"/>
+            </a:endParaRPr>
+          </a:p>
+          <a:p>
+            <a:pPr marL="216000" indent="-216000" algn="just">
+              <a:lnSpc>
+                <a:spcPct val="100000"/>
+              </a:lnSpc>
+              <a:buClr>
+                <a:srgbClr val="000000"/>
+              </a:buClr>
+              <a:buSzPct val="45000"/>
+              <a:buFont typeface="Symbol" charset="2"/>
+              <a:buChar char=""/>
+            </a:pPr>
+            <a:r>
+              <a:rPr b="0" lang="pt-BR" sz="2000" spc="-1" strike="noStrike">
+                <a:latin typeface="Times New Roman"/>
+              </a:rPr>
+              <a:t>Farofa de Feijão andú (Feijão andú, bife de cabeça de lombo, ovo frito, farinha de mandioca sem torrar, torresmo de barriga de porco, cebola e alho)</a:t>
+            </a:r>
+            <a:endParaRPr b="0" lang="pt-BR" sz="2000" spc="-1" strike="noStrike">
+              <a:latin typeface="Arial"/>
+            </a:endParaRPr>
+          </a:p>
+          <a:p>
+            <a:pPr marL="216000" indent="-216000" algn="just">
+              <a:lnSpc>
+                <a:spcPct val="100000"/>
+              </a:lnSpc>
+              <a:buClr>
+                <a:srgbClr val="000000"/>
+              </a:buClr>
+              <a:buSzPct val="45000"/>
+              <a:buFont typeface="Symbol" charset="2"/>
+              <a:buChar char=""/>
+            </a:pPr>
+            <a:endParaRPr b="0" lang="pt-BR" sz="2000" spc="-1" strike="noStrike">
+              <a:latin typeface="Arial"/>
+            </a:endParaRPr>
+          </a:p>
+          <a:p>
+            <a:pPr algn="just"/>
+            <a:r>
+              <a:rPr b="0" lang="pt-BR" sz="2000" spc="-1" strike="noStrike">
+                <a:latin typeface="Times New Roman"/>
+              </a:rPr>
+              <a:t>Produtos in natura produzidos e comercializados pelo estabelecimento</a:t>
+            </a:r>
+            <a:endParaRPr b="0" lang="pt-BR" sz="2000" spc="-1" strike="noStrike">
+              <a:latin typeface="Arial"/>
+            </a:endParaRPr>
+          </a:p>
+          <a:p>
+            <a:pPr algn="just"/>
+            <a:endParaRPr b="0" lang="pt-BR" sz="2000" spc="-1" strike="noStrike">
+              <a:latin typeface="Arial"/>
+            </a:endParaRPr>
+          </a:p>
+          <a:p>
+            <a:pPr marL="216000" indent="-216000" algn="just">
+              <a:buClr>
+                <a:srgbClr val="000000"/>
+              </a:buClr>
+              <a:buSzPct val="45000"/>
+              <a:buFont typeface="Symbol" charset="2"/>
+              <a:buChar char=""/>
+            </a:pPr>
+            <a:r>
+              <a:rPr b="0" lang="pt-BR" sz="2000" spc="-1" strike="noStrike">
+                <a:latin typeface="Times New Roman"/>
+              </a:rPr>
+              <a:t>Linguiça de frango caipira com bacon e mussarela</a:t>
+            </a:r>
+            <a:endParaRPr b="0" lang="pt-BR" sz="2000" spc="-1" strike="noStrike">
+              <a:latin typeface="Arial"/>
+            </a:endParaRPr>
+          </a:p>
+          <a:p>
+            <a:pPr marL="216000" indent="-216000" algn="just">
+              <a:buClr>
+                <a:srgbClr val="000000"/>
+              </a:buClr>
+              <a:buSzPct val="45000"/>
+              <a:buFont typeface="Symbol" charset="2"/>
+              <a:buChar char=""/>
+            </a:pPr>
+            <a:r>
+              <a:rPr b="0" lang="pt-BR" sz="2000" spc="-1" strike="noStrike">
+                <a:latin typeface="Times New Roman"/>
+              </a:rPr>
+              <a:t>Linguiça de pernil (com jiló, pura, com bacon)</a:t>
+            </a:r>
+            <a:endParaRPr b="0" lang="pt-BR" sz="2000" spc="-1" strike="noStrike">
+              <a:latin typeface="Arial"/>
+            </a:endParaRPr>
+          </a:p>
+          <a:p>
+            <a:pPr marL="216000" indent="-216000" algn="just">
+              <a:buClr>
+                <a:srgbClr val="000000"/>
+              </a:buClr>
+              <a:buSzPct val="45000"/>
+              <a:buFont typeface="Symbol" charset="2"/>
+              <a:buChar char=""/>
+            </a:pPr>
+            <a:r>
+              <a:rPr b="0" lang="pt-BR" sz="2000" spc="-1" strike="noStrike">
+                <a:latin typeface="Times New Roman"/>
+              </a:rPr>
+              <a:t>Defumados (Bacon, joelho de porco, costelinha de porco, pé, orelha)</a:t>
+            </a:r>
+            <a:endParaRPr b="0" lang="pt-BR" sz="2000" spc="-1" strike="noStrike">
+              <a:latin typeface="Arial"/>
+            </a:endParaRPr>
+          </a:p>
+          <a:p>
+            <a:pPr marL="216000" indent="-216000" algn="just">
+              <a:buClr>
+                <a:srgbClr val="000000"/>
+              </a:buClr>
+              <a:buSzPct val="45000"/>
+              <a:buFont typeface="Symbol" charset="2"/>
+              <a:buChar char=""/>
+            </a:pPr>
+            <a:r>
+              <a:rPr b="0" lang="pt-BR" sz="2000" spc="-1" strike="noStrike">
+                <a:latin typeface="Times New Roman"/>
+              </a:rPr>
+              <a:t>Linguiça mista com pernil e maça de peito (boi)</a:t>
+            </a:r>
+            <a:endParaRPr b="0" lang="pt-BR" sz="2000" spc="-1" strike="noStrike">
+              <a:latin typeface="Arial"/>
+            </a:endParaRPr>
+          </a:p>
+          <a:p>
+            <a:pPr marL="216000" indent="-216000" algn="just">
+              <a:buClr>
+                <a:srgbClr val="000000"/>
+              </a:buClr>
+              <a:buSzPct val="45000"/>
+              <a:buFont typeface="Symbol" charset="2"/>
+              <a:buChar char=""/>
+            </a:pPr>
+            <a:endParaRPr b="0" lang="pt-BR" sz="2000" spc="-1" strike="noStrike">
+              <a:latin typeface="Arial"/>
+            </a:endParaRPr>
+          </a:p>
+        </p:txBody>
       </p:sp>
     </p:spTree>
   </p:cSld>
@@ -7851,7 +8248,7 @@
         <p:spPr>
           <a:xfrm>
             <a:off x="838080" y="365040"/>
-            <a:ext cx="10514160" cy="1324080"/>
+            <a:ext cx="10513800" cy="1323720"/>
           </a:xfrm>
           <a:prstGeom prst="rect">
             <a:avLst/>
@@ -7901,8 +8298,8 @@
         </p:nvSpPr>
         <p:spPr>
           <a:xfrm>
-            <a:off x="838080" y="1825560"/>
-            <a:ext cx="10514160" cy="4349880"/>
+            <a:off x="720000" y="1825560"/>
+            <a:ext cx="10513800" cy="4349520"/>
           </a:xfrm>
           <a:prstGeom prst="rect">
             <a:avLst/>
@@ -7958,7 +8355,7 @@
         <p:spPr>
           <a:xfrm>
             <a:off x="838080" y="365040"/>
-            <a:ext cx="10514160" cy="1324080"/>
+            <a:ext cx="10513800" cy="1323720"/>
           </a:xfrm>
           <a:prstGeom prst="rect">
             <a:avLst/>
@@ -8009,7 +8406,7 @@
         <p:spPr>
           <a:xfrm>
             <a:off x="838080" y="1825560"/>
-            <a:ext cx="10514160" cy="4349880"/>
+            <a:ext cx="10513800" cy="4349520"/>
           </a:xfrm>
           <a:prstGeom prst="rect">
             <a:avLst/>
@@ -8065,7 +8462,7 @@
         <p:spPr>
           <a:xfrm>
             <a:off x="838080" y="365040"/>
-            <a:ext cx="10514160" cy="1324080"/>
+            <a:ext cx="10513800" cy="1323720"/>
           </a:xfrm>
           <a:prstGeom prst="rect">
             <a:avLst/>
@@ -8116,7 +8513,7 @@
         <p:spPr>
           <a:xfrm>
             <a:off x="838080" y="1825560"/>
-            <a:ext cx="10514160" cy="4349880"/>
+            <a:ext cx="10513800" cy="4349520"/>
           </a:xfrm>
           <a:prstGeom prst="rect">
             <a:avLst/>

</xml_diff>

<commit_message>
analise estrategica primeira parte
</commit_message>
<xml_diff>
--- a/plano-de-negocios-restaurante-tioto.pptx
+++ b/plano-de-negocios-restaurante-tioto.pptx
@@ -17,6 +17,7 @@
     <p:sldId id="263" r:id="rId12"/>
     <p:sldId id="264" r:id="rId13"/>
     <p:sldId id="265" r:id="rId14"/>
+    <p:sldId id="266" r:id="rId15"/>
   </p:sldIdLst>
   <p:sldSz cx="12192000" cy="6858000"/>
   <p:notesSz cx="7559675" cy="10691812"/>
@@ -4128,7 +4129,7 @@
         <p:spPr>
           <a:xfrm>
             <a:off x="5441040" y="6062040"/>
-            <a:ext cx="1109520" cy="586080"/>
+            <a:ext cx="1109160" cy="585720"/>
           </a:xfrm>
           <a:prstGeom prst="rect">
             <a:avLst/>
@@ -4411,7 +4412,7 @@
         <p:spPr>
           <a:xfrm>
             <a:off x="5540040" y="6176880"/>
-            <a:ext cx="1109520" cy="586080"/>
+            <a:ext cx="1109160" cy="585720"/>
           </a:xfrm>
           <a:prstGeom prst="rect">
             <a:avLst/>
@@ -4694,7 +4695,7 @@
         <p:spPr>
           <a:xfrm>
             <a:off x="5540040" y="6132960"/>
-            <a:ext cx="1109520" cy="586080"/>
+            <a:ext cx="1109160" cy="585720"/>
           </a:xfrm>
           <a:prstGeom prst="rect">
             <a:avLst/>
@@ -4730,12 +4731,12 @@
           <a:p>
             <a:pPr algn="ctr"/>
             <a:r>
-              <a:rPr b="0" lang="pt-BR" sz="1800" spc="-1" strike="noStrike">
+              <a:rPr b="0" lang="pt-BR" sz="4400" spc="-1" strike="noStrike">
                 <a:latin typeface="Arial"/>
               </a:rPr>
               <a:t>Clique para editar o formato do texto do título</a:t>
             </a:r>
-            <a:endParaRPr b="0" lang="pt-BR" sz="1800" spc="-1" strike="noStrike">
+            <a:endParaRPr b="0" lang="pt-BR" sz="4400" spc="-1" strike="noStrike">
               <a:latin typeface="Arial"/>
             </a:endParaRPr>
           </a:p>
@@ -4762,10 +4763,10 @@
         </p:spPr>
         <p:txBody>
           <a:bodyPr lIns="0" rIns="0" tIns="0" bIns="0">
-            <a:normAutofit/>
-          </a:bodyPr>
-          <a:p>
-            <a:pPr marL="432000" indent="-324000" algn="ctr">
+            <a:normAutofit fontScale="64000"/>
+          </a:bodyPr>
+          <a:p>
+            <a:pPr marL="432000" indent="-324000">
               <a:spcBef>
                 <a:spcPts val="1417"/>
               </a:spcBef>
@@ -4777,17 +4778,17 @@
               <a:buChar char=""/>
             </a:pPr>
             <a:r>
-              <a:rPr b="0" lang="pt-BR" sz="1800" spc="-1" strike="noStrike">
+              <a:rPr b="0" lang="pt-BR" sz="3200" spc="-1" strike="noStrike">
                 <a:latin typeface="Arial"/>
               </a:rPr>
               <a:t>Clique para editar o formato do texto da estrutura de tópicos</a:t>
             </a:r>
-            <a:endParaRPr b="0" lang="pt-BR" sz="1800" spc="-1" strike="noStrike">
-              <a:latin typeface="Arial"/>
-            </a:endParaRPr>
-          </a:p>
-          <a:p>
-            <a:pPr lvl="1" marL="864000" indent="-324000" algn="ctr">
+            <a:endParaRPr b="0" lang="pt-BR" sz="3200" spc="-1" strike="noStrike">
+              <a:latin typeface="Arial"/>
+            </a:endParaRPr>
+          </a:p>
+          <a:p>
+            <a:pPr lvl="1" marL="864000" indent="-324000">
               <a:spcBef>
                 <a:spcPts val="1134"/>
               </a:spcBef>
@@ -4799,17 +4800,17 @@
               <a:buChar char=""/>
             </a:pPr>
             <a:r>
-              <a:rPr b="0" lang="pt-BR" sz="1800" spc="-1" strike="noStrike">
+              <a:rPr b="0" lang="pt-BR" sz="2800" spc="-1" strike="noStrike">
                 <a:latin typeface="Arial"/>
               </a:rPr>
               <a:t>2.º nível da estrutura de tópicos</a:t>
             </a:r>
-            <a:endParaRPr b="0" lang="pt-BR" sz="1800" spc="-1" strike="noStrike">
-              <a:latin typeface="Arial"/>
-            </a:endParaRPr>
-          </a:p>
-          <a:p>
-            <a:pPr lvl="2" marL="1296000" indent="-288000" algn="ctr">
+            <a:endParaRPr b="0" lang="pt-BR" sz="2800" spc="-1" strike="noStrike">
+              <a:latin typeface="Arial"/>
+            </a:endParaRPr>
+          </a:p>
+          <a:p>
+            <a:pPr lvl="2" marL="1296000" indent="-288000">
               <a:spcBef>
                 <a:spcPts val="850"/>
               </a:spcBef>
@@ -4821,17 +4822,17 @@
               <a:buChar char=""/>
             </a:pPr>
             <a:r>
-              <a:rPr b="0" lang="pt-BR" sz="1800" spc="-1" strike="noStrike">
+              <a:rPr b="0" lang="pt-BR" sz="2400" spc="-1" strike="noStrike">
                 <a:latin typeface="Arial"/>
               </a:rPr>
               <a:t>3.º nível da estrutura de tópicos</a:t>
             </a:r>
-            <a:endParaRPr b="0" lang="pt-BR" sz="1800" spc="-1" strike="noStrike">
-              <a:latin typeface="Arial"/>
-            </a:endParaRPr>
-          </a:p>
-          <a:p>
-            <a:pPr lvl="3" marL="1728000" indent="-216000" algn="ctr">
+            <a:endParaRPr b="0" lang="pt-BR" sz="2400" spc="-1" strike="noStrike">
+              <a:latin typeface="Arial"/>
+            </a:endParaRPr>
+          </a:p>
+          <a:p>
+            <a:pPr lvl="3" marL="1728000" indent="-216000">
               <a:spcBef>
                 <a:spcPts val="567"/>
               </a:spcBef>
@@ -4843,17 +4844,17 @@
               <a:buChar char=""/>
             </a:pPr>
             <a:r>
-              <a:rPr b="0" lang="pt-BR" sz="1800" spc="-1" strike="noStrike">
+              <a:rPr b="0" lang="pt-BR" sz="2000" spc="-1" strike="noStrike">
                 <a:latin typeface="Arial"/>
               </a:rPr>
               <a:t>4.º nível da estrutura de tópicos</a:t>
             </a:r>
-            <a:endParaRPr b="0" lang="pt-BR" sz="1800" spc="-1" strike="noStrike">
-              <a:latin typeface="Arial"/>
-            </a:endParaRPr>
-          </a:p>
-          <a:p>
-            <a:pPr lvl="4" marL="2160000" indent="-216000" algn="ctr">
+            <a:endParaRPr b="0" lang="pt-BR" sz="2000" spc="-1" strike="noStrike">
+              <a:latin typeface="Arial"/>
+            </a:endParaRPr>
+          </a:p>
+          <a:p>
+            <a:pPr lvl="4" marL="2160000" indent="-216000">
               <a:spcBef>
                 <a:spcPts val="283"/>
               </a:spcBef>
@@ -4865,17 +4866,17 @@
               <a:buChar char=""/>
             </a:pPr>
             <a:r>
-              <a:rPr b="0" lang="pt-BR" sz="1800" spc="-1" strike="noStrike">
+              <a:rPr b="0" lang="pt-BR" sz="2000" spc="-1" strike="noStrike">
                 <a:latin typeface="Arial"/>
               </a:rPr>
               <a:t>5.º nível da estrutura de tópicos</a:t>
             </a:r>
-            <a:endParaRPr b="0" lang="pt-BR" sz="1800" spc="-1" strike="noStrike">
-              <a:latin typeface="Arial"/>
-            </a:endParaRPr>
-          </a:p>
-          <a:p>
-            <a:pPr lvl="5" marL="2592000" indent="-216000" algn="ctr">
+            <a:endParaRPr b="0" lang="pt-BR" sz="2000" spc="-1" strike="noStrike">
+              <a:latin typeface="Arial"/>
+            </a:endParaRPr>
+          </a:p>
+          <a:p>
+            <a:pPr lvl="5" marL="2592000" indent="-216000">
               <a:spcBef>
                 <a:spcPts val="283"/>
               </a:spcBef>
@@ -4887,17 +4888,17 @@
               <a:buChar char=""/>
             </a:pPr>
             <a:r>
-              <a:rPr b="0" lang="pt-BR" sz="1800" spc="-1" strike="noStrike">
+              <a:rPr b="0" lang="pt-BR" sz="2000" spc="-1" strike="noStrike">
                 <a:latin typeface="Arial"/>
               </a:rPr>
               <a:t>6.º nível da estrutura de tópicos</a:t>
             </a:r>
-            <a:endParaRPr b="0" lang="pt-BR" sz="1800" spc="-1" strike="noStrike">
-              <a:latin typeface="Arial"/>
-            </a:endParaRPr>
-          </a:p>
-          <a:p>
-            <a:pPr lvl="6" marL="3024000" indent="-216000" algn="ctr">
+            <a:endParaRPr b="0" lang="pt-BR" sz="2000" spc="-1" strike="noStrike">
+              <a:latin typeface="Arial"/>
+            </a:endParaRPr>
+          </a:p>
+          <a:p>
+            <a:pPr lvl="6" marL="3024000" indent="-216000">
               <a:spcBef>
                 <a:spcPts val="283"/>
               </a:spcBef>
@@ -4909,12 +4910,12 @@
               <a:buChar char=""/>
             </a:pPr>
             <a:r>
-              <a:rPr b="0" lang="pt-BR" sz="1800" spc="-1" strike="noStrike">
+              <a:rPr b="0" lang="pt-BR" sz="2000" spc="-1" strike="noStrike">
                 <a:latin typeface="Arial"/>
               </a:rPr>
               <a:t>7.º nível da estrutura de tópicos</a:t>
             </a:r>
-            <a:endParaRPr b="0" lang="pt-BR" sz="1800" spc="-1" strike="noStrike">
+            <a:endParaRPr b="0" lang="pt-BR" sz="2000" spc="-1" strike="noStrike">
               <a:latin typeface="Arial"/>
             </a:endParaRPr>
           </a:p>
@@ -4941,10 +4942,10 @@
         </p:spPr>
         <p:txBody>
           <a:bodyPr lIns="0" rIns="0" tIns="0" bIns="0">
-            <a:normAutofit/>
-          </a:bodyPr>
-          <a:p>
-            <a:pPr marL="432000" indent="-324000" algn="ctr">
+            <a:normAutofit fontScale="64000"/>
+          </a:bodyPr>
+          <a:p>
+            <a:pPr marL="432000" indent="-324000">
               <a:spcBef>
                 <a:spcPts val="1417"/>
               </a:spcBef>
@@ -4956,17 +4957,17 @@
               <a:buChar char=""/>
             </a:pPr>
             <a:r>
-              <a:rPr b="0" lang="pt-BR" sz="1800" spc="-1" strike="noStrike">
+              <a:rPr b="0" lang="pt-BR" sz="3200" spc="-1" strike="noStrike">
                 <a:latin typeface="Arial"/>
               </a:rPr>
               <a:t>Clique para editar o formato do texto da estrutura de tópicos</a:t>
             </a:r>
-            <a:endParaRPr b="0" lang="pt-BR" sz="1800" spc="-1" strike="noStrike">
-              <a:latin typeface="Arial"/>
-            </a:endParaRPr>
-          </a:p>
-          <a:p>
-            <a:pPr lvl="1" marL="864000" indent="-324000" algn="ctr">
+            <a:endParaRPr b="0" lang="pt-BR" sz="3200" spc="-1" strike="noStrike">
+              <a:latin typeface="Arial"/>
+            </a:endParaRPr>
+          </a:p>
+          <a:p>
+            <a:pPr lvl="1" marL="864000" indent="-324000">
               <a:spcBef>
                 <a:spcPts val="1134"/>
               </a:spcBef>
@@ -4978,17 +4979,17 @@
               <a:buChar char=""/>
             </a:pPr>
             <a:r>
-              <a:rPr b="0" lang="pt-BR" sz="1800" spc="-1" strike="noStrike">
+              <a:rPr b="0" lang="pt-BR" sz="2800" spc="-1" strike="noStrike">
                 <a:latin typeface="Arial"/>
               </a:rPr>
               <a:t>2.º nível da estrutura de tópicos</a:t>
             </a:r>
-            <a:endParaRPr b="0" lang="pt-BR" sz="1800" spc="-1" strike="noStrike">
-              <a:latin typeface="Arial"/>
-            </a:endParaRPr>
-          </a:p>
-          <a:p>
-            <a:pPr lvl="2" marL="1296000" indent="-288000" algn="ctr">
+            <a:endParaRPr b="0" lang="pt-BR" sz="2800" spc="-1" strike="noStrike">
+              <a:latin typeface="Arial"/>
+            </a:endParaRPr>
+          </a:p>
+          <a:p>
+            <a:pPr lvl="2" marL="1296000" indent="-288000">
               <a:spcBef>
                 <a:spcPts val="850"/>
               </a:spcBef>
@@ -5000,17 +5001,17 @@
               <a:buChar char=""/>
             </a:pPr>
             <a:r>
-              <a:rPr b="0" lang="pt-BR" sz="1800" spc="-1" strike="noStrike">
+              <a:rPr b="0" lang="pt-BR" sz="2400" spc="-1" strike="noStrike">
                 <a:latin typeface="Arial"/>
               </a:rPr>
               <a:t>3.º nível da estrutura de tópicos</a:t>
             </a:r>
-            <a:endParaRPr b="0" lang="pt-BR" sz="1800" spc="-1" strike="noStrike">
-              <a:latin typeface="Arial"/>
-            </a:endParaRPr>
-          </a:p>
-          <a:p>
-            <a:pPr lvl="3" marL="1728000" indent="-216000" algn="ctr">
+            <a:endParaRPr b="0" lang="pt-BR" sz="2400" spc="-1" strike="noStrike">
+              <a:latin typeface="Arial"/>
+            </a:endParaRPr>
+          </a:p>
+          <a:p>
+            <a:pPr lvl="3" marL="1728000" indent="-216000">
               <a:spcBef>
                 <a:spcPts val="567"/>
               </a:spcBef>
@@ -5022,17 +5023,17 @@
               <a:buChar char=""/>
             </a:pPr>
             <a:r>
-              <a:rPr b="0" lang="pt-BR" sz="1800" spc="-1" strike="noStrike">
+              <a:rPr b="0" lang="pt-BR" sz="2000" spc="-1" strike="noStrike">
                 <a:latin typeface="Arial"/>
               </a:rPr>
               <a:t>4.º nível da estrutura de tópicos</a:t>
             </a:r>
-            <a:endParaRPr b="0" lang="pt-BR" sz="1800" spc="-1" strike="noStrike">
-              <a:latin typeface="Arial"/>
-            </a:endParaRPr>
-          </a:p>
-          <a:p>
-            <a:pPr lvl="4" marL="2160000" indent="-216000" algn="ctr">
+            <a:endParaRPr b="0" lang="pt-BR" sz="2000" spc="-1" strike="noStrike">
+              <a:latin typeface="Arial"/>
+            </a:endParaRPr>
+          </a:p>
+          <a:p>
+            <a:pPr lvl="4" marL="2160000" indent="-216000">
               <a:spcBef>
                 <a:spcPts val="283"/>
               </a:spcBef>
@@ -5044,17 +5045,17 @@
               <a:buChar char=""/>
             </a:pPr>
             <a:r>
-              <a:rPr b="0" lang="pt-BR" sz="1800" spc="-1" strike="noStrike">
+              <a:rPr b="0" lang="pt-BR" sz="2000" spc="-1" strike="noStrike">
                 <a:latin typeface="Arial"/>
               </a:rPr>
               <a:t>5.º nível da estrutura de tópicos</a:t>
             </a:r>
-            <a:endParaRPr b="0" lang="pt-BR" sz="1800" spc="-1" strike="noStrike">
-              <a:latin typeface="Arial"/>
-            </a:endParaRPr>
-          </a:p>
-          <a:p>
-            <a:pPr lvl="5" marL="2592000" indent="-216000" algn="ctr">
+            <a:endParaRPr b="0" lang="pt-BR" sz="2000" spc="-1" strike="noStrike">
+              <a:latin typeface="Arial"/>
+            </a:endParaRPr>
+          </a:p>
+          <a:p>
+            <a:pPr lvl="5" marL="2592000" indent="-216000">
               <a:spcBef>
                 <a:spcPts val="283"/>
               </a:spcBef>
@@ -5066,17 +5067,17 @@
               <a:buChar char=""/>
             </a:pPr>
             <a:r>
-              <a:rPr b="0" lang="pt-BR" sz="1800" spc="-1" strike="noStrike">
+              <a:rPr b="0" lang="pt-BR" sz="2000" spc="-1" strike="noStrike">
                 <a:latin typeface="Arial"/>
               </a:rPr>
               <a:t>6.º nível da estrutura de tópicos</a:t>
             </a:r>
-            <a:endParaRPr b="0" lang="pt-BR" sz="1800" spc="-1" strike="noStrike">
-              <a:latin typeface="Arial"/>
-            </a:endParaRPr>
-          </a:p>
-          <a:p>
-            <a:pPr lvl="6" marL="3024000" indent="-216000" algn="ctr">
+            <a:endParaRPr b="0" lang="pt-BR" sz="2000" spc="-1" strike="noStrike">
+              <a:latin typeface="Arial"/>
+            </a:endParaRPr>
+          </a:p>
+          <a:p>
+            <a:pPr lvl="6" marL="3024000" indent="-216000">
               <a:spcBef>
                 <a:spcPts val="283"/>
               </a:spcBef>
@@ -5088,12 +5089,12 @@
               <a:buChar char=""/>
             </a:pPr>
             <a:r>
-              <a:rPr b="0" lang="pt-BR" sz="1800" spc="-1" strike="noStrike">
+              <a:rPr b="0" lang="pt-BR" sz="2000" spc="-1" strike="noStrike">
                 <a:latin typeface="Arial"/>
               </a:rPr>
               <a:t>7.º nível da estrutura de tópicos</a:t>
             </a:r>
-            <a:endParaRPr b="0" lang="pt-BR" sz="1800" spc="-1" strike="noStrike">
+            <a:endParaRPr b="0" lang="pt-BR" sz="2000" spc="-1" strike="noStrike">
               <a:latin typeface="Arial"/>
             </a:endParaRPr>
           </a:p>
@@ -5145,7 +5146,7 @@
         <p:spPr>
           <a:xfrm>
             <a:off x="1523880" y="523800"/>
-            <a:ext cx="9141480" cy="2385000"/>
+            <a:ext cx="9141120" cy="2384640"/>
           </a:xfrm>
           <a:prstGeom prst="rect">
             <a:avLst/>
@@ -5196,7 +5197,7 @@
         <p:spPr>
           <a:xfrm>
             <a:off x="1523880" y="3003480"/>
-            <a:ext cx="9141480" cy="2239200"/>
+            <a:ext cx="9141120" cy="2238840"/>
           </a:xfrm>
           <a:prstGeom prst="rect">
             <a:avLst/>
@@ -5339,7 +5340,7 @@
         <p:spPr>
           <a:xfrm>
             <a:off x="838080" y="365040"/>
-            <a:ext cx="10513080" cy="1323000"/>
+            <a:ext cx="10512720" cy="1322640"/>
           </a:xfrm>
           <a:prstGeom prst="rect">
             <a:avLst/>
@@ -5373,7 +5374,7 @@
                 <a:latin typeface="Calibri Light"/>
                 <a:ea typeface="DejaVu Sans"/>
               </a:rPr>
-              <a:t>4. Considerações finais - TCC I</a:t>
+              <a:t>3.2. Análise de concorrência</a:t>
             </a:r>
             <a:endParaRPr b="0" lang="pt-BR" sz="4400" spc="-1" strike="noStrike">
               <a:latin typeface="Arial"/>
@@ -5390,7 +5391,114 @@
         <p:spPr>
           <a:xfrm>
             <a:off x="838080" y="1825560"/>
-            <a:ext cx="10513080" cy="4348800"/>
+            <a:ext cx="10512720" cy="4348440"/>
+          </a:xfrm>
+          <a:prstGeom prst="rect">
+            <a:avLst/>
+          </a:prstGeom>
+          <a:noFill/>
+          <a:ln>
+            <a:noFill/>
+          </a:ln>
+        </p:spPr>
+        <p:style>
+          <a:lnRef idx="0"/>
+          <a:fillRef idx="0"/>
+          <a:effectRef idx="0"/>
+          <a:fontRef idx="minor"/>
+        </p:style>
+      </p:sp>
+    </p:spTree>
+  </p:cSld>
+  <mc:AlternateContent>
+    <mc:Choice Requires="p14">
+      <p:transition spd="slow" p14:dur="2000"/>
+    </mc:Choice>
+    <mc:Fallback>
+      <p:transition spd="slow"/>
+    </mc:Fallback>
+  </mc:AlternateContent>
+</p:sld>
+</file>
+
+<file path=ppt/slides/slide11.xml><?xml version="1.0" encoding="utf-8"?>
+<p:sld xmlns:a="http://schemas.openxmlformats.org/drawingml/2006/main" xmlns:p="http://schemas.openxmlformats.org/presentationml/2006/main" xmlns:r="http://schemas.openxmlformats.org/officeDocument/2006/relationships" xmlns:p14="http://schemas.microsoft.com/office/powerpoint/2010/main" xmlns:p15="http://schemas.microsoft.com/office/powerpoint/2012/main" xmlns:mc="http://schemas.openxmlformats.org/markup-compatibility/2006">
+  <p:cSld>
+    <p:spTree>
+      <p:nvGrpSpPr>
+        <p:cNvPr id="1" name=""/>
+        <p:cNvGrpSpPr/>
+        <p:nvPr/>
+      </p:nvGrpSpPr>
+      <p:grpSpPr>
+        <a:xfrm>
+          <a:off x="0" y="0"/>
+          <a:ext cx="0" cy="0"/>
+          <a:chOff x="0" y="0"/>
+          <a:chExt cx="0" cy="0"/>
+        </a:xfrm>
+      </p:grpSpPr>
+      <p:sp>
+        <p:nvSpPr>
+          <p:cNvPr id="148" name="CustomShape 1"/>
+          <p:cNvSpPr/>
+          <p:nvPr/>
+        </p:nvSpPr>
+        <p:spPr>
+          <a:xfrm>
+            <a:off x="838080" y="365040"/>
+            <a:ext cx="10512720" cy="1322640"/>
+          </a:xfrm>
+          <a:prstGeom prst="rect">
+            <a:avLst/>
+          </a:prstGeom>
+          <a:noFill/>
+          <a:ln>
+            <a:noFill/>
+          </a:ln>
+        </p:spPr>
+        <p:style>
+          <a:lnRef idx="0"/>
+          <a:fillRef idx="0"/>
+          <a:effectRef idx="0"/>
+          <a:fontRef idx="minor"/>
+        </p:style>
+        <p:txBody>
+          <a:bodyPr lIns="90000" rIns="90000" tIns="45000" bIns="45000" anchor="ctr">
+            <a:noAutofit/>
+          </a:bodyPr>
+          <a:p>
+            <a:pPr>
+              <a:lnSpc>
+                <a:spcPct val="90000"/>
+              </a:lnSpc>
+            </a:pPr>
+            <a:r>
+              <a:rPr b="0" lang="pt-BR" sz="4400" spc="-1" strike="noStrike">
+                <a:solidFill>
+                  <a:srgbClr val="808080"/>
+                </a:solidFill>
+                <a:latin typeface="Calibri Light"/>
+                <a:ea typeface="DejaVu Sans"/>
+              </a:rPr>
+              <a:t>4. Considerações finais - TCC I</a:t>
+            </a:r>
+            <a:endParaRPr b="0" lang="pt-BR" sz="4400" spc="-1" strike="noStrike">
+              <a:latin typeface="Arial"/>
+            </a:endParaRPr>
+          </a:p>
+        </p:txBody>
+      </p:sp>
+      <p:sp>
+        <p:nvSpPr>
+          <p:cNvPr id="149" name="CustomShape 2"/>
+          <p:cNvSpPr/>
+          <p:nvPr/>
+        </p:nvSpPr>
+        <p:spPr>
+          <a:xfrm>
+            <a:off x="838080" y="1825560"/>
+            <a:ext cx="10512720" cy="4348440"/>
           </a:xfrm>
           <a:prstGeom prst="rect">
             <a:avLst/>
@@ -5446,7 +5554,7 @@
         <p:spPr>
           <a:xfrm>
             <a:off x="838080" y="365040"/>
-            <a:ext cx="10513080" cy="1323000"/>
+            <a:ext cx="10512720" cy="1322640"/>
           </a:xfrm>
           <a:prstGeom prst="rect">
             <a:avLst/>
@@ -5497,7 +5605,7 @@
         <p:spPr>
           <a:xfrm>
             <a:off x="838080" y="1689480"/>
-            <a:ext cx="10513080" cy="4484880"/>
+            <a:ext cx="10512720" cy="4484520"/>
           </a:xfrm>
           <a:prstGeom prst="rect">
             <a:avLst/>
@@ -5621,7 +5729,7 @@
         <p:spPr>
           <a:xfrm>
             <a:off x="838080" y="365040"/>
-            <a:ext cx="10513080" cy="1323000"/>
+            <a:ext cx="10512720" cy="1322640"/>
           </a:xfrm>
           <a:prstGeom prst="rect">
             <a:avLst/>
@@ -5672,7 +5780,7 @@
         <p:spPr>
           <a:xfrm>
             <a:off x="360000" y="1499040"/>
-            <a:ext cx="11518560" cy="2413080"/>
+            <a:ext cx="11518200" cy="2412720"/>
           </a:xfrm>
           <a:prstGeom prst="rect">
             <a:avLst/>
@@ -5807,7 +5915,7 @@
         <p:spPr>
           <a:xfrm>
             <a:off x="432000" y="4407480"/>
-            <a:ext cx="2360520" cy="2360520"/>
+            <a:ext cx="2360160" cy="2360160"/>
           </a:xfrm>
           <a:prstGeom prst="rect">
             <a:avLst/>
@@ -5856,7 +5964,7 @@
         <p:spPr>
           <a:xfrm>
             <a:off x="838080" y="365040"/>
-            <a:ext cx="10513080" cy="604800"/>
+            <a:ext cx="10512720" cy="604440"/>
           </a:xfrm>
           <a:prstGeom prst="rect">
             <a:avLst/>
@@ -5907,7 +6015,7 @@
         <p:spPr>
           <a:xfrm>
             <a:off x="9156600" y="1102680"/>
-            <a:ext cx="2194560" cy="3553200"/>
+            <a:ext cx="2194200" cy="3552840"/>
           </a:xfrm>
           <a:prstGeom prst="rect">
             <a:avLst/>
@@ -5915,22 +6023,14 @@
           <a:solidFill>
             <a:srgbClr val="92d050"/>
           </a:solidFill>
-          <a:ln>
+          <a:ln w="25560">
             <a:noFill/>
           </a:ln>
         </p:spPr>
         <p:style>
-          <a:lnRef idx="2">
-            <a:schemeClr val="accent1">
-              <a:shade val="50000"/>
-            </a:schemeClr>
-          </a:lnRef>
-          <a:fillRef idx="1">
-            <a:schemeClr val="accent1"/>
-          </a:fillRef>
-          <a:effectRef idx="0">
-            <a:schemeClr val="accent1"/>
-          </a:effectRef>
+          <a:lnRef idx="0"/>
+          <a:fillRef idx="0"/>
+          <a:effectRef idx="0"/>
           <a:fontRef idx="minor"/>
         </p:style>
         <p:txBody>
@@ -6148,32 +6248,22 @@
         <p:spPr>
           <a:xfrm>
             <a:off x="2764440" y="2878200"/>
-            <a:ext cx="2089080" cy="1777680"/>
+            <a:ext cx="2088720" cy="1777320"/>
           </a:xfrm>
           <a:prstGeom prst="rect">
             <a:avLst/>
           </a:prstGeom>
           <a:solidFill>
-            <a:schemeClr val="bg1">
-              <a:lumMod val="65000"/>
-            </a:schemeClr>
+            <a:srgbClr val="a6a6a6"/>
           </a:solidFill>
-          <a:ln>
+          <a:ln w="25560">
             <a:noFill/>
           </a:ln>
         </p:spPr>
         <p:style>
-          <a:lnRef idx="2">
-            <a:schemeClr val="accent1">
-              <a:shade val="50000"/>
-            </a:schemeClr>
-          </a:lnRef>
-          <a:fillRef idx="1">
-            <a:schemeClr val="accent1"/>
-          </a:fillRef>
-          <a:effectRef idx="0">
-            <a:schemeClr val="accent1"/>
-          </a:effectRef>
+          <a:lnRef idx="0"/>
+          <a:fillRef idx="0"/>
+          <a:effectRef idx="0"/>
           <a:fontRef idx="minor"/>
         </p:style>
         <p:txBody>
@@ -6301,33 +6391,22 @@
         <p:spPr>
           <a:xfrm>
             <a:off x="4929120" y="1102680"/>
-            <a:ext cx="2001240" cy="4971600"/>
+            <a:ext cx="2000880" cy="4971240"/>
           </a:xfrm>
           <a:prstGeom prst="rect">
             <a:avLst/>
           </a:prstGeom>
           <a:solidFill>
-            <a:schemeClr val="accent4">
-              <a:lumMod val="60000"/>
-              <a:lumOff val="40000"/>
-            </a:schemeClr>
+            <a:srgbClr val="ffd966"/>
           </a:solidFill>
-          <a:ln>
+          <a:ln w="25560">
             <a:noFill/>
           </a:ln>
         </p:spPr>
         <p:style>
-          <a:lnRef idx="2">
-            <a:schemeClr val="accent1">
-              <a:shade val="50000"/>
-            </a:schemeClr>
-          </a:lnRef>
-          <a:fillRef idx="1">
-            <a:schemeClr val="accent1"/>
-          </a:fillRef>
-          <a:effectRef idx="0">
-            <a:schemeClr val="accent1"/>
-          </a:effectRef>
+          <a:lnRef idx="0"/>
+          <a:fillRef idx="0"/>
+          <a:effectRef idx="0"/>
           <a:fontRef idx="minor"/>
         </p:style>
         <p:txBody>
@@ -6525,27 +6604,22 @@
         <p:spPr>
           <a:xfrm>
             <a:off x="7007040" y="1102680"/>
-            <a:ext cx="2074320" cy="1733760"/>
-          </a:xfrm>
-          <a:prstGeom prst="rect">
-            <a:avLst/>
-          </a:prstGeom>
-          <a:ln>
+            <a:ext cx="2073960" cy="1733400"/>
+          </a:xfrm>
+          <a:prstGeom prst="rect">
+            <a:avLst/>
+          </a:prstGeom>
+          <a:solidFill>
+            <a:srgbClr val="5b9bd5"/>
+          </a:solidFill>
+          <a:ln w="25560">
             <a:noFill/>
           </a:ln>
         </p:spPr>
         <p:style>
-          <a:lnRef idx="2">
-            <a:schemeClr val="accent1">
-              <a:shade val="50000"/>
-            </a:schemeClr>
-          </a:lnRef>
-          <a:fillRef idx="1">
-            <a:schemeClr val="accent1"/>
-          </a:fillRef>
-          <a:effectRef idx="0">
-            <a:schemeClr val="accent1"/>
-          </a:effectRef>
+          <a:lnRef idx="0"/>
+          <a:fillRef idx="0"/>
+          <a:effectRef idx="0"/>
           <a:fontRef idx="minor"/>
         </p:style>
         <p:txBody>
@@ -6673,7 +6747,7 @@
         <p:spPr>
           <a:xfrm>
             <a:off x="766800" y="1103400"/>
-            <a:ext cx="1936080" cy="3552480"/>
+            <a:ext cx="1935720" cy="3552120"/>
           </a:xfrm>
           <a:prstGeom prst="rect">
             <a:avLst/>
@@ -6681,22 +6755,14 @@
           <a:solidFill>
             <a:srgbClr val="7030a0"/>
           </a:solidFill>
-          <a:ln>
+          <a:ln w="25560">
             <a:noFill/>
           </a:ln>
         </p:spPr>
         <p:style>
-          <a:lnRef idx="2">
-            <a:schemeClr val="accent1">
-              <a:shade val="50000"/>
-            </a:schemeClr>
-          </a:lnRef>
-          <a:fillRef idx="1">
-            <a:schemeClr val="accent1"/>
-          </a:fillRef>
-          <a:effectRef idx="0">
-            <a:schemeClr val="accent1"/>
-          </a:effectRef>
+          <a:lnRef idx="0"/>
+          <a:fillRef idx="0"/>
+          <a:effectRef idx="0"/>
           <a:fontRef idx="minor"/>
         </p:style>
         <p:txBody>
@@ -6894,27 +6960,22 @@
         <p:spPr>
           <a:xfrm>
             <a:off x="766800" y="4708440"/>
-            <a:ext cx="4087080" cy="1365480"/>
-          </a:xfrm>
-          <a:prstGeom prst="rect">
-            <a:avLst/>
-          </a:prstGeom>
-          <a:ln>
+            <a:ext cx="4086720" cy="1365120"/>
+          </a:xfrm>
+          <a:prstGeom prst="rect">
+            <a:avLst/>
+          </a:prstGeom>
+          <a:solidFill>
+            <a:srgbClr val="5b9bd5"/>
+          </a:solidFill>
+          <a:ln w="25560">
             <a:noFill/>
           </a:ln>
         </p:spPr>
         <p:style>
-          <a:lnRef idx="2">
-            <a:schemeClr val="accent1">
-              <a:shade val="50000"/>
-            </a:schemeClr>
-          </a:lnRef>
-          <a:fillRef idx="1">
-            <a:schemeClr val="accent1"/>
-          </a:fillRef>
-          <a:effectRef idx="0">
-            <a:schemeClr val="accent1"/>
-          </a:effectRef>
+          <a:lnRef idx="0"/>
+          <a:fillRef idx="0"/>
+          <a:effectRef idx="0"/>
           <a:fontRef idx="minor"/>
         </p:style>
         <p:txBody>
@@ -7042,33 +7103,22 @@
         <p:spPr>
           <a:xfrm>
             <a:off x="7007040" y="2889000"/>
-            <a:ext cx="2078280" cy="1766880"/>
+            <a:ext cx="2077920" cy="1766520"/>
           </a:xfrm>
           <a:prstGeom prst="rect">
             <a:avLst/>
           </a:prstGeom>
           <a:solidFill>
-            <a:schemeClr val="accent2">
-              <a:lumMod val="60000"/>
-              <a:lumOff val="40000"/>
-            </a:schemeClr>
+            <a:srgbClr val="f4b183"/>
           </a:solidFill>
-          <a:ln>
+          <a:ln w="25560">
             <a:noFill/>
           </a:ln>
         </p:spPr>
         <p:style>
-          <a:lnRef idx="2">
-            <a:schemeClr val="accent1">
-              <a:shade val="50000"/>
-            </a:schemeClr>
-          </a:lnRef>
-          <a:fillRef idx="1">
-            <a:schemeClr val="accent1"/>
-          </a:fillRef>
-          <a:effectRef idx="0">
-            <a:schemeClr val="accent1"/>
-          </a:effectRef>
+          <a:lnRef idx="0"/>
+          <a:fillRef idx="0"/>
+          <a:effectRef idx="0"/>
           <a:fontRef idx="minor"/>
         </p:style>
         <p:txBody>
@@ -7196,32 +7246,22 @@
         <p:spPr>
           <a:xfrm>
             <a:off x="7007040" y="4708440"/>
-            <a:ext cx="4344120" cy="1350720"/>
+            <a:ext cx="4343760" cy="1350360"/>
           </a:xfrm>
           <a:prstGeom prst="rect">
             <a:avLst/>
           </a:prstGeom>
           <a:solidFill>
-            <a:schemeClr val="accent3">
-              <a:lumMod val="75000"/>
-            </a:schemeClr>
+            <a:srgbClr val="7c7c7c"/>
           </a:solidFill>
-          <a:ln>
+          <a:ln w="25560">
             <a:noFill/>
           </a:ln>
         </p:spPr>
         <p:style>
-          <a:lnRef idx="2">
-            <a:schemeClr val="accent1">
-              <a:shade val="50000"/>
-            </a:schemeClr>
-          </a:lnRef>
-          <a:fillRef idx="1">
-            <a:schemeClr val="accent1"/>
-          </a:fillRef>
-          <a:effectRef idx="0">
-            <a:schemeClr val="accent1"/>
-          </a:effectRef>
+          <a:lnRef idx="0"/>
+          <a:fillRef idx="0"/>
+          <a:effectRef idx="0"/>
           <a:fontRef idx="minor"/>
         </p:style>
         <p:txBody>
@@ -7309,7 +7349,7 @@
         <p:spPr>
           <a:xfrm>
             <a:off x="2764440" y="1102680"/>
-            <a:ext cx="2092320" cy="1733760"/>
+            <a:ext cx="2091960" cy="1733400"/>
           </a:xfrm>
           <a:prstGeom prst="rect">
             <a:avLst/>
@@ -7317,22 +7357,14 @@
           <a:solidFill>
             <a:srgbClr val="cd63b9"/>
           </a:solidFill>
-          <a:ln>
+          <a:ln w="25560">
             <a:noFill/>
           </a:ln>
         </p:spPr>
         <p:style>
-          <a:lnRef idx="2">
-            <a:schemeClr val="accent1">
-              <a:shade val="50000"/>
-            </a:schemeClr>
-          </a:lnRef>
-          <a:fillRef idx="1">
-            <a:schemeClr val="accent1"/>
-          </a:fillRef>
-          <a:effectRef idx="0">
-            <a:schemeClr val="accent1"/>
-          </a:effectRef>
+          <a:lnRef idx="0"/>
+          <a:fillRef idx="0"/>
+          <a:effectRef idx="0"/>
           <a:fontRef idx="minor"/>
         </p:style>
         <p:txBody>
@@ -7490,7 +7522,7 @@
         <p:spPr>
           <a:xfrm>
             <a:off x="838080" y="365040"/>
-            <a:ext cx="10513080" cy="1323000"/>
+            <a:ext cx="10512720" cy="1322640"/>
           </a:xfrm>
           <a:prstGeom prst="rect">
             <a:avLst/>
@@ -7541,7 +7573,7 @@
         <p:spPr>
           <a:xfrm>
             <a:off x="838080" y="1825560"/>
-            <a:ext cx="10513080" cy="4348800"/>
+            <a:ext cx="10512720" cy="4348440"/>
           </a:xfrm>
           <a:prstGeom prst="rect">
             <a:avLst/>
@@ -7716,7 +7748,7 @@
         <p:spPr>
           <a:xfrm>
             <a:off x="838080" y="365040"/>
-            <a:ext cx="10513080" cy="1323000"/>
+            <a:ext cx="10512720" cy="1322640"/>
           </a:xfrm>
           <a:prstGeom prst="rect">
             <a:avLst/>
@@ -7767,7 +7799,7 @@
         <p:spPr>
           <a:xfrm>
             <a:off x="838080" y="1825560"/>
-            <a:ext cx="5178960" cy="4348800"/>
+            <a:ext cx="5178600" cy="4348440"/>
           </a:xfrm>
           <a:prstGeom prst="rect">
             <a:avLst/>
@@ -7793,7 +7825,7 @@
         <p:spPr>
           <a:xfrm>
             <a:off x="720000" y="1692000"/>
-            <a:ext cx="10631160" cy="4348800"/>
+            <a:ext cx="10630800" cy="4348440"/>
           </a:xfrm>
           <a:prstGeom prst="rect">
             <a:avLst/>
@@ -7834,14 +7866,14 @@
             </a:endParaRPr>
           </a:p>
           <a:p>
-            <a:pPr marL="216000" indent="-215280">
+            <a:pPr marL="216000" indent="-214920">
               <a:lnSpc>
                 <a:spcPct val="100000"/>
               </a:lnSpc>
               <a:buClr>
                 <a:srgbClr val="000000"/>
               </a:buClr>
-              <a:buFont typeface="Symbol" charset="2"/>
+              <a:buFont typeface="Symbol"/>
               <a:buChar char=""/>
             </a:pPr>
             <a:r>
@@ -7859,14 +7891,14 @@
             </a:endParaRPr>
           </a:p>
           <a:p>
-            <a:pPr marL="216000" indent="-215280">
+            <a:pPr marL="216000" indent="-214920">
               <a:lnSpc>
                 <a:spcPct val="100000"/>
               </a:lnSpc>
               <a:buClr>
                 <a:srgbClr val="000000"/>
               </a:buClr>
-              <a:buFont typeface="Symbol" charset="2"/>
+              <a:buFont typeface="Symbol"/>
               <a:buChar char=""/>
             </a:pPr>
             <a:r>
@@ -7914,14 +7946,14 @@
             </a:endParaRPr>
           </a:p>
           <a:p>
-            <a:pPr marL="216000" indent="-215280">
+            <a:pPr marL="216000" indent="-214920">
               <a:lnSpc>
                 <a:spcPct val="100000"/>
               </a:lnSpc>
               <a:buClr>
                 <a:srgbClr val="000000"/>
               </a:buClr>
-              <a:buFont typeface="Symbol" charset="2"/>
+              <a:buFont typeface="Symbol"/>
               <a:buChar char=""/>
             </a:pPr>
             <a:r>
@@ -7939,14 +7971,14 @@
             </a:endParaRPr>
           </a:p>
           <a:p>
-            <a:pPr marL="216000" indent="-215280">
+            <a:pPr marL="216000" indent="-214920">
               <a:lnSpc>
                 <a:spcPct val="100000"/>
               </a:lnSpc>
               <a:buClr>
                 <a:srgbClr val="000000"/>
               </a:buClr>
-              <a:buFont typeface="Symbol" charset="2"/>
+              <a:buFont typeface="Symbol"/>
               <a:buChar char=""/>
             </a:pPr>
             <a:r>
@@ -7994,14 +8026,14 @@
             </a:endParaRPr>
           </a:p>
           <a:p>
-            <a:pPr marL="216000" indent="-215280">
+            <a:pPr marL="216000" indent="-214920">
               <a:lnSpc>
                 <a:spcPct val="100000"/>
               </a:lnSpc>
               <a:buClr>
                 <a:srgbClr val="000000"/>
               </a:buClr>
-              <a:buFont typeface="Symbol" charset="2"/>
+              <a:buFont typeface="Symbol"/>
               <a:buChar char=""/>
             </a:pPr>
             <a:r>
@@ -8019,14 +8051,14 @@
             </a:endParaRPr>
           </a:p>
           <a:p>
-            <a:pPr marL="216000" indent="-215280">
+            <a:pPr marL="216000" indent="-214920">
               <a:lnSpc>
                 <a:spcPct val="100000"/>
               </a:lnSpc>
               <a:buClr>
                 <a:srgbClr val="000000"/>
               </a:buClr>
-              <a:buFont typeface="Symbol" charset="2"/>
+              <a:buFont typeface="Symbol"/>
               <a:buChar char=""/>
             </a:pPr>
             <a:r>
@@ -8044,14 +8076,14 @@
             </a:endParaRPr>
           </a:p>
           <a:p>
-            <a:pPr marL="216000" indent="-215280">
+            <a:pPr marL="216000" indent="-214920">
               <a:lnSpc>
                 <a:spcPct val="100000"/>
               </a:lnSpc>
               <a:buClr>
                 <a:srgbClr val="000000"/>
               </a:buClr>
-              <a:buFont typeface="Symbol" charset="2"/>
+              <a:buFont typeface="Symbol"/>
               <a:buChar char=""/>
             </a:pPr>
             <a:r>
@@ -8129,7 +8161,7 @@
         <p:spPr>
           <a:xfrm>
             <a:off x="838080" y="365040"/>
-            <a:ext cx="10513080" cy="1323000"/>
+            <a:ext cx="10512720" cy="1322640"/>
           </a:xfrm>
           <a:prstGeom prst="rect">
             <a:avLst/>
@@ -8179,8 +8211,8 @@
         </p:nvSpPr>
         <p:spPr>
           <a:xfrm>
-            <a:off x="720000" y="1825560"/>
-            <a:ext cx="10513080" cy="4348800"/>
+            <a:off x="720000" y="1368000"/>
+            <a:ext cx="10630800" cy="4672440"/>
           </a:xfrm>
           <a:prstGeom prst="rect">
             <a:avLst/>
@@ -8196,6 +8228,211 @@
           <a:effectRef idx="0"/>
           <a:fontRef idx="minor"/>
         </p:style>
+        <p:txBody>
+          <a:bodyPr lIns="90000" rIns="90000" tIns="45000" bIns="45000">
+            <a:noAutofit/>
+          </a:bodyPr>
+          <a:p>
+            <a:pPr algn="just">
+              <a:lnSpc>
+                <a:spcPct val="100000"/>
+              </a:lnSpc>
+            </a:pPr>
+            <a:r>
+              <a:rPr b="0" lang="pt-BR" sz="2000" spc="-1" strike="noStrike">
+                <a:solidFill>
+                  <a:srgbClr val="000000"/>
+                </a:solidFill>
+                <a:latin typeface="Times New Roman"/>
+                <a:ea typeface="DejaVu Sans"/>
+              </a:rPr>
+              <a:t>Missão</a:t>
+            </a:r>
+            <a:endParaRPr b="0" lang="pt-BR" sz="2000" spc="-1" strike="noStrike">
+              <a:latin typeface="Arial"/>
+            </a:endParaRPr>
+          </a:p>
+          <a:p>
+            <a:pPr algn="just">
+              <a:lnSpc>
+                <a:spcPct val="100000"/>
+              </a:lnSpc>
+            </a:pPr>
+            <a:r>
+              <a:rPr b="0" lang="pt-BR" sz="2000" spc="-1" strike="noStrike">
+                <a:solidFill>
+                  <a:srgbClr val="000000"/>
+                </a:solidFill>
+                <a:latin typeface="Times New Roman"/>
+                <a:ea typeface="DejaVu Sans"/>
+              </a:rPr>
+              <a:t>Os clientes saboreiem nossos produtos, seja em nosso ambiente descontraído ou em suas casas. </a:t>
+            </a:r>
+            <a:endParaRPr b="0" lang="pt-BR" sz="2000" spc="-1" strike="noStrike">
+              <a:latin typeface="Arial"/>
+            </a:endParaRPr>
+          </a:p>
+          <a:p>
+            <a:pPr algn="just">
+              <a:lnSpc>
+                <a:spcPct val="100000"/>
+              </a:lnSpc>
+            </a:pPr>
+            <a:endParaRPr b="0" lang="pt-BR" sz="2000" spc="-1" strike="noStrike">
+              <a:latin typeface="Arial"/>
+            </a:endParaRPr>
+          </a:p>
+          <a:p>
+            <a:pPr algn="just">
+              <a:lnSpc>
+                <a:spcPct val="100000"/>
+              </a:lnSpc>
+            </a:pPr>
+            <a:r>
+              <a:rPr b="0" lang="pt-BR" sz="2000" spc="-1" strike="noStrike">
+                <a:solidFill>
+                  <a:srgbClr val="000000"/>
+                </a:solidFill>
+                <a:latin typeface="Times New Roman"/>
+                <a:ea typeface="DejaVu Sans"/>
+              </a:rPr>
+              <a:t>Visão</a:t>
+            </a:r>
+            <a:endParaRPr b="0" lang="pt-BR" sz="2000" spc="-1" strike="noStrike">
+              <a:latin typeface="Arial"/>
+            </a:endParaRPr>
+          </a:p>
+          <a:p>
+            <a:pPr algn="just">
+              <a:lnSpc>
+                <a:spcPct val="100000"/>
+              </a:lnSpc>
+            </a:pPr>
+            <a:r>
+              <a:rPr b="0" lang="pt-BR" sz="2000" spc="-1" strike="noStrike">
+                <a:solidFill>
+                  <a:srgbClr val="000000"/>
+                </a:solidFill>
+                <a:latin typeface="Times New Roman"/>
+                <a:ea typeface="DejaVu Sans"/>
+              </a:rPr>
+              <a:t>Ser uma marca forte e competitiva no mercado.</a:t>
+            </a:r>
+            <a:endParaRPr b="0" lang="pt-BR" sz="2000" spc="-1" strike="noStrike">
+              <a:latin typeface="Arial"/>
+            </a:endParaRPr>
+          </a:p>
+          <a:p>
+            <a:pPr algn="just">
+              <a:lnSpc>
+                <a:spcPct val="100000"/>
+              </a:lnSpc>
+            </a:pPr>
+            <a:endParaRPr b="0" lang="pt-BR" sz="2000" spc="-1" strike="noStrike">
+              <a:latin typeface="Arial"/>
+            </a:endParaRPr>
+          </a:p>
+          <a:p>
+            <a:pPr algn="just">
+              <a:lnSpc>
+                <a:spcPct val="100000"/>
+              </a:lnSpc>
+            </a:pPr>
+            <a:r>
+              <a:rPr b="0" lang="pt-BR" sz="2000" spc="-1" strike="noStrike">
+                <a:solidFill>
+                  <a:srgbClr val="000000"/>
+                </a:solidFill>
+                <a:latin typeface="Times New Roman"/>
+                <a:ea typeface="DejaVu Sans"/>
+              </a:rPr>
+              <a:t>Valores</a:t>
+            </a:r>
+            <a:endParaRPr b="0" lang="pt-BR" sz="2000" spc="-1" strike="noStrike">
+              <a:latin typeface="Arial"/>
+            </a:endParaRPr>
+          </a:p>
+          <a:p>
+            <a:pPr algn="just">
+              <a:lnSpc>
+                <a:spcPct val="100000"/>
+              </a:lnSpc>
+            </a:pPr>
+            <a:r>
+              <a:rPr b="0" lang="pt-BR" sz="2000" spc="-1" strike="noStrike">
+                <a:solidFill>
+                  <a:srgbClr val="000000"/>
+                </a:solidFill>
+                <a:latin typeface="Times New Roman"/>
+                <a:ea typeface="DejaVu Sans"/>
+              </a:rPr>
+              <a:t>Compromisso ao servir os cliente com produtos de característica ímpar, com responsabilidade e ética.</a:t>
+            </a:r>
+            <a:endParaRPr b="0" lang="pt-BR" sz="2000" spc="-1" strike="noStrike">
+              <a:latin typeface="Arial"/>
+            </a:endParaRPr>
+          </a:p>
+          <a:p>
+            <a:pPr algn="just">
+              <a:lnSpc>
+                <a:spcPct val="100000"/>
+              </a:lnSpc>
+            </a:pPr>
+            <a:endParaRPr b="0" lang="pt-BR" sz="2000" spc="-1" strike="noStrike">
+              <a:latin typeface="Arial"/>
+            </a:endParaRPr>
+          </a:p>
+          <a:p>
+            <a:pPr algn="just">
+              <a:lnSpc>
+                <a:spcPct val="100000"/>
+              </a:lnSpc>
+            </a:pPr>
+            <a:r>
+              <a:rPr b="0" lang="pt-BR" sz="2000" spc="-1" strike="noStrike">
+                <a:solidFill>
+                  <a:srgbClr val="000000"/>
+                </a:solidFill>
+                <a:latin typeface="Times New Roman"/>
+                <a:ea typeface="DejaVu Sans"/>
+              </a:rPr>
+              <a:t>Objetivos</a:t>
+            </a:r>
+            <a:endParaRPr b="0" lang="pt-BR" sz="2000" spc="-1" strike="noStrike">
+              <a:latin typeface="Arial"/>
+            </a:endParaRPr>
+          </a:p>
+          <a:p>
+            <a:pPr algn="just">
+              <a:lnSpc>
+                <a:spcPct val="100000"/>
+              </a:lnSpc>
+            </a:pPr>
+            <a:r>
+              <a:rPr b="0" lang="pt-BR" sz="2000" spc="-1" strike="noStrike">
+                <a:solidFill>
+                  <a:srgbClr val="000000"/>
+                </a:solidFill>
+                <a:latin typeface="Times New Roman"/>
+                <a:ea typeface="DejaVu Sans"/>
+              </a:rPr>
+              <a:t>Estar entre os estabelecimentos mais conhecidos da cidade, quando o assunto for comida mineira e regional, linguiças artesanais ou carnes de porco defumada.</a:t>
+            </a:r>
+            <a:endParaRPr b="0" lang="pt-BR" sz="2000" spc="-1" strike="noStrike">
+              <a:latin typeface="Arial"/>
+            </a:endParaRPr>
+          </a:p>
+          <a:p>
+            <a:pPr algn="just">
+              <a:lnSpc>
+                <a:spcPct val="100000"/>
+              </a:lnSpc>
+            </a:pPr>
+            <a:endParaRPr b="0" lang="pt-BR" sz="2000" spc="-1" strike="noStrike">
+              <a:latin typeface="Arial"/>
+            </a:endParaRPr>
+          </a:p>
+        </p:txBody>
       </p:sp>
     </p:spTree>
   </p:cSld>
@@ -8236,7 +8473,7 @@
         <p:spPr>
           <a:xfrm>
             <a:off x="838080" y="365040"/>
-            <a:ext cx="10513080" cy="1323000"/>
+            <a:ext cx="10512720" cy="1322640"/>
           </a:xfrm>
           <a:prstGeom prst="rect">
             <a:avLst/>
@@ -8270,7 +8507,7 @@
                 <a:latin typeface="Calibri Light"/>
                 <a:ea typeface="DejaVu Sans"/>
               </a:rPr>
-              <a:t>3.2. Análise do mercado consumidor</a:t>
+              <a:t>3.1.Análise Estratégica</a:t>
             </a:r>
             <a:endParaRPr b="0" lang="pt-BR" sz="4400" spc="-1" strike="noStrike">
               <a:latin typeface="Arial"/>
@@ -8286,8 +8523,8 @@
         </p:nvSpPr>
         <p:spPr>
           <a:xfrm>
-            <a:off x="838080" y="1825560"/>
-            <a:ext cx="10513080" cy="4348800"/>
+            <a:off x="720000" y="1368000"/>
+            <a:ext cx="10630800" cy="4672440"/>
           </a:xfrm>
           <a:prstGeom prst="rect">
             <a:avLst/>
@@ -8303,6 +8540,51 @@
           <a:effectRef idx="0"/>
           <a:fontRef idx="minor"/>
         </p:style>
+        <p:txBody>
+          <a:bodyPr lIns="90000" rIns="90000" tIns="45000" bIns="45000">
+            <a:noAutofit/>
+          </a:bodyPr>
+          <a:p>
+            <a:pPr algn="just">
+              <a:lnSpc>
+                <a:spcPct val="100000"/>
+              </a:lnSpc>
+            </a:pPr>
+            <a:r>
+              <a:rPr b="0" lang="pt-BR" sz="2000" spc="-1" strike="noStrike">
+                <a:solidFill>
+                  <a:srgbClr val="000000"/>
+                </a:solidFill>
+                <a:latin typeface="Times New Roman"/>
+                <a:ea typeface="DejaVu Sans"/>
+              </a:rPr>
+              <a:t>Análise Swot</a:t>
+            </a:r>
+            <a:endParaRPr b="0" lang="pt-BR" sz="2000" spc="-1" strike="noStrike">
+              <a:latin typeface="Arial"/>
+            </a:endParaRPr>
+          </a:p>
+          <a:p>
+            <a:pPr algn="just">
+              <a:lnSpc>
+                <a:spcPct val="100000"/>
+              </a:lnSpc>
+            </a:pPr>
+            <a:endParaRPr b="0" lang="pt-BR" sz="2000" spc="-1" strike="noStrike">
+              <a:latin typeface="Arial"/>
+            </a:endParaRPr>
+          </a:p>
+          <a:p>
+            <a:pPr algn="just">
+              <a:lnSpc>
+                <a:spcPct val="100000"/>
+              </a:lnSpc>
+            </a:pPr>
+            <a:endParaRPr b="0" lang="pt-BR" sz="2000" spc="-1" strike="noStrike">
+              <a:latin typeface="Arial"/>
+            </a:endParaRPr>
+          </a:p>
+        </p:txBody>
       </p:sp>
     </p:spTree>
   </p:cSld>
@@ -8343,7 +8625,7 @@
         <p:spPr>
           <a:xfrm>
             <a:off x="838080" y="365040"/>
-            <a:ext cx="10513080" cy="1323000"/>
+            <a:ext cx="10512720" cy="1322640"/>
           </a:xfrm>
           <a:prstGeom prst="rect">
             <a:avLst/>
@@ -8377,7 +8659,7 @@
                 <a:latin typeface="Calibri Light"/>
                 <a:ea typeface="DejaVu Sans"/>
               </a:rPr>
-              <a:t>3.2. Análise de concorrência</a:t>
+              <a:t>3.2. Análise do mercado consumidor</a:t>
             </a:r>
             <a:endParaRPr b="0" lang="pt-BR" sz="4400" spc="-1" strike="noStrike">
               <a:latin typeface="Arial"/>
@@ -8394,7 +8676,7 @@
         <p:spPr>
           <a:xfrm>
             <a:off x="838080" y="1825560"/>
-            <a:ext cx="10513080" cy="4348800"/>
+            <a:ext cx="10512720" cy="4348440"/>
           </a:xfrm>
           <a:prstGeom prst="rect">
             <a:avLst/>
@@ -8435,34 +8717,34 @@
         <a:sysClr val="window" lastClr="FFFFFF"/>
       </a:lt1>
       <a:dk2>
-        <a:srgbClr val="44546a"/>
+        <a:srgbClr val="1f497d"/>
       </a:dk2>
       <a:lt2>
-        <a:srgbClr val="e7e6e6"/>
+        <a:srgbClr val="eeece1"/>
       </a:lt2>
       <a:accent1>
-        <a:srgbClr val="5b9bd5"/>
+        <a:srgbClr val="4f81bd"/>
       </a:accent1>
       <a:accent2>
-        <a:srgbClr val="ed7d31"/>
+        <a:srgbClr val="c0504d"/>
       </a:accent2>
       <a:accent3>
-        <a:srgbClr val="a5a5a5"/>
+        <a:srgbClr val="9bbb59"/>
       </a:accent3>
       <a:accent4>
-        <a:srgbClr val="ffc000"/>
+        <a:srgbClr val="8064a2"/>
       </a:accent4>
       <a:accent5>
-        <a:srgbClr val="4472c4"/>
+        <a:srgbClr val="4bacc6"/>
       </a:accent5>
       <a:accent6>
-        <a:srgbClr val="70ad47"/>
+        <a:srgbClr val="f79646"/>
       </a:accent6>
       <a:hlink>
-        <a:srgbClr val="0563c1"/>
+        <a:srgbClr val="0000ff"/>
       </a:hlink>
       <a:folHlink>
-        <a:srgbClr val="954f72"/>
+        <a:srgbClr val="800080"/>
       </a:folHlink>
     </a:clrScheme>
     <a:fontScheme name="Office">
@@ -8661,34 +8943,34 @@
         <a:sysClr val="window" lastClr="FFFFFF"/>
       </a:lt1>
       <a:dk2>
-        <a:srgbClr val="44546a"/>
+        <a:srgbClr val="1f497d"/>
       </a:dk2>
       <a:lt2>
-        <a:srgbClr val="e7e6e6"/>
+        <a:srgbClr val="eeece1"/>
       </a:lt2>
       <a:accent1>
-        <a:srgbClr val="5b9bd5"/>
+        <a:srgbClr val="4f81bd"/>
       </a:accent1>
       <a:accent2>
-        <a:srgbClr val="ed7d31"/>
+        <a:srgbClr val="c0504d"/>
       </a:accent2>
       <a:accent3>
-        <a:srgbClr val="a5a5a5"/>
+        <a:srgbClr val="9bbb59"/>
       </a:accent3>
       <a:accent4>
-        <a:srgbClr val="ffc000"/>
+        <a:srgbClr val="8064a2"/>
       </a:accent4>
       <a:accent5>
-        <a:srgbClr val="4472c4"/>
+        <a:srgbClr val="4bacc6"/>
       </a:accent5>
       <a:accent6>
-        <a:srgbClr val="70ad47"/>
+        <a:srgbClr val="f79646"/>
       </a:accent6>
       <a:hlink>
-        <a:srgbClr val="0563c1"/>
+        <a:srgbClr val="0000ff"/>
       </a:hlink>
       <a:folHlink>
-        <a:srgbClr val="954f72"/>
+        <a:srgbClr val="800080"/>
       </a:folHlink>
     </a:clrScheme>
     <a:fontScheme name="Office">
@@ -8887,34 +9169,34 @@
         <a:sysClr val="window" lastClr="FFFFFF"/>
       </a:lt1>
       <a:dk2>
-        <a:srgbClr val="44546a"/>
+        <a:srgbClr val="1f497d"/>
       </a:dk2>
       <a:lt2>
-        <a:srgbClr val="e7e6e6"/>
+        <a:srgbClr val="eeece1"/>
       </a:lt2>
       <a:accent1>
-        <a:srgbClr val="5b9bd5"/>
+        <a:srgbClr val="4f81bd"/>
       </a:accent1>
       <a:accent2>
-        <a:srgbClr val="ed7d31"/>
+        <a:srgbClr val="c0504d"/>
       </a:accent2>
       <a:accent3>
-        <a:srgbClr val="a5a5a5"/>
+        <a:srgbClr val="9bbb59"/>
       </a:accent3>
       <a:accent4>
-        <a:srgbClr val="ffc000"/>
+        <a:srgbClr val="8064a2"/>
       </a:accent4>
       <a:accent5>
-        <a:srgbClr val="4472c4"/>
+        <a:srgbClr val="4bacc6"/>
       </a:accent5>
       <a:accent6>
-        <a:srgbClr val="70ad47"/>
+        <a:srgbClr val="f79646"/>
       </a:accent6>
       <a:hlink>
-        <a:srgbClr val="0563c1"/>
+        <a:srgbClr val="0000ff"/>
       </a:hlink>
       <a:folHlink>
-        <a:srgbClr val="954f72"/>
+        <a:srgbClr val="800080"/>
       </a:folHlink>
     </a:clrScheme>
     <a:fontScheme name="Office">

</xml_diff>

<commit_message>
analise estrategica segunda parte
</commit_message>
<xml_diff>
--- a/plano-de-negocios-restaurante-tioto.pptx
+++ b/plano-de-negocios-restaurante-tioto.pptx
@@ -4129,7 +4129,7 @@
         <p:spPr>
           <a:xfrm>
             <a:off x="5441040" y="6062040"/>
-            <a:ext cx="1109160" cy="585720"/>
+            <a:ext cx="1108800" cy="585360"/>
           </a:xfrm>
           <a:prstGeom prst="rect">
             <a:avLst/>
@@ -4152,7 +4152,7 @@
         <p:spPr>
           <a:xfrm>
             <a:off x="609480" y="273600"/>
-            <a:ext cx="10972440" cy="1144800"/>
+            <a:ext cx="10972080" cy="1144440"/>
           </a:xfrm>
           <a:prstGeom prst="rect">
             <a:avLst/>
@@ -4165,12 +4165,12 @@
           <a:p>
             <a:pPr algn="ctr"/>
             <a:r>
-              <a:rPr b="0" lang="pt-BR" sz="4400" spc="-1" strike="noStrike">
+              <a:rPr b="0" lang="pt-BR" sz="1800" spc="-1" strike="noStrike">
                 <a:latin typeface="Arial"/>
               </a:rPr>
               <a:t>Clique para editar o formato do texto do título</a:t>
             </a:r>
-            <a:endParaRPr b="0" lang="pt-BR" sz="4400" spc="-1" strike="noStrike">
+            <a:endParaRPr b="0" lang="pt-BR" sz="1800" spc="-1" strike="noStrike">
               <a:latin typeface="Arial"/>
             </a:endParaRPr>
           </a:p>
@@ -4412,7 +4412,7 @@
         <p:spPr>
           <a:xfrm>
             <a:off x="5540040" y="6176880"/>
-            <a:ext cx="1109160" cy="585720"/>
+            <a:ext cx="1108800" cy="585360"/>
           </a:xfrm>
           <a:prstGeom prst="rect">
             <a:avLst/>
@@ -4695,7 +4695,7 @@
         <p:spPr>
           <a:xfrm>
             <a:off x="5540040" y="6132960"/>
-            <a:ext cx="1109160" cy="585720"/>
+            <a:ext cx="1108800" cy="585360"/>
           </a:xfrm>
           <a:prstGeom prst="rect">
             <a:avLst/>
@@ -4731,12 +4731,12 @@
           <a:p>
             <a:pPr algn="ctr"/>
             <a:r>
-              <a:rPr b="0" lang="pt-BR" sz="4400" spc="-1" strike="noStrike">
+              <a:rPr b="0" lang="pt-BR" sz="1800" spc="-1" strike="noStrike">
                 <a:latin typeface="Arial"/>
               </a:rPr>
               <a:t>Clique para editar o formato do texto do título</a:t>
             </a:r>
-            <a:endParaRPr b="0" lang="pt-BR" sz="4400" spc="-1" strike="noStrike">
+            <a:endParaRPr b="0" lang="pt-BR" sz="1800" spc="-1" strike="noStrike">
               <a:latin typeface="Arial"/>
             </a:endParaRPr>
           </a:p>
@@ -4763,10 +4763,10 @@
         </p:spPr>
         <p:txBody>
           <a:bodyPr lIns="0" rIns="0" tIns="0" bIns="0">
-            <a:normAutofit fontScale="64000"/>
-          </a:bodyPr>
-          <a:p>
-            <a:pPr marL="432000" indent="-324000">
+            <a:normAutofit/>
+          </a:bodyPr>
+          <a:p>
+            <a:pPr marL="432000" indent="-324000" algn="ctr">
               <a:spcBef>
                 <a:spcPts val="1417"/>
               </a:spcBef>
@@ -4778,17 +4778,17 @@
               <a:buChar char=""/>
             </a:pPr>
             <a:r>
-              <a:rPr b="0" lang="pt-BR" sz="3200" spc="-1" strike="noStrike">
+              <a:rPr b="0" lang="pt-BR" sz="1800" spc="-1" strike="noStrike">
                 <a:latin typeface="Arial"/>
               </a:rPr>
               <a:t>Clique para editar o formato do texto da estrutura de tópicos</a:t>
             </a:r>
-            <a:endParaRPr b="0" lang="pt-BR" sz="3200" spc="-1" strike="noStrike">
-              <a:latin typeface="Arial"/>
-            </a:endParaRPr>
-          </a:p>
-          <a:p>
-            <a:pPr lvl="1" marL="864000" indent="-324000">
+            <a:endParaRPr b="0" lang="pt-BR" sz="1800" spc="-1" strike="noStrike">
+              <a:latin typeface="Arial"/>
+            </a:endParaRPr>
+          </a:p>
+          <a:p>
+            <a:pPr lvl="1" marL="864000" indent="-324000" algn="ctr">
               <a:spcBef>
                 <a:spcPts val="1134"/>
               </a:spcBef>
@@ -4800,17 +4800,17 @@
               <a:buChar char=""/>
             </a:pPr>
             <a:r>
-              <a:rPr b="0" lang="pt-BR" sz="2800" spc="-1" strike="noStrike">
+              <a:rPr b="0" lang="pt-BR" sz="1800" spc="-1" strike="noStrike">
                 <a:latin typeface="Arial"/>
               </a:rPr>
               <a:t>2.º nível da estrutura de tópicos</a:t>
             </a:r>
-            <a:endParaRPr b="0" lang="pt-BR" sz="2800" spc="-1" strike="noStrike">
-              <a:latin typeface="Arial"/>
-            </a:endParaRPr>
-          </a:p>
-          <a:p>
-            <a:pPr lvl="2" marL="1296000" indent="-288000">
+            <a:endParaRPr b="0" lang="pt-BR" sz="1800" spc="-1" strike="noStrike">
+              <a:latin typeface="Arial"/>
+            </a:endParaRPr>
+          </a:p>
+          <a:p>
+            <a:pPr lvl="2" marL="1296000" indent="-288000" algn="ctr">
               <a:spcBef>
                 <a:spcPts val="850"/>
               </a:spcBef>
@@ -4822,17 +4822,17 @@
               <a:buChar char=""/>
             </a:pPr>
             <a:r>
-              <a:rPr b="0" lang="pt-BR" sz="2400" spc="-1" strike="noStrike">
+              <a:rPr b="0" lang="pt-BR" sz="1800" spc="-1" strike="noStrike">
                 <a:latin typeface="Arial"/>
               </a:rPr>
               <a:t>3.º nível da estrutura de tópicos</a:t>
             </a:r>
-            <a:endParaRPr b="0" lang="pt-BR" sz="2400" spc="-1" strike="noStrike">
-              <a:latin typeface="Arial"/>
-            </a:endParaRPr>
-          </a:p>
-          <a:p>
-            <a:pPr lvl="3" marL="1728000" indent="-216000">
+            <a:endParaRPr b="0" lang="pt-BR" sz="1800" spc="-1" strike="noStrike">
+              <a:latin typeface="Arial"/>
+            </a:endParaRPr>
+          </a:p>
+          <a:p>
+            <a:pPr lvl="3" marL="1728000" indent="-216000" algn="ctr">
               <a:spcBef>
                 <a:spcPts val="567"/>
               </a:spcBef>
@@ -4844,17 +4844,17 @@
               <a:buChar char=""/>
             </a:pPr>
             <a:r>
-              <a:rPr b="0" lang="pt-BR" sz="2000" spc="-1" strike="noStrike">
+              <a:rPr b="0" lang="pt-BR" sz="1800" spc="-1" strike="noStrike">
                 <a:latin typeface="Arial"/>
               </a:rPr>
               <a:t>4.º nível da estrutura de tópicos</a:t>
             </a:r>
-            <a:endParaRPr b="0" lang="pt-BR" sz="2000" spc="-1" strike="noStrike">
-              <a:latin typeface="Arial"/>
-            </a:endParaRPr>
-          </a:p>
-          <a:p>
-            <a:pPr lvl="4" marL="2160000" indent="-216000">
+            <a:endParaRPr b="0" lang="pt-BR" sz="1800" spc="-1" strike="noStrike">
+              <a:latin typeface="Arial"/>
+            </a:endParaRPr>
+          </a:p>
+          <a:p>
+            <a:pPr lvl="4" marL="2160000" indent="-216000" algn="ctr">
               <a:spcBef>
                 <a:spcPts val="283"/>
               </a:spcBef>
@@ -4866,17 +4866,17 @@
               <a:buChar char=""/>
             </a:pPr>
             <a:r>
-              <a:rPr b="0" lang="pt-BR" sz="2000" spc="-1" strike="noStrike">
+              <a:rPr b="0" lang="pt-BR" sz="1800" spc="-1" strike="noStrike">
                 <a:latin typeface="Arial"/>
               </a:rPr>
               <a:t>5.º nível da estrutura de tópicos</a:t>
             </a:r>
-            <a:endParaRPr b="0" lang="pt-BR" sz="2000" spc="-1" strike="noStrike">
-              <a:latin typeface="Arial"/>
-            </a:endParaRPr>
-          </a:p>
-          <a:p>
-            <a:pPr lvl="5" marL="2592000" indent="-216000">
+            <a:endParaRPr b="0" lang="pt-BR" sz="1800" spc="-1" strike="noStrike">
+              <a:latin typeface="Arial"/>
+            </a:endParaRPr>
+          </a:p>
+          <a:p>
+            <a:pPr lvl="5" marL="2592000" indent="-216000" algn="ctr">
               <a:spcBef>
                 <a:spcPts val="283"/>
               </a:spcBef>
@@ -4888,17 +4888,17 @@
               <a:buChar char=""/>
             </a:pPr>
             <a:r>
-              <a:rPr b="0" lang="pt-BR" sz="2000" spc="-1" strike="noStrike">
+              <a:rPr b="0" lang="pt-BR" sz="1800" spc="-1" strike="noStrike">
                 <a:latin typeface="Arial"/>
               </a:rPr>
               <a:t>6.º nível da estrutura de tópicos</a:t>
             </a:r>
-            <a:endParaRPr b="0" lang="pt-BR" sz="2000" spc="-1" strike="noStrike">
-              <a:latin typeface="Arial"/>
-            </a:endParaRPr>
-          </a:p>
-          <a:p>
-            <a:pPr lvl="6" marL="3024000" indent="-216000">
+            <a:endParaRPr b="0" lang="pt-BR" sz="1800" spc="-1" strike="noStrike">
+              <a:latin typeface="Arial"/>
+            </a:endParaRPr>
+          </a:p>
+          <a:p>
+            <a:pPr lvl="6" marL="3024000" indent="-216000" algn="ctr">
               <a:spcBef>
                 <a:spcPts val="283"/>
               </a:spcBef>
@@ -4910,12 +4910,12 @@
               <a:buChar char=""/>
             </a:pPr>
             <a:r>
-              <a:rPr b="0" lang="pt-BR" sz="2000" spc="-1" strike="noStrike">
+              <a:rPr b="0" lang="pt-BR" sz="1800" spc="-1" strike="noStrike">
                 <a:latin typeface="Arial"/>
               </a:rPr>
               <a:t>7.º nível da estrutura de tópicos</a:t>
             </a:r>
-            <a:endParaRPr b="0" lang="pt-BR" sz="2000" spc="-1" strike="noStrike">
+            <a:endParaRPr b="0" lang="pt-BR" sz="1800" spc="-1" strike="noStrike">
               <a:latin typeface="Arial"/>
             </a:endParaRPr>
           </a:p>
@@ -4942,10 +4942,10 @@
         </p:spPr>
         <p:txBody>
           <a:bodyPr lIns="0" rIns="0" tIns="0" bIns="0">
-            <a:normAutofit fontScale="64000"/>
-          </a:bodyPr>
-          <a:p>
-            <a:pPr marL="432000" indent="-324000">
+            <a:normAutofit/>
+          </a:bodyPr>
+          <a:p>
+            <a:pPr marL="432000" indent="-324000" algn="ctr">
               <a:spcBef>
                 <a:spcPts val="1417"/>
               </a:spcBef>
@@ -4957,17 +4957,17 @@
               <a:buChar char=""/>
             </a:pPr>
             <a:r>
-              <a:rPr b="0" lang="pt-BR" sz="3200" spc="-1" strike="noStrike">
+              <a:rPr b="0" lang="pt-BR" sz="1800" spc="-1" strike="noStrike">
                 <a:latin typeface="Arial"/>
               </a:rPr>
               <a:t>Clique para editar o formato do texto da estrutura de tópicos</a:t>
             </a:r>
-            <a:endParaRPr b="0" lang="pt-BR" sz="3200" spc="-1" strike="noStrike">
-              <a:latin typeface="Arial"/>
-            </a:endParaRPr>
-          </a:p>
-          <a:p>
-            <a:pPr lvl="1" marL="864000" indent="-324000">
+            <a:endParaRPr b="0" lang="pt-BR" sz="1800" spc="-1" strike="noStrike">
+              <a:latin typeface="Arial"/>
+            </a:endParaRPr>
+          </a:p>
+          <a:p>
+            <a:pPr lvl="1" marL="864000" indent="-324000" algn="ctr">
               <a:spcBef>
                 <a:spcPts val="1134"/>
               </a:spcBef>
@@ -4979,17 +4979,17 @@
               <a:buChar char=""/>
             </a:pPr>
             <a:r>
-              <a:rPr b="0" lang="pt-BR" sz="2800" spc="-1" strike="noStrike">
+              <a:rPr b="0" lang="pt-BR" sz="1800" spc="-1" strike="noStrike">
                 <a:latin typeface="Arial"/>
               </a:rPr>
               <a:t>2.º nível da estrutura de tópicos</a:t>
             </a:r>
-            <a:endParaRPr b="0" lang="pt-BR" sz="2800" spc="-1" strike="noStrike">
-              <a:latin typeface="Arial"/>
-            </a:endParaRPr>
-          </a:p>
-          <a:p>
-            <a:pPr lvl="2" marL="1296000" indent="-288000">
+            <a:endParaRPr b="0" lang="pt-BR" sz="1800" spc="-1" strike="noStrike">
+              <a:latin typeface="Arial"/>
+            </a:endParaRPr>
+          </a:p>
+          <a:p>
+            <a:pPr lvl="2" marL="1296000" indent="-288000" algn="ctr">
               <a:spcBef>
                 <a:spcPts val="850"/>
               </a:spcBef>
@@ -5001,17 +5001,17 @@
               <a:buChar char=""/>
             </a:pPr>
             <a:r>
-              <a:rPr b="0" lang="pt-BR" sz="2400" spc="-1" strike="noStrike">
+              <a:rPr b="0" lang="pt-BR" sz="1800" spc="-1" strike="noStrike">
                 <a:latin typeface="Arial"/>
               </a:rPr>
               <a:t>3.º nível da estrutura de tópicos</a:t>
             </a:r>
-            <a:endParaRPr b="0" lang="pt-BR" sz="2400" spc="-1" strike="noStrike">
-              <a:latin typeface="Arial"/>
-            </a:endParaRPr>
-          </a:p>
-          <a:p>
-            <a:pPr lvl="3" marL="1728000" indent="-216000">
+            <a:endParaRPr b="0" lang="pt-BR" sz="1800" spc="-1" strike="noStrike">
+              <a:latin typeface="Arial"/>
+            </a:endParaRPr>
+          </a:p>
+          <a:p>
+            <a:pPr lvl="3" marL="1728000" indent="-216000" algn="ctr">
               <a:spcBef>
                 <a:spcPts val="567"/>
               </a:spcBef>
@@ -5023,17 +5023,17 @@
               <a:buChar char=""/>
             </a:pPr>
             <a:r>
-              <a:rPr b="0" lang="pt-BR" sz="2000" spc="-1" strike="noStrike">
+              <a:rPr b="0" lang="pt-BR" sz="1800" spc="-1" strike="noStrike">
                 <a:latin typeface="Arial"/>
               </a:rPr>
               <a:t>4.º nível da estrutura de tópicos</a:t>
             </a:r>
-            <a:endParaRPr b="0" lang="pt-BR" sz="2000" spc="-1" strike="noStrike">
-              <a:latin typeface="Arial"/>
-            </a:endParaRPr>
-          </a:p>
-          <a:p>
-            <a:pPr lvl="4" marL="2160000" indent="-216000">
+            <a:endParaRPr b="0" lang="pt-BR" sz="1800" spc="-1" strike="noStrike">
+              <a:latin typeface="Arial"/>
+            </a:endParaRPr>
+          </a:p>
+          <a:p>
+            <a:pPr lvl="4" marL="2160000" indent="-216000" algn="ctr">
               <a:spcBef>
                 <a:spcPts val="283"/>
               </a:spcBef>
@@ -5045,17 +5045,17 @@
               <a:buChar char=""/>
             </a:pPr>
             <a:r>
-              <a:rPr b="0" lang="pt-BR" sz="2000" spc="-1" strike="noStrike">
+              <a:rPr b="0" lang="pt-BR" sz="1800" spc="-1" strike="noStrike">
                 <a:latin typeface="Arial"/>
               </a:rPr>
               <a:t>5.º nível da estrutura de tópicos</a:t>
             </a:r>
-            <a:endParaRPr b="0" lang="pt-BR" sz="2000" spc="-1" strike="noStrike">
-              <a:latin typeface="Arial"/>
-            </a:endParaRPr>
-          </a:p>
-          <a:p>
-            <a:pPr lvl="5" marL="2592000" indent="-216000">
+            <a:endParaRPr b="0" lang="pt-BR" sz="1800" spc="-1" strike="noStrike">
+              <a:latin typeface="Arial"/>
+            </a:endParaRPr>
+          </a:p>
+          <a:p>
+            <a:pPr lvl="5" marL="2592000" indent="-216000" algn="ctr">
               <a:spcBef>
                 <a:spcPts val="283"/>
               </a:spcBef>
@@ -5067,17 +5067,17 @@
               <a:buChar char=""/>
             </a:pPr>
             <a:r>
-              <a:rPr b="0" lang="pt-BR" sz="2000" spc="-1" strike="noStrike">
+              <a:rPr b="0" lang="pt-BR" sz="1800" spc="-1" strike="noStrike">
                 <a:latin typeface="Arial"/>
               </a:rPr>
               <a:t>6.º nível da estrutura de tópicos</a:t>
             </a:r>
-            <a:endParaRPr b="0" lang="pt-BR" sz="2000" spc="-1" strike="noStrike">
-              <a:latin typeface="Arial"/>
-            </a:endParaRPr>
-          </a:p>
-          <a:p>
-            <a:pPr lvl="6" marL="3024000" indent="-216000">
+            <a:endParaRPr b="0" lang="pt-BR" sz="1800" spc="-1" strike="noStrike">
+              <a:latin typeface="Arial"/>
+            </a:endParaRPr>
+          </a:p>
+          <a:p>
+            <a:pPr lvl="6" marL="3024000" indent="-216000" algn="ctr">
               <a:spcBef>
                 <a:spcPts val="283"/>
               </a:spcBef>
@@ -5089,12 +5089,12 @@
               <a:buChar char=""/>
             </a:pPr>
             <a:r>
-              <a:rPr b="0" lang="pt-BR" sz="2000" spc="-1" strike="noStrike">
+              <a:rPr b="0" lang="pt-BR" sz="1800" spc="-1" strike="noStrike">
                 <a:latin typeface="Arial"/>
               </a:rPr>
               <a:t>7.º nível da estrutura de tópicos</a:t>
             </a:r>
-            <a:endParaRPr b="0" lang="pt-BR" sz="2000" spc="-1" strike="noStrike">
+            <a:endParaRPr b="0" lang="pt-BR" sz="1800" spc="-1" strike="noStrike">
               <a:latin typeface="Arial"/>
             </a:endParaRPr>
           </a:p>
@@ -5146,7 +5146,7 @@
         <p:spPr>
           <a:xfrm>
             <a:off x="1523880" y="523800"/>
-            <a:ext cx="9141120" cy="2384640"/>
+            <a:ext cx="9140760" cy="2384280"/>
           </a:xfrm>
           <a:prstGeom prst="rect">
             <a:avLst/>
@@ -5197,7 +5197,7 @@
         <p:spPr>
           <a:xfrm>
             <a:off x="1523880" y="3003480"/>
-            <a:ext cx="9141120" cy="2238840"/>
+            <a:ext cx="9140760" cy="2238480"/>
           </a:xfrm>
           <a:prstGeom prst="rect">
             <a:avLst/>
@@ -5340,7 +5340,7 @@
         <p:spPr>
           <a:xfrm>
             <a:off x="838080" y="365040"/>
-            <a:ext cx="10512720" cy="1322640"/>
+            <a:ext cx="10512360" cy="1322280"/>
           </a:xfrm>
           <a:prstGeom prst="rect">
             <a:avLst/>
@@ -5391,7 +5391,7 @@
         <p:spPr>
           <a:xfrm>
             <a:off x="838080" y="1825560"/>
-            <a:ext cx="10512720" cy="4348440"/>
+            <a:ext cx="10512360" cy="4348080"/>
           </a:xfrm>
           <a:prstGeom prst="rect">
             <a:avLst/>
@@ -5447,7 +5447,7 @@
         <p:spPr>
           <a:xfrm>
             <a:off x="838080" y="365040"/>
-            <a:ext cx="10512720" cy="1322640"/>
+            <a:ext cx="10512360" cy="1322280"/>
           </a:xfrm>
           <a:prstGeom prst="rect">
             <a:avLst/>
@@ -5498,7 +5498,7 @@
         <p:spPr>
           <a:xfrm>
             <a:off x="838080" y="1825560"/>
-            <a:ext cx="10512720" cy="4348440"/>
+            <a:ext cx="10512360" cy="4348080"/>
           </a:xfrm>
           <a:prstGeom prst="rect">
             <a:avLst/>
@@ -5554,7 +5554,7 @@
         <p:spPr>
           <a:xfrm>
             <a:off x="838080" y="365040"/>
-            <a:ext cx="10512720" cy="1322640"/>
+            <a:ext cx="10512360" cy="1322280"/>
           </a:xfrm>
           <a:prstGeom prst="rect">
             <a:avLst/>
@@ -5605,7 +5605,7 @@
         <p:spPr>
           <a:xfrm>
             <a:off x="838080" y="1689480"/>
-            <a:ext cx="10512720" cy="4484520"/>
+            <a:ext cx="10512360" cy="4484160"/>
           </a:xfrm>
           <a:prstGeom prst="rect">
             <a:avLst/>
@@ -5729,7 +5729,7 @@
         <p:spPr>
           <a:xfrm>
             <a:off x="838080" y="365040"/>
-            <a:ext cx="10512720" cy="1322640"/>
+            <a:ext cx="10512360" cy="1322280"/>
           </a:xfrm>
           <a:prstGeom prst="rect">
             <a:avLst/>
@@ -5780,7 +5780,7 @@
         <p:spPr>
           <a:xfrm>
             <a:off x="360000" y="1499040"/>
-            <a:ext cx="11518200" cy="2412720"/>
+            <a:ext cx="11517840" cy="2412360"/>
           </a:xfrm>
           <a:prstGeom prst="rect">
             <a:avLst/>
@@ -5915,7 +5915,7 @@
         <p:spPr>
           <a:xfrm>
             <a:off x="432000" y="4407480"/>
-            <a:ext cx="2360160" cy="2360160"/>
+            <a:ext cx="2359800" cy="2359800"/>
           </a:xfrm>
           <a:prstGeom prst="rect">
             <a:avLst/>
@@ -5964,7 +5964,7 @@
         <p:spPr>
           <a:xfrm>
             <a:off x="838080" y="365040"/>
-            <a:ext cx="10512720" cy="604440"/>
+            <a:ext cx="10512360" cy="604080"/>
           </a:xfrm>
           <a:prstGeom prst="rect">
             <a:avLst/>
@@ -6015,7 +6015,7 @@
         <p:spPr>
           <a:xfrm>
             <a:off x="9156600" y="1102680"/>
-            <a:ext cx="2194200" cy="3552840"/>
+            <a:ext cx="2193840" cy="3552480"/>
           </a:xfrm>
           <a:prstGeom prst="rect">
             <a:avLst/>
@@ -6248,7 +6248,7 @@
         <p:spPr>
           <a:xfrm>
             <a:off x="2764440" y="2878200"/>
-            <a:ext cx="2088720" cy="1777320"/>
+            <a:ext cx="2088360" cy="1776960"/>
           </a:xfrm>
           <a:prstGeom prst="rect">
             <a:avLst/>
@@ -6391,7 +6391,7 @@
         <p:spPr>
           <a:xfrm>
             <a:off x="4929120" y="1102680"/>
-            <a:ext cx="2000880" cy="4971240"/>
+            <a:ext cx="2000520" cy="4970880"/>
           </a:xfrm>
           <a:prstGeom prst="rect">
             <a:avLst/>
@@ -6604,7 +6604,7 @@
         <p:spPr>
           <a:xfrm>
             <a:off x="7007040" y="1102680"/>
-            <a:ext cx="2073960" cy="1733400"/>
+            <a:ext cx="2073600" cy="1733040"/>
           </a:xfrm>
           <a:prstGeom prst="rect">
             <a:avLst/>
@@ -6747,7 +6747,7 @@
         <p:spPr>
           <a:xfrm>
             <a:off x="766800" y="1103400"/>
-            <a:ext cx="1935720" cy="3552120"/>
+            <a:ext cx="1935360" cy="3551760"/>
           </a:xfrm>
           <a:prstGeom prst="rect">
             <a:avLst/>
@@ -6960,7 +6960,7 @@
         <p:spPr>
           <a:xfrm>
             <a:off x="766800" y="4708440"/>
-            <a:ext cx="4086720" cy="1365120"/>
+            <a:ext cx="4086360" cy="1364760"/>
           </a:xfrm>
           <a:prstGeom prst="rect">
             <a:avLst/>
@@ -7103,7 +7103,7 @@
         <p:spPr>
           <a:xfrm>
             <a:off x="7007040" y="2889000"/>
-            <a:ext cx="2077920" cy="1766520"/>
+            <a:ext cx="2077560" cy="1766160"/>
           </a:xfrm>
           <a:prstGeom prst="rect">
             <a:avLst/>
@@ -7246,7 +7246,7 @@
         <p:spPr>
           <a:xfrm>
             <a:off x="7007040" y="4708440"/>
-            <a:ext cx="4343760" cy="1350360"/>
+            <a:ext cx="4343400" cy="1350000"/>
           </a:xfrm>
           <a:prstGeom prst="rect">
             <a:avLst/>
@@ -7349,7 +7349,7 @@
         <p:spPr>
           <a:xfrm>
             <a:off x="2764440" y="1102680"/>
-            <a:ext cx="2091960" cy="1733400"/>
+            <a:ext cx="2091600" cy="1733040"/>
           </a:xfrm>
           <a:prstGeom prst="rect">
             <a:avLst/>
@@ -7522,7 +7522,7 @@
         <p:spPr>
           <a:xfrm>
             <a:off x="838080" y="365040"/>
-            <a:ext cx="10512720" cy="1322640"/>
+            <a:ext cx="10512360" cy="1322280"/>
           </a:xfrm>
           <a:prstGeom prst="rect">
             <a:avLst/>
@@ -7573,7 +7573,7 @@
         <p:spPr>
           <a:xfrm>
             <a:off x="838080" y="1825560"/>
-            <a:ext cx="10512720" cy="4348440"/>
+            <a:ext cx="10512360" cy="4348080"/>
           </a:xfrm>
           <a:prstGeom prst="rect">
             <a:avLst/>
@@ -7748,7 +7748,7 @@
         <p:spPr>
           <a:xfrm>
             <a:off x="838080" y="365040"/>
-            <a:ext cx="10512720" cy="1322640"/>
+            <a:ext cx="10512360" cy="1322280"/>
           </a:xfrm>
           <a:prstGeom prst="rect">
             <a:avLst/>
@@ -7799,7 +7799,7 @@
         <p:spPr>
           <a:xfrm>
             <a:off x="838080" y="1825560"/>
-            <a:ext cx="5178600" cy="4348440"/>
+            <a:ext cx="5178240" cy="4348080"/>
           </a:xfrm>
           <a:prstGeom prst="rect">
             <a:avLst/>
@@ -7825,7 +7825,7 @@
         <p:spPr>
           <a:xfrm>
             <a:off x="720000" y="1692000"/>
-            <a:ext cx="10630800" cy="4348440"/>
+            <a:ext cx="10630440" cy="4348080"/>
           </a:xfrm>
           <a:prstGeom prst="rect">
             <a:avLst/>
@@ -7866,7 +7866,7 @@
             </a:endParaRPr>
           </a:p>
           <a:p>
-            <a:pPr marL="216000" indent="-214920">
+            <a:pPr marL="216000" indent="-214560">
               <a:lnSpc>
                 <a:spcPct val="100000"/>
               </a:lnSpc>
@@ -7891,7 +7891,7 @@
             </a:endParaRPr>
           </a:p>
           <a:p>
-            <a:pPr marL="216000" indent="-214920">
+            <a:pPr marL="216000" indent="-214560">
               <a:lnSpc>
                 <a:spcPct val="100000"/>
               </a:lnSpc>
@@ -7946,7 +7946,7 @@
             </a:endParaRPr>
           </a:p>
           <a:p>
-            <a:pPr marL="216000" indent="-214920">
+            <a:pPr marL="216000" indent="-214560">
               <a:lnSpc>
                 <a:spcPct val="100000"/>
               </a:lnSpc>
@@ -7971,7 +7971,7 @@
             </a:endParaRPr>
           </a:p>
           <a:p>
-            <a:pPr marL="216000" indent="-214920">
+            <a:pPr marL="216000" indent="-214560">
               <a:lnSpc>
                 <a:spcPct val="100000"/>
               </a:lnSpc>
@@ -8026,7 +8026,7 @@
             </a:endParaRPr>
           </a:p>
           <a:p>
-            <a:pPr marL="216000" indent="-214920">
+            <a:pPr marL="216000" indent="-214560">
               <a:lnSpc>
                 <a:spcPct val="100000"/>
               </a:lnSpc>
@@ -8051,7 +8051,7 @@
             </a:endParaRPr>
           </a:p>
           <a:p>
-            <a:pPr marL="216000" indent="-214920">
+            <a:pPr marL="216000" indent="-214560">
               <a:lnSpc>
                 <a:spcPct val="100000"/>
               </a:lnSpc>
@@ -8076,7 +8076,7 @@
             </a:endParaRPr>
           </a:p>
           <a:p>
-            <a:pPr marL="216000" indent="-214920">
+            <a:pPr marL="216000" indent="-214560">
               <a:lnSpc>
                 <a:spcPct val="100000"/>
               </a:lnSpc>
@@ -8161,7 +8161,7 @@
         <p:spPr>
           <a:xfrm>
             <a:off x="838080" y="365040"/>
-            <a:ext cx="10512720" cy="1322640"/>
+            <a:ext cx="10512360" cy="1322280"/>
           </a:xfrm>
           <a:prstGeom prst="rect">
             <a:avLst/>
@@ -8212,7 +8212,7 @@
         <p:spPr>
           <a:xfrm>
             <a:off x="720000" y="1368000"/>
-            <a:ext cx="10630800" cy="4672440"/>
+            <a:ext cx="10630440" cy="4672080"/>
           </a:xfrm>
           <a:prstGeom prst="rect">
             <a:avLst/>
@@ -8473,7 +8473,7 @@
         <p:spPr>
           <a:xfrm>
             <a:off x="838080" y="365040"/>
-            <a:ext cx="10512720" cy="1322640"/>
+            <a:ext cx="10512360" cy="1322280"/>
           </a:xfrm>
           <a:prstGeom prst="rect">
             <a:avLst/>
@@ -8515,77 +8515,451 @@
           </a:p>
         </p:txBody>
       </p:sp>
-      <p:sp>
-        <p:nvSpPr>
-          <p:cNvPr id="143" name="CustomShape 2"/>
-          <p:cNvSpPr/>
+      <p:graphicFrame>
+        <p:nvGraphicFramePr>
+          <p:cNvPr id="143" name="Table 2"/>
+          <p:cNvGraphicFramePr/>
           <p:nvPr/>
-        </p:nvSpPr>
-        <p:spPr>
-          <a:xfrm>
-            <a:off x="720000" y="1368000"/>
-            <a:ext cx="10630800" cy="4672440"/>
-          </a:xfrm>
-          <a:prstGeom prst="rect">
-            <a:avLst/>
-          </a:prstGeom>
-          <a:noFill/>
-          <a:ln>
-            <a:noFill/>
-          </a:ln>
-        </p:spPr>
-        <p:style>
-          <a:lnRef idx="0"/>
-          <a:fillRef idx="0"/>
-          <a:effectRef idx="0"/>
-          <a:fontRef idx="minor"/>
-        </p:style>
-        <p:txBody>
-          <a:bodyPr lIns="90000" rIns="90000" tIns="45000" bIns="45000">
-            <a:noAutofit/>
-          </a:bodyPr>
-          <a:p>
-            <a:pPr algn="just">
-              <a:lnSpc>
-                <a:spcPct val="100000"/>
-              </a:lnSpc>
-            </a:pPr>
-            <a:r>
-              <a:rPr b="0" lang="pt-BR" sz="2000" spc="-1" strike="noStrike">
-                <a:solidFill>
-                  <a:srgbClr val="000000"/>
-                </a:solidFill>
-                <a:latin typeface="Times New Roman"/>
-                <a:ea typeface="DejaVu Sans"/>
-              </a:rPr>
-              <a:t>Análise Swot</a:t>
-            </a:r>
-            <a:endParaRPr b="0" lang="pt-BR" sz="2000" spc="-1" strike="noStrike">
-              <a:latin typeface="Arial"/>
-            </a:endParaRPr>
-          </a:p>
-          <a:p>
-            <a:pPr algn="just">
-              <a:lnSpc>
-                <a:spcPct val="100000"/>
-              </a:lnSpc>
-            </a:pPr>
-            <a:endParaRPr b="0" lang="pt-BR" sz="2000" spc="-1" strike="noStrike">
-              <a:latin typeface="Arial"/>
-            </a:endParaRPr>
-          </a:p>
-          <a:p>
-            <a:pPr algn="just">
-              <a:lnSpc>
-                <a:spcPct val="100000"/>
-              </a:lnSpc>
-            </a:pPr>
-            <a:endParaRPr b="0" lang="pt-BR" sz="2000" spc="-1" strike="noStrike">
-              <a:latin typeface="Arial"/>
-            </a:endParaRPr>
-          </a:p>
-        </p:txBody>
-      </p:sp>
+        </p:nvGraphicFramePr>
+        <p:xfrm>
+          <a:off x="158040" y="1627560"/>
+          <a:ext cx="11840040" cy="4635360"/>
+        </p:xfrm>
+        <a:graphic>
+          <a:graphicData uri="http://schemas.openxmlformats.org/drawingml/2006/table">
+            <a:tbl>
+              <a:tblPr/>
+              <a:tblGrid>
+                <a:gridCol w="5919480"/>
+                <a:gridCol w="5920560"/>
+              </a:tblGrid>
+              <a:tr h="1688760">
+                <a:tc>
+                  <a:txBody>
+                    <a:bodyPr lIns="90000" rIns="90000" tIns="46800" bIns="46800">
+                      <a:noAutofit/>
+                    </a:bodyPr>
+                    <a:p>
+                      <a:r>
+                        <a:rPr b="0" lang="pt-BR" sz="1800" spc="-1" strike="noStrike">
+                          <a:solidFill>
+                            <a:srgbClr val="2a6099"/>
+                          </a:solidFill>
+                          <a:latin typeface="Arial"/>
+                        </a:rPr>
+                        <a:t>Força</a:t>
+                      </a:r>
+                      <a:endParaRPr b="0" lang="pt-BR" sz="1800" spc="-1" strike="noStrike">
+                        <a:solidFill>
+                          <a:srgbClr val="2a6099"/>
+                        </a:solidFill>
+                        <a:latin typeface="Arial"/>
+                      </a:endParaRPr>
+                    </a:p>
+                    <a:p>
+                      <a:endParaRPr b="0" lang="pt-BR" sz="1800" spc="-1" strike="noStrike">
+                        <a:solidFill>
+                          <a:srgbClr val="2a6099"/>
+                        </a:solidFill>
+                        <a:latin typeface="Arial"/>
+                      </a:endParaRPr>
+                    </a:p>
+                    <a:p>
+                      <a:r>
+                        <a:rPr b="0" lang="pt-BR" sz="1800" spc="-1" strike="noStrike">
+                          <a:solidFill>
+                            <a:srgbClr val="2a6099"/>
+                          </a:solidFill>
+                          <a:latin typeface="Arial"/>
+                        </a:rPr>
+                        <a:t>- Conhecimento da produção de linguiças e defumados</a:t>
+                      </a:r>
+                      <a:endParaRPr b="0" lang="pt-BR" sz="1800" spc="-1" strike="noStrike">
+                        <a:solidFill>
+                          <a:srgbClr val="2a6099"/>
+                        </a:solidFill>
+                        <a:latin typeface="Arial"/>
+                      </a:endParaRPr>
+                    </a:p>
+                    <a:p>
+                      <a:endParaRPr b="0" lang="pt-BR" sz="1800" spc="-1" strike="noStrike">
+                        <a:solidFill>
+                          <a:srgbClr val="2a6099"/>
+                        </a:solidFill>
+                        <a:latin typeface="Arial"/>
+                      </a:endParaRPr>
+                    </a:p>
+                    <a:p>
+                      <a:r>
+                        <a:rPr b="0" lang="pt-BR" sz="1800" spc="-1" strike="noStrike">
+                          <a:solidFill>
+                            <a:srgbClr val="2a6099"/>
+                          </a:solidFill>
+                          <a:latin typeface="Arial"/>
+                        </a:rPr>
+                        <a:t>- Mão de obra barata</a:t>
+                      </a:r>
+                      <a:endParaRPr b="0" lang="pt-BR" sz="1800" spc="-1" strike="noStrike">
+                        <a:solidFill>
+                          <a:srgbClr val="2a6099"/>
+                        </a:solidFill>
+                        <a:latin typeface="Arial"/>
+                      </a:endParaRPr>
+                    </a:p>
+                  </a:txBody>
+                  <a:tcPr marL="90000" marR="90000">
+                    <a:lnL w="720">
+                      <a:solidFill>
+                        <a:srgbClr val="ffffff"/>
+                      </a:solidFill>
+                    </a:lnL>
+                    <a:lnR w="720">
+                      <a:solidFill>
+                        <a:srgbClr val="ffffff"/>
+                      </a:solidFill>
+                    </a:lnR>
+                    <a:lnT w="720">
+                      <a:solidFill>
+                        <a:srgbClr val="ffffff"/>
+                      </a:solidFill>
+                    </a:lnT>
+                    <a:lnB w="720">
+                      <a:solidFill>
+                        <a:srgbClr val="ffffff"/>
+                      </a:solidFill>
+                    </a:lnB>
+                    <a:solidFill>
+                      <a:srgbClr val="b3b3b3"/>
+                    </a:solidFill>
+                  </a:tcPr>
+                </a:tc>
+                <a:tc>
+                  <a:txBody>
+                    <a:bodyPr lIns="90000" rIns="90000" tIns="46800" bIns="46800">
+                      <a:noAutofit/>
+                    </a:bodyPr>
+                    <a:p>
+                      <a:r>
+                        <a:rPr b="0" lang="pt-BR" sz="1800" spc="-1" strike="noStrike">
+                          <a:solidFill>
+                            <a:srgbClr val="ff8000"/>
+                          </a:solidFill>
+                          <a:latin typeface="Arial"/>
+                        </a:rPr>
+                        <a:t>Fraqueza</a:t>
+                      </a:r>
+                      <a:endParaRPr b="0" lang="pt-BR" sz="1800" spc="-1" strike="noStrike">
+                        <a:solidFill>
+                          <a:srgbClr val="ff8000"/>
+                        </a:solidFill>
+                        <a:latin typeface="Arial"/>
+                      </a:endParaRPr>
+                    </a:p>
+                    <a:p>
+                      <a:endParaRPr b="0" lang="pt-BR" sz="1800" spc="-1" strike="noStrike">
+                        <a:solidFill>
+                          <a:srgbClr val="ff8000"/>
+                        </a:solidFill>
+                        <a:latin typeface="Arial"/>
+                      </a:endParaRPr>
+                    </a:p>
+                    <a:p>
+                      <a:r>
+                        <a:rPr b="0" lang="pt-BR" sz="1800" spc="-1" strike="noStrike">
+                          <a:solidFill>
+                            <a:srgbClr val="ff8000"/>
+                          </a:solidFill>
+                          <a:latin typeface="Arial"/>
+                        </a:rPr>
+                        <a:t>- Primeiro empreendimento</a:t>
+                      </a:r>
+                      <a:endParaRPr b="0" lang="pt-BR" sz="1800" spc="-1" strike="noStrike">
+                        <a:solidFill>
+                          <a:srgbClr val="ff8000"/>
+                        </a:solidFill>
+                        <a:latin typeface="Arial"/>
+                      </a:endParaRPr>
+                    </a:p>
+                    <a:p>
+                      <a:endParaRPr b="0" lang="pt-BR" sz="1800" spc="-1" strike="noStrike">
+                        <a:solidFill>
+                          <a:srgbClr val="ff8000"/>
+                        </a:solidFill>
+                        <a:latin typeface="Arial"/>
+                      </a:endParaRPr>
+                    </a:p>
+                    <a:p>
+                      <a:r>
+                        <a:rPr b="0" lang="pt-BR" sz="1800" spc="-1" strike="noStrike">
+                          <a:solidFill>
+                            <a:srgbClr val="ff8000"/>
+                          </a:solidFill>
+                          <a:latin typeface="Arial"/>
+                        </a:rPr>
+                        <a:t>- Investimento de capital próprio</a:t>
+                      </a:r>
+                      <a:endParaRPr b="0" lang="pt-BR" sz="1800" spc="-1" strike="noStrike">
+                        <a:solidFill>
+                          <a:srgbClr val="ff8000"/>
+                        </a:solidFill>
+                        <a:latin typeface="Arial"/>
+                      </a:endParaRPr>
+                    </a:p>
+                  </a:txBody>
+                  <a:tcPr marL="90000" marR="90000">
+                    <a:lnL w="720">
+                      <a:solidFill>
+                        <a:srgbClr val="ffffff"/>
+                      </a:solidFill>
+                    </a:lnL>
+                    <a:lnR w="720">
+                      <a:solidFill>
+                        <a:srgbClr val="ffffff"/>
+                      </a:solidFill>
+                    </a:lnR>
+                    <a:lnT w="720">
+                      <a:solidFill>
+                        <a:srgbClr val="ffffff"/>
+                      </a:solidFill>
+                    </a:lnT>
+                    <a:lnB w="720">
+                      <a:solidFill>
+                        <a:srgbClr val="ffffff"/>
+                      </a:solidFill>
+                    </a:lnB>
+                    <a:solidFill>
+                      <a:srgbClr val="b3b3b3"/>
+                    </a:solidFill>
+                  </a:tcPr>
+                </a:tc>
+              </a:tr>
+              <a:tr h="1958760">
+                <a:tc>
+                  <a:txBody>
+                    <a:bodyPr lIns="90000" rIns="90000" tIns="46800" bIns="46800">
+                      <a:noAutofit/>
+                    </a:bodyPr>
+                    <a:p>
+                      <a:r>
+                        <a:rPr b="0" lang="pt-BR" sz="1800" spc="-1" strike="noStrike">
+                          <a:solidFill>
+                            <a:srgbClr val="00a933"/>
+                          </a:solidFill>
+                          <a:latin typeface="Arial"/>
+                        </a:rPr>
+                        <a:t>Oportunidade</a:t>
+                      </a:r>
+                      <a:endParaRPr b="0" lang="pt-BR" sz="1800" spc="-1" strike="noStrike">
+                        <a:solidFill>
+                          <a:srgbClr val="00a933"/>
+                        </a:solidFill>
+                        <a:latin typeface="Arial"/>
+                      </a:endParaRPr>
+                    </a:p>
+                    <a:p>
+                      <a:endParaRPr b="0" lang="pt-BR" sz="1800" spc="-1" strike="noStrike">
+                        <a:solidFill>
+                          <a:srgbClr val="00a933"/>
+                        </a:solidFill>
+                        <a:latin typeface="Arial"/>
+                      </a:endParaRPr>
+                    </a:p>
+                    <a:p>
+                      <a:r>
+                        <a:rPr b="0" lang="pt-BR" sz="2000" spc="-1" strike="noStrike">
+                          <a:solidFill>
+                            <a:srgbClr val="00a933"/>
+                          </a:solidFill>
+                          <a:latin typeface="Times New Roman"/>
+                          <a:ea typeface="DejaVu Sans"/>
+                        </a:rPr>
+                        <a:t>- Fluxo constante de turistas durante todo o ano</a:t>
+                      </a:r>
+                      <a:endParaRPr b="0" lang="pt-BR" sz="2000" spc="-1" strike="noStrike">
+                        <a:solidFill>
+                          <a:srgbClr val="00a933"/>
+                        </a:solidFill>
+                        <a:latin typeface="Arial"/>
+                      </a:endParaRPr>
+                    </a:p>
+                    <a:p>
+                      <a:endParaRPr b="0" lang="pt-BR" sz="2000" spc="-1" strike="noStrike">
+                        <a:solidFill>
+                          <a:srgbClr val="00a933"/>
+                        </a:solidFill>
+                        <a:latin typeface="Arial"/>
+                      </a:endParaRPr>
+                    </a:p>
+                    <a:p>
+                      <a:r>
+                        <a:rPr b="0" lang="pt-BR" sz="2000" spc="-1" strike="noStrike">
+                          <a:solidFill>
+                            <a:srgbClr val="00a933"/>
+                          </a:solidFill>
+                          <a:latin typeface="Times New Roman"/>
+                          <a:ea typeface="DejaVu Sans"/>
+                        </a:rPr>
+                        <a:t>- Grande número de estudantes universitários (UFVJM)</a:t>
+                      </a:r>
+                      <a:endParaRPr b="0" lang="pt-BR" sz="2000" spc="-1" strike="noStrike">
+                        <a:solidFill>
+                          <a:srgbClr val="00a933"/>
+                        </a:solidFill>
+                        <a:latin typeface="Arial"/>
+                      </a:endParaRPr>
+                    </a:p>
+                  </a:txBody>
+                  <a:tcPr marL="90000" marR="90000">
+                    <a:lnL w="720">
+                      <a:solidFill>
+                        <a:srgbClr val="ffffff"/>
+                      </a:solidFill>
+                    </a:lnL>
+                    <a:lnR w="720">
+                      <a:solidFill>
+                        <a:srgbClr val="ffffff"/>
+                      </a:solidFill>
+                    </a:lnR>
+                    <a:lnT w="720">
+                      <a:solidFill>
+                        <a:srgbClr val="ffffff"/>
+                      </a:solidFill>
+                    </a:lnT>
+                    <a:lnB w="720">
+                      <a:solidFill>
+                        <a:srgbClr val="ffffff"/>
+                      </a:solidFill>
+                    </a:lnB>
+                    <a:solidFill>
+                      <a:srgbClr val="cccccc"/>
+                    </a:solidFill>
+                  </a:tcPr>
+                </a:tc>
+                <a:tc>
+                  <a:txBody>
+                    <a:bodyPr lIns="90000" rIns="90000" tIns="46800" bIns="46800">
+                      <a:noAutofit/>
+                    </a:bodyPr>
+                    <a:p>
+                      <a:r>
+                        <a:rPr b="0" lang="pt-BR" sz="2000" spc="-1" strike="noStrike">
+                          <a:solidFill>
+                            <a:srgbClr val="c9211e"/>
+                          </a:solidFill>
+                          <a:latin typeface="Times New Roman"/>
+                          <a:ea typeface="DejaVu Sans"/>
+                        </a:rPr>
+                        <a:t>Ameaças</a:t>
+                      </a:r>
+                      <a:endParaRPr b="0" lang="pt-BR" sz="2000" spc="-1" strike="noStrike">
+                        <a:solidFill>
+                          <a:srgbClr val="c9211e"/>
+                        </a:solidFill>
+                        <a:latin typeface="Arial"/>
+                      </a:endParaRPr>
+                    </a:p>
+                    <a:p>
+                      <a:endParaRPr b="0" lang="pt-BR" sz="2000" spc="-1" strike="noStrike">
+                        <a:solidFill>
+                          <a:srgbClr val="c9211e"/>
+                        </a:solidFill>
+                        <a:latin typeface="Arial"/>
+                      </a:endParaRPr>
+                    </a:p>
+                    <a:p>
+                      <a:r>
+                        <a:rPr b="0" lang="pt-BR" sz="2000" spc="-1" strike="noStrike">
+                          <a:solidFill>
+                            <a:srgbClr val="c9211e"/>
+                          </a:solidFill>
+                          <a:latin typeface="Times New Roman"/>
+                          <a:ea typeface="DejaVu Sans"/>
+                        </a:rPr>
+                        <a:t>- Grande rede de supermercado</a:t>
+                      </a:r>
+                      <a:endParaRPr b="0" lang="pt-BR" sz="2000" spc="-1" strike="noStrike">
+                        <a:solidFill>
+                          <a:srgbClr val="c9211e"/>
+                        </a:solidFill>
+                        <a:latin typeface="Arial"/>
+                      </a:endParaRPr>
+                    </a:p>
+                    <a:p>
+                      <a:endParaRPr b="0" lang="pt-BR" sz="2000" spc="-1" strike="noStrike">
+                        <a:solidFill>
+                          <a:srgbClr val="c9211e"/>
+                        </a:solidFill>
+                        <a:latin typeface="Arial"/>
+                      </a:endParaRPr>
+                    </a:p>
+                    <a:p>
+                      <a:pPr>
+                        <a:lnSpc>
+                          <a:spcPct val="100000"/>
+                        </a:lnSpc>
+                      </a:pPr>
+                      <a:r>
+                        <a:rPr b="0" lang="pt-BR" sz="2000" spc="-1" strike="noStrike">
+                          <a:solidFill>
+                            <a:srgbClr val="c9211e"/>
+                          </a:solidFill>
+                          <a:latin typeface="Times New Roman"/>
+                          <a:ea typeface="DejaVu Sans"/>
+                        </a:rPr>
+                        <a:t>- Pousadas e restaurantes oferecendo comida mineira e regional de bom qualidade</a:t>
+                      </a:r>
+                      <a:endParaRPr b="0" lang="pt-BR" sz="2000" spc="-1" strike="noStrike">
+                        <a:solidFill>
+                          <a:srgbClr val="c9211e"/>
+                        </a:solidFill>
+                        <a:latin typeface="Arial"/>
+                      </a:endParaRPr>
+                    </a:p>
+                    <a:p>
+                      <a:pPr>
+                        <a:lnSpc>
+                          <a:spcPct val="100000"/>
+                        </a:lnSpc>
+                      </a:pPr>
+                      <a:endParaRPr b="0" lang="pt-BR" sz="2000" spc="-1" strike="noStrike">
+                        <a:solidFill>
+                          <a:srgbClr val="c9211e"/>
+                        </a:solidFill>
+                        <a:latin typeface="Arial"/>
+                      </a:endParaRPr>
+                    </a:p>
+                  </a:txBody>
+                  <a:tcPr marL="90000" marR="90000">
+                    <a:lnL w="720">
+                      <a:solidFill>
+                        <a:srgbClr val="ffffff"/>
+                      </a:solidFill>
+                    </a:lnL>
+                    <a:lnR w="720">
+                      <a:solidFill>
+                        <a:srgbClr val="ffffff"/>
+                      </a:solidFill>
+                    </a:lnR>
+                    <a:lnT w="720">
+                      <a:solidFill>
+                        <a:srgbClr val="ffffff"/>
+                      </a:solidFill>
+                    </a:lnT>
+                    <a:lnB w="720">
+                      <a:solidFill>
+                        <a:srgbClr val="ffffff"/>
+                      </a:solidFill>
+                    </a:lnB>
+                    <a:solidFill>
+                      <a:srgbClr val="cccccc"/>
+                    </a:solidFill>
+                  </a:tcPr>
+                </a:tc>
+              </a:tr>
+            </a:tbl>
+          </a:graphicData>
+        </a:graphic>
+      </p:graphicFrame>
     </p:spTree>
   </p:cSld>
   <mc:AlternateContent>
@@ -8625,7 +8999,7 @@
         <p:spPr>
           <a:xfrm>
             <a:off x="838080" y="365040"/>
-            <a:ext cx="10512720" cy="1322640"/>
+            <a:ext cx="10512360" cy="1322280"/>
           </a:xfrm>
           <a:prstGeom prst="rect">
             <a:avLst/>
@@ -8676,7 +9050,7 @@
         <p:spPr>
           <a:xfrm>
             <a:off x="838080" y="1825560"/>
-            <a:ext cx="10512720" cy="4348440"/>
+            <a:ext cx="10512360" cy="4348080"/>
           </a:xfrm>
           <a:prstGeom prst="rect">
             <a:avLst/>

</xml_diff>

<commit_message>
inclusao de mais uma ameaca
</commit_message>
<xml_diff>
--- a/plano-de-negocios-restaurante-tioto.pptx
+++ b/plano-de-negocios-restaurante-tioto.pptx
@@ -4129,7 +4129,7 @@
         <p:spPr>
           <a:xfrm>
             <a:off x="5441040" y="6062040"/>
-            <a:ext cx="1108080" cy="584640"/>
+            <a:ext cx="1107720" cy="584280"/>
           </a:xfrm>
           <a:prstGeom prst="rect">
             <a:avLst/>
@@ -4412,7 +4412,7 @@
         <p:spPr>
           <a:xfrm>
             <a:off x="5540040" y="6176880"/>
-            <a:ext cx="1108080" cy="584640"/>
+            <a:ext cx="1107720" cy="584280"/>
           </a:xfrm>
           <a:prstGeom prst="rect">
             <a:avLst/>
@@ -4695,7 +4695,7 @@
         <p:spPr>
           <a:xfrm>
             <a:off x="5540040" y="6132960"/>
-            <a:ext cx="1108080" cy="584640"/>
+            <a:ext cx="1107720" cy="584280"/>
           </a:xfrm>
           <a:prstGeom prst="rect">
             <a:avLst/>
@@ -5146,7 +5146,7 @@
         <p:spPr>
           <a:xfrm>
             <a:off x="1523880" y="523800"/>
-            <a:ext cx="9140040" cy="2383560"/>
+            <a:ext cx="9139680" cy="2383200"/>
           </a:xfrm>
           <a:prstGeom prst="rect">
             <a:avLst/>
@@ -5197,7 +5197,7 @@
         <p:spPr>
           <a:xfrm>
             <a:off x="1523880" y="3003480"/>
-            <a:ext cx="9140040" cy="2237760"/>
+            <a:ext cx="9139680" cy="2237400"/>
           </a:xfrm>
           <a:prstGeom prst="rect">
             <a:avLst/>
@@ -5340,7 +5340,7 @@
         <p:spPr>
           <a:xfrm>
             <a:off x="838080" y="365040"/>
-            <a:ext cx="10511640" cy="1321560"/>
+            <a:ext cx="10511280" cy="1321200"/>
           </a:xfrm>
           <a:prstGeom prst="rect">
             <a:avLst/>
@@ -5391,7 +5391,7 @@
         <p:spPr>
           <a:xfrm>
             <a:off x="838080" y="1825560"/>
-            <a:ext cx="10511640" cy="4347360"/>
+            <a:ext cx="10511280" cy="4347000"/>
           </a:xfrm>
           <a:prstGeom prst="rect">
             <a:avLst/>
@@ -5447,7 +5447,7 @@
         <p:spPr>
           <a:xfrm>
             <a:off x="838080" y="365040"/>
-            <a:ext cx="10511640" cy="1321560"/>
+            <a:ext cx="10511280" cy="1321200"/>
           </a:xfrm>
           <a:prstGeom prst="rect">
             <a:avLst/>
@@ -5498,7 +5498,7 @@
         <p:spPr>
           <a:xfrm>
             <a:off x="838080" y="1825560"/>
-            <a:ext cx="10511640" cy="4347360"/>
+            <a:ext cx="10511280" cy="4347000"/>
           </a:xfrm>
           <a:prstGeom prst="rect">
             <a:avLst/>
@@ -5554,7 +5554,7 @@
         <p:spPr>
           <a:xfrm>
             <a:off x="838080" y="365040"/>
-            <a:ext cx="10511640" cy="1321560"/>
+            <a:ext cx="10511280" cy="1321200"/>
           </a:xfrm>
           <a:prstGeom prst="rect">
             <a:avLst/>
@@ -5605,7 +5605,7 @@
         <p:spPr>
           <a:xfrm>
             <a:off x="838080" y="1689480"/>
-            <a:ext cx="10511640" cy="4483440"/>
+            <a:ext cx="10511280" cy="4483080"/>
           </a:xfrm>
           <a:prstGeom prst="rect">
             <a:avLst/>
@@ -5729,7 +5729,7 @@
         <p:spPr>
           <a:xfrm>
             <a:off x="838080" y="365040"/>
-            <a:ext cx="10511640" cy="1321560"/>
+            <a:ext cx="10511280" cy="1321200"/>
           </a:xfrm>
           <a:prstGeom prst="rect">
             <a:avLst/>
@@ -5780,7 +5780,7 @@
         <p:spPr>
           <a:xfrm>
             <a:off x="360000" y="1499040"/>
-            <a:ext cx="11517120" cy="2411640"/>
+            <a:ext cx="11516760" cy="2411280"/>
           </a:xfrm>
           <a:prstGeom prst="rect">
             <a:avLst/>
@@ -5915,7 +5915,7 @@
         <p:spPr>
           <a:xfrm>
             <a:off x="432000" y="4407480"/>
-            <a:ext cx="2359080" cy="2359080"/>
+            <a:ext cx="2358720" cy="2358720"/>
           </a:xfrm>
           <a:prstGeom prst="rect">
             <a:avLst/>
@@ -5964,7 +5964,7 @@
         <p:spPr>
           <a:xfrm>
             <a:off x="838080" y="365040"/>
-            <a:ext cx="10511640" cy="603360"/>
+            <a:ext cx="10511280" cy="603000"/>
           </a:xfrm>
           <a:prstGeom prst="rect">
             <a:avLst/>
@@ -6015,7 +6015,7 @@
         <p:spPr>
           <a:xfrm>
             <a:off x="9156600" y="1102680"/>
-            <a:ext cx="2193120" cy="3551760"/>
+            <a:ext cx="2192760" cy="3551400"/>
           </a:xfrm>
           <a:prstGeom prst="rect">
             <a:avLst/>
@@ -6248,7 +6248,7 @@
         <p:spPr>
           <a:xfrm>
             <a:off x="2764440" y="2878200"/>
-            <a:ext cx="2087640" cy="1776240"/>
+            <a:ext cx="2087280" cy="1775880"/>
           </a:xfrm>
           <a:prstGeom prst="rect">
             <a:avLst/>
@@ -6391,7 +6391,7 @@
         <p:spPr>
           <a:xfrm>
             <a:off x="4929120" y="1102680"/>
-            <a:ext cx="1999800" cy="4970160"/>
+            <a:ext cx="1999440" cy="4969800"/>
           </a:xfrm>
           <a:prstGeom prst="rect">
             <a:avLst/>
@@ -6604,7 +6604,7 @@
         <p:spPr>
           <a:xfrm>
             <a:off x="7007040" y="1102680"/>
-            <a:ext cx="2072880" cy="1732320"/>
+            <a:ext cx="2072520" cy="1731960"/>
           </a:xfrm>
           <a:prstGeom prst="rect">
             <a:avLst/>
@@ -6747,7 +6747,7 @@
         <p:spPr>
           <a:xfrm>
             <a:off x="766800" y="1103400"/>
-            <a:ext cx="1934640" cy="3551040"/>
+            <a:ext cx="1934280" cy="3550680"/>
           </a:xfrm>
           <a:prstGeom prst="rect">
             <a:avLst/>
@@ -6960,7 +6960,7 @@
         <p:spPr>
           <a:xfrm>
             <a:off x="766800" y="4708440"/>
-            <a:ext cx="4085640" cy="1364040"/>
+            <a:ext cx="4085280" cy="1363680"/>
           </a:xfrm>
           <a:prstGeom prst="rect">
             <a:avLst/>
@@ -7103,7 +7103,7 @@
         <p:spPr>
           <a:xfrm>
             <a:off x="7007040" y="2889000"/>
-            <a:ext cx="2076840" cy="1765440"/>
+            <a:ext cx="2076480" cy="1765080"/>
           </a:xfrm>
           <a:prstGeom prst="rect">
             <a:avLst/>
@@ -7246,7 +7246,7 @@
         <p:spPr>
           <a:xfrm>
             <a:off x="7007040" y="4708440"/>
-            <a:ext cx="4342680" cy="1349280"/>
+            <a:ext cx="4342320" cy="1348920"/>
           </a:xfrm>
           <a:prstGeom prst="rect">
             <a:avLst/>
@@ -7349,7 +7349,7 @@
         <p:spPr>
           <a:xfrm>
             <a:off x="2764440" y="1102680"/>
-            <a:ext cx="2090880" cy="1732320"/>
+            <a:ext cx="2090520" cy="1731960"/>
           </a:xfrm>
           <a:prstGeom prst="rect">
             <a:avLst/>
@@ -7522,7 +7522,7 @@
         <p:spPr>
           <a:xfrm>
             <a:off x="838080" y="365040"/>
-            <a:ext cx="10511640" cy="1321560"/>
+            <a:ext cx="10511280" cy="1321200"/>
           </a:xfrm>
           <a:prstGeom prst="rect">
             <a:avLst/>
@@ -7573,7 +7573,7 @@
         <p:spPr>
           <a:xfrm>
             <a:off x="838080" y="1825560"/>
-            <a:ext cx="10511640" cy="4347360"/>
+            <a:ext cx="10511280" cy="4347000"/>
           </a:xfrm>
           <a:prstGeom prst="rect">
             <a:avLst/>
@@ -7748,7 +7748,7 @@
         <p:spPr>
           <a:xfrm>
             <a:off x="838080" y="365040"/>
-            <a:ext cx="10511640" cy="1321560"/>
+            <a:ext cx="10511280" cy="1321200"/>
           </a:xfrm>
           <a:prstGeom prst="rect">
             <a:avLst/>
@@ -7799,7 +7799,7 @@
         <p:spPr>
           <a:xfrm>
             <a:off x="838080" y="1825560"/>
-            <a:ext cx="5177520" cy="4347360"/>
+            <a:ext cx="5177160" cy="4347000"/>
           </a:xfrm>
           <a:prstGeom prst="rect">
             <a:avLst/>
@@ -7825,7 +7825,7 @@
         <p:spPr>
           <a:xfrm>
             <a:off x="720000" y="1692000"/>
-            <a:ext cx="10629720" cy="4347360"/>
+            <a:ext cx="10629360" cy="4347000"/>
           </a:xfrm>
           <a:prstGeom prst="rect">
             <a:avLst/>
@@ -7866,7 +7866,7 @@
             </a:endParaRPr>
           </a:p>
           <a:p>
-            <a:pPr marL="216000" indent="-213840">
+            <a:pPr marL="216000" indent="-213480">
               <a:lnSpc>
                 <a:spcPct val="100000"/>
               </a:lnSpc>
@@ -7891,7 +7891,7 @@
             </a:endParaRPr>
           </a:p>
           <a:p>
-            <a:pPr marL="216000" indent="-213840">
+            <a:pPr marL="216000" indent="-213480">
               <a:lnSpc>
                 <a:spcPct val="100000"/>
               </a:lnSpc>
@@ -7946,7 +7946,7 @@
             </a:endParaRPr>
           </a:p>
           <a:p>
-            <a:pPr marL="216000" indent="-213840">
+            <a:pPr marL="216000" indent="-213480">
               <a:lnSpc>
                 <a:spcPct val="100000"/>
               </a:lnSpc>
@@ -7971,7 +7971,7 @@
             </a:endParaRPr>
           </a:p>
           <a:p>
-            <a:pPr marL="216000" indent="-213840">
+            <a:pPr marL="216000" indent="-213480">
               <a:lnSpc>
                 <a:spcPct val="100000"/>
               </a:lnSpc>
@@ -8026,7 +8026,7 @@
             </a:endParaRPr>
           </a:p>
           <a:p>
-            <a:pPr marL="216000" indent="-213840">
+            <a:pPr marL="216000" indent="-213480">
               <a:lnSpc>
                 <a:spcPct val="100000"/>
               </a:lnSpc>
@@ -8051,7 +8051,7 @@
             </a:endParaRPr>
           </a:p>
           <a:p>
-            <a:pPr marL="216000" indent="-213840">
+            <a:pPr marL="216000" indent="-213480">
               <a:lnSpc>
                 <a:spcPct val="100000"/>
               </a:lnSpc>
@@ -8076,7 +8076,7 @@
             </a:endParaRPr>
           </a:p>
           <a:p>
-            <a:pPr marL="216000" indent="-213840">
+            <a:pPr marL="216000" indent="-213480">
               <a:lnSpc>
                 <a:spcPct val="100000"/>
               </a:lnSpc>
@@ -8161,7 +8161,7 @@
         <p:spPr>
           <a:xfrm>
             <a:off x="838080" y="365040"/>
-            <a:ext cx="10511640" cy="1321560"/>
+            <a:ext cx="10511280" cy="1321200"/>
           </a:xfrm>
           <a:prstGeom prst="rect">
             <a:avLst/>
@@ -8212,7 +8212,7 @@
         <p:spPr>
           <a:xfrm>
             <a:off x="720000" y="1368000"/>
-            <a:ext cx="10629720" cy="4671360"/>
+            <a:ext cx="10629360" cy="4671000"/>
           </a:xfrm>
           <a:prstGeom prst="rect">
             <a:avLst/>
@@ -8473,7 +8473,7 @@
         <p:spPr>
           <a:xfrm>
             <a:off x="838080" y="365040"/>
-            <a:ext cx="10511640" cy="1321560"/>
+            <a:ext cx="10511280" cy="1321200"/>
           </a:xfrm>
           <a:prstGeom prst="rect">
             <a:avLst/>
@@ -8944,6 +8944,36 @@
                           <a:latin typeface="Times New Roman"/>
                           <a:ea typeface="DejaVu Sans"/>
                         </a:rPr>
+                        <a:t>- Valor elevado do aluguel no centro histórico</a:t>
+                      </a:r>
+                      <a:endParaRPr b="0" lang="pt-BR" sz="2000" spc="-1" strike="noStrike">
+                        <a:latin typeface="Arial"/>
+                      </a:endParaRPr>
+                    </a:p>
+                    <a:p>
+                      <a:pPr>
+                        <a:lnSpc>
+                          <a:spcPct val="100000"/>
+                        </a:lnSpc>
+                      </a:pPr>
+                      <a:endParaRPr b="0" lang="pt-BR" sz="2000" spc="-1" strike="noStrike">
+                        <a:latin typeface="Arial"/>
+                      </a:endParaRPr>
+                    </a:p>
+                    <a:p>
+                      <a:pPr>
+                        <a:lnSpc>
+                          <a:spcPct val="100000"/>
+                        </a:lnSpc>
+                      </a:pPr>
+                      <a:r>
+                        <a:rPr b="0" lang="pt-BR" sz="2000" spc="-1" strike="noStrike">
+                          <a:solidFill>
+                            <a:srgbClr val="c9211e"/>
+                          </a:solidFill>
+                          <a:latin typeface="Times New Roman"/>
+                          <a:ea typeface="DejaVu Sans"/>
+                        </a:rPr>
                         <a:t>- Pousadas e restaurantes oferecendo comida mineira e regional de bom qualidade</a:t>
                       </a:r>
                       <a:endParaRPr b="0" lang="pt-BR" sz="2000" spc="-1" strike="noStrike">
@@ -9031,7 +9061,7 @@
         <p:spPr>
           <a:xfrm>
             <a:off x="838080" y="365040"/>
-            <a:ext cx="10511640" cy="1321560"/>
+            <a:ext cx="10511280" cy="1321200"/>
           </a:xfrm>
           <a:prstGeom prst="rect">
             <a:avLst/>
@@ -9082,7 +9112,7 @@
         <p:spPr>
           <a:xfrm>
             <a:off x="720000" y="1440000"/>
-            <a:ext cx="10629720" cy="4319640"/>
+            <a:ext cx="10629360" cy="4319280"/>
           </a:xfrm>
           <a:prstGeom prst="rect">
             <a:avLst/>

</xml_diff>